<commit_message>
add ppt and modify thesis
</commit_message>
<xml_diff>
--- a/中期答辩/毕设中期答辩-计32周建宇 .pptx
+++ b/中期答辩/毕设中期答辩-计32周建宇 .pptx
@@ -140,6 +140,10 @@
 </p:presentation>
 </file>
 
+<file path=ppt/revisionInfo.xml><?xml version="1.0" encoding="utf-8"?>
+<p1510:revInfo xmlns:a="http://schemas.openxmlformats.org/drawingml/2006/main" xmlns:r="http://schemas.openxmlformats.org/officeDocument/2006/relationships" xmlns:p1510="http://schemas.microsoft.com/office/powerpoint/2015/10/main"/>
+</file>
+
 <file path=ppt/notesMasters/notesMaster1.xml><?xml version="1.0" encoding="utf-8"?>
 <p:notesMaster xmlns:a="http://schemas.openxmlformats.org/drawingml/2006/main" xmlns:r="http://schemas.openxmlformats.org/officeDocument/2006/relationships" xmlns:p="http://schemas.openxmlformats.org/presentationml/2006/main">
   <p:cSld>
@@ -222,7 +226,7 @@
           <a:p>
             <a:fld id="{DBAD91BB-FD6C-4CF5-B2A4-77732C31BDDE}" type="datetimeFigureOut">
               <a:rPr lang="zh-CN" altLang="en-US" smtClean="0"/>
-              <a:t>2017/4/22</a:t>
+              <a:t>2017/6/10</a:t>
             </a:fld>
             <a:endParaRPr lang="zh-CN" altLang="en-US"/>
           </a:p>
@@ -286,38 +290,37 @@
           <a:p>
             <a:pPr lvl="0"/>
             <a:r>
-              <a:rPr lang="zh-CN" altLang="en-US" smtClean="0"/>
+              <a:rPr lang="zh-CN" altLang="en-US"/>
               <a:t>单击此处编辑母版文本样式</a:t>
             </a:r>
           </a:p>
           <a:p>
             <a:pPr lvl="1"/>
             <a:r>
-              <a:rPr lang="zh-CN" altLang="en-US" smtClean="0"/>
+              <a:rPr lang="zh-CN" altLang="en-US"/>
               <a:t>第二级</a:t>
             </a:r>
           </a:p>
           <a:p>
             <a:pPr lvl="2"/>
             <a:r>
-              <a:rPr lang="zh-CN" altLang="en-US" smtClean="0"/>
+              <a:rPr lang="zh-CN" altLang="en-US"/>
               <a:t>第三级</a:t>
             </a:r>
           </a:p>
           <a:p>
             <a:pPr lvl="3"/>
             <a:r>
-              <a:rPr lang="zh-CN" altLang="en-US" smtClean="0"/>
+              <a:rPr lang="zh-CN" altLang="en-US"/>
               <a:t>第四级</a:t>
             </a:r>
           </a:p>
           <a:p>
             <a:pPr lvl="4"/>
             <a:r>
-              <a:rPr lang="zh-CN" altLang="en-US" smtClean="0"/>
+              <a:rPr lang="zh-CN" altLang="en-US"/>
               <a:t>第五级</a:t>
             </a:r>
-            <a:endParaRPr lang="zh-CN" altLang="en-US"/>
           </a:p>
         </p:txBody>
       </p:sp>
@@ -546,7 +549,7 @@
               <a:buNone/>
             </a:pPr>
             <a:r>
-              <a:rPr lang="zh-CN" altLang="en-US" dirty="0" smtClean="0">
+              <a:rPr lang="zh-CN" altLang="en-US" dirty="0">
                 <a:solidFill>
                   <a:schemeClr val="tx1">
                     <a:lumMod val="75000"/>
@@ -559,7 +562,7 @@
               </a:rPr>
               <a:t>自动问答一直是自然语言处理领域一个十分热门的研究方向，</a:t>
             </a:r>
-            <a:endParaRPr lang="en-US" altLang="zh-CN" dirty="0" smtClean="0">
+            <a:endParaRPr lang="en-US" altLang="zh-CN" dirty="0">
               <a:solidFill>
                 <a:schemeClr val="tx1">
                   <a:lumMod val="75000"/>
@@ -582,7 +585,7 @@
               <a:buNone/>
             </a:pPr>
             <a:r>
-              <a:rPr lang="zh-CN" altLang="en-US" dirty="0" smtClean="0">
+              <a:rPr lang="zh-CN" altLang="en-US" dirty="0">
                 <a:solidFill>
                   <a:schemeClr val="tx1">
                     <a:lumMod val="75000"/>
@@ -595,7 +598,7 @@
               </a:rPr>
               <a:t>它综合运用了各种自然语言处理技术。自动问答在学术界得到了广泛关注，很多成果也被用于工业界中。</a:t>
             </a:r>
-            <a:endParaRPr lang="en-US" altLang="zh-CN" dirty="0" smtClean="0">
+            <a:endParaRPr lang="en-US" altLang="zh-CN" dirty="0">
               <a:solidFill>
                 <a:schemeClr val="tx1">
                   <a:lumMod val="75000"/>
@@ -618,7 +621,7 @@
               <a:buNone/>
             </a:pPr>
             <a:r>
-              <a:rPr lang="zh-CN" altLang="en-US" dirty="0" smtClean="0">
+              <a:rPr lang="zh-CN" altLang="en-US" dirty="0">
                 <a:solidFill>
                   <a:schemeClr val="tx1">
                     <a:lumMod val="75000"/>
@@ -729,7 +732,7 @@
               <a:buNone/>
             </a:pPr>
             <a:r>
-              <a:rPr lang="zh-CN" altLang="en-US" dirty="0" smtClean="0">
+              <a:rPr lang="zh-CN" altLang="en-US" dirty="0">
                 <a:solidFill>
                   <a:schemeClr val="tx1">
                     <a:lumMod val="75000"/>
@@ -742,7 +745,7 @@
               </a:rPr>
               <a:t>自动问答一直是自然语言处理领域一个十分热门的研究方向，</a:t>
             </a:r>
-            <a:endParaRPr lang="en-US" altLang="zh-CN" dirty="0" smtClean="0">
+            <a:endParaRPr lang="en-US" altLang="zh-CN" dirty="0">
               <a:solidFill>
                 <a:schemeClr val="tx1">
                   <a:lumMod val="75000"/>
@@ -765,7 +768,7 @@
               <a:buNone/>
             </a:pPr>
             <a:r>
-              <a:rPr lang="zh-CN" altLang="en-US" dirty="0" smtClean="0">
+              <a:rPr lang="zh-CN" altLang="en-US" dirty="0">
                 <a:solidFill>
                   <a:schemeClr val="tx1">
                     <a:lumMod val="75000"/>
@@ -778,7 +781,7 @@
               </a:rPr>
               <a:t>它综合运用了各种自然语言处理技术。自动问答在学术界得到了广泛关注，很多成果也被用于工业界中。</a:t>
             </a:r>
-            <a:endParaRPr lang="en-US" altLang="zh-CN" dirty="0" smtClean="0">
+            <a:endParaRPr lang="en-US" altLang="zh-CN" dirty="0">
               <a:solidFill>
                 <a:schemeClr val="tx1">
                   <a:lumMod val="75000"/>
@@ -801,7 +804,7 @@
               <a:buNone/>
             </a:pPr>
             <a:r>
-              <a:rPr lang="zh-CN" altLang="en-US" dirty="0" smtClean="0">
+              <a:rPr lang="zh-CN" altLang="en-US" dirty="0">
                 <a:solidFill>
                   <a:schemeClr val="tx1">
                     <a:lumMod val="75000"/>
@@ -912,7 +915,7 @@
               <a:buNone/>
             </a:pPr>
             <a:r>
-              <a:rPr lang="zh-CN" altLang="en-US" dirty="0" smtClean="0">
+              <a:rPr lang="zh-CN" altLang="en-US" dirty="0">
                 <a:solidFill>
                   <a:schemeClr val="tx1">
                     <a:lumMod val="75000"/>
@@ -925,7 +928,7 @@
               </a:rPr>
               <a:t>自动问答一直是自然语言处理领域一个十分热门的研究方向，</a:t>
             </a:r>
-            <a:endParaRPr lang="en-US" altLang="zh-CN" dirty="0" smtClean="0">
+            <a:endParaRPr lang="en-US" altLang="zh-CN" dirty="0">
               <a:solidFill>
                 <a:schemeClr val="tx1">
                   <a:lumMod val="75000"/>
@@ -948,7 +951,7 @@
               <a:buNone/>
             </a:pPr>
             <a:r>
-              <a:rPr lang="zh-CN" altLang="en-US" dirty="0" smtClean="0">
+              <a:rPr lang="zh-CN" altLang="en-US" dirty="0">
                 <a:solidFill>
                   <a:schemeClr val="tx1">
                     <a:lumMod val="75000"/>
@@ -961,7 +964,7 @@
               </a:rPr>
               <a:t>它综合运用了各种自然语言处理技术。自动问答在学术界得到了广泛关注，很多成果也被用于工业界中。</a:t>
             </a:r>
-            <a:endParaRPr lang="en-US" altLang="zh-CN" dirty="0" smtClean="0">
+            <a:endParaRPr lang="en-US" altLang="zh-CN" dirty="0">
               <a:solidFill>
                 <a:schemeClr val="tx1">
                   <a:lumMod val="75000"/>
@@ -984,7 +987,7 @@
               <a:buNone/>
             </a:pPr>
             <a:r>
-              <a:rPr lang="zh-CN" altLang="en-US" dirty="0" smtClean="0">
+              <a:rPr lang="zh-CN" altLang="en-US" dirty="0">
                 <a:solidFill>
                   <a:schemeClr val="tx1">
                     <a:lumMod val="75000"/>
@@ -1095,7 +1098,7 @@
               <a:buNone/>
             </a:pPr>
             <a:r>
-              <a:rPr lang="zh-CN" altLang="en-US" dirty="0" smtClean="0">
+              <a:rPr lang="zh-CN" altLang="en-US" dirty="0">
                 <a:solidFill>
                   <a:schemeClr val="tx1">
                     <a:lumMod val="75000"/>
@@ -1108,7 +1111,7 @@
               </a:rPr>
               <a:t>自动问答一直是自然语言处理领域一个十分热门的研究方向，</a:t>
             </a:r>
-            <a:endParaRPr lang="en-US" altLang="zh-CN" dirty="0" smtClean="0">
+            <a:endParaRPr lang="en-US" altLang="zh-CN" dirty="0">
               <a:solidFill>
                 <a:schemeClr val="tx1">
                   <a:lumMod val="75000"/>
@@ -1131,7 +1134,7 @@
               <a:buNone/>
             </a:pPr>
             <a:r>
-              <a:rPr lang="zh-CN" altLang="en-US" dirty="0" smtClean="0">
+              <a:rPr lang="zh-CN" altLang="en-US" dirty="0">
                 <a:solidFill>
                   <a:schemeClr val="tx1">
                     <a:lumMod val="75000"/>
@@ -1144,7 +1147,7 @@
               </a:rPr>
               <a:t>它综合运用了各种自然语言处理技术。自动问答在学术界得到了广泛关注，很多成果也被用于工业界中。</a:t>
             </a:r>
-            <a:endParaRPr lang="en-US" altLang="zh-CN" dirty="0" smtClean="0">
+            <a:endParaRPr lang="en-US" altLang="zh-CN" dirty="0">
               <a:solidFill>
                 <a:schemeClr val="tx1">
                   <a:lumMod val="75000"/>
@@ -1167,7 +1170,7 @@
               <a:buNone/>
             </a:pPr>
             <a:r>
-              <a:rPr lang="zh-CN" altLang="en-US" dirty="0" smtClean="0">
+              <a:rPr lang="zh-CN" altLang="en-US" dirty="0">
                 <a:solidFill>
                   <a:schemeClr val="tx1">
                     <a:lumMod val="75000"/>
@@ -1278,7 +1281,7 @@
               <a:buNone/>
             </a:pPr>
             <a:r>
-              <a:rPr lang="zh-CN" altLang="en-US" dirty="0" smtClean="0">
+              <a:rPr lang="zh-CN" altLang="en-US" dirty="0">
                 <a:solidFill>
                   <a:schemeClr val="tx1">
                     <a:lumMod val="75000"/>
@@ -1291,7 +1294,7 @@
               </a:rPr>
               <a:t>自动问答一直是自然语言处理领域一个十分热门的研究方向，</a:t>
             </a:r>
-            <a:endParaRPr lang="en-US" altLang="zh-CN" dirty="0" smtClean="0">
+            <a:endParaRPr lang="en-US" altLang="zh-CN" dirty="0">
               <a:solidFill>
                 <a:schemeClr val="tx1">
                   <a:lumMod val="75000"/>
@@ -1314,7 +1317,7 @@
               <a:buNone/>
             </a:pPr>
             <a:r>
-              <a:rPr lang="zh-CN" altLang="en-US" dirty="0" smtClean="0">
+              <a:rPr lang="zh-CN" altLang="en-US" dirty="0">
                 <a:solidFill>
                   <a:schemeClr val="tx1">
                     <a:lumMod val="75000"/>
@@ -1327,7 +1330,7 @@
               </a:rPr>
               <a:t>它综合运用了各种自然语言处理技术。自动问答在学术界得到了广泛关注，很多成果也被用于工业界中。</a:t>
             </a:r>
-            <a:endParaRPr lang="en-US" altLang="zh-CN" dirty="0" smtClean="0">
+            <a:endParaRPr lang="en-US" altLang="zh-CN" dirty="0">
               <a:solidFill>
                 <a:schemeClr val="tx1">
                   <a:lumMod val="75000"/>
@@ -1350,7 +1353,7 @@
               <a:buNone/>
             </a:pPr>
             <a:r>
-              <a:rPr lang="zh-CN" altLang="en-US" dirty="0" smtClean="0">
+              <a:rPr lang="zh-CN" altLang="en-US" dirty="0">
                 <a:solidFill>
                   <a:schemeClr val="tx1">
                     <a:lumMod val="75000"/>
@@ -1461,7 +1464,7 @@
               <a:buNone/>
             </a:pPr>
             <a:r>
-              <a:rPr lang="zh-CN" altLang="en-US" dirty="0" smtClean="0">
+              <a:rPr lang="zh-CN" altLang="en-US" dirty="0">
                 <a:solidFill>
                   <a:schemeClr val="tx1">
                     <a:lumMod val="75000"/>
@@ -1474,7 +1477,7 @@
               </a:rPr>
               <a:t>自动问答一直是自然语言处理领域一个十分热门的研究方向，</a:t>
             </a:r>
-            <a:endParaRPr lang="en-US" altLang="zh-CN" dirty="0" smtClean="0">
+            <a:endParaRPr lang="en-US" altLang="zh-CN" dirty="0">
               <a:solidFill>
                 <a:schemeClr val="tx1">
                   <a:lumMod val="75000"/>
@@ -1497,7 +1500,7 @@
               <a:buNone/>
             </a:pPr>
             <a:r>
-              <a:rPr lang="zh-CN" altLang="en-US" dirty="0" smtClean="0">
+              <a:rPr lang="zh-CN" altLang="en-US" dirty="0">
                 <a:solidFill>
                   <a:schemeClr val="tx1">
                     <a:lumMod val="75000"/>
@@ -1510,7 +1513,7 @@
               </a:rPr>
               <a:t>它综合运用了各种自然语言处理技术。自动问答在学术界得到了广泛关注，很多成果也被用于工业界中。</a:t>
             </a:r>
-            <a:endParaRPr lang="en-US" altLang="zh-CN" dirty="0" smtClean="0">
+            <a:endParaRPr lang="en-US" altLang="zh-CN" dirty="0">
               <a:solidFill>
                 <a:schemeClr val="tx1">
                   <a:lumMod val="75000"/>
@@ -1533,7 +1536,7 @@
               <a:buNone/>
             </a:pPr>
             <a:r>
-              <a:rPr lang="zh-CN" altLang="en-US" dirty="0" smtClean="0">
+              <a:rPr lang="zh-CN" altLang="en-US" dirty="0">
                 <a:solidFill>
                   <a:schemeClr val="tx1">
                     <a:lumMod val="75000"/>
@@ -1644,7 +1647,7 @@
               <a:buNone/>
             </a:pPr>
             <a:r>
-              <a:rPr lang="zh-CN" altLang="en-US" dirty="0" smtClean="0">
+              <a:rPr lang="zh-CN" altLang="en-US" dirty="0">
                 <a:solidFill>
                   <a:schemeClr val="tx1">
                     <a:lumMod val="75000"/>
@@ -1657,7 +1660,7 @@
               </a:rPr>
               <a:t>自动问答一直是自然语言处理领域一个十分热门的研究方向，</a:t>
             </a:r>
-            <a:endParaRPr lang="en-US" altLang="zh-CN" dirty="0" smtClean="0">
+            <a:endParaRPr lang="en-US" altLang="zh-CN" dirty="0">
               <a:solidFill>
                 <a:schemeClr val="tx1">
                   <a:lumMod val="75000"/>
@@ -1680,7 +1683,7 @@
               <a:buNone/>
             </a:pPr>
             <a:r>
-              <a:rPr lang="zh-CN" altLang="en-US" dirty="0" smtClean="0">
+              <a:rPr lang="zh-CN" altLang="en-US" dirty="0">
                 <a:solidFill>
                   <a:schemeClr val="tx1">
                     <a:lumMod val="75000"/>
@@ -1693,7 +1696,7 @@
               </a:rPr>
               <a:t>它综合运用了各种自然语言处理技术。自动问答在学术界得到了广泛关注，很多成果也被用于工业界中。</a:t>
             </a:r>
-            <a:endParaRPr lang="en-US" altLang="zh-CN" dirty="0" smtClean="0">
+            <a:endParaRPr lang="en-US" altLang="zh-CN" dirty="0">
               <a:solidFill>
                 <a:schemeClr val="tx1">
                   <a:lumMod val="75000"/>
@@ -1716,7 +1719,7 @@
               <a:buNone/>
             </a:pPr>
             <a:r>
-              <a:rPr lang="zh-CN" altLang="en-US" dirty="0" smtClean="0">
+              <a:rPr lang="zh-CN" altLang="en-US" dirty="0">
                 <a:solidFill>
                   <a:schemeClr val="tx1">
                     <a:lumMod val="75000"/>
@@ -1827,7 +1830,7 @@
               <a:buNone/>
             </a:pPr>
             <a:r>
-              <a:rPr lang="zh-CN" altLang="en-US" dirty="0" smtClean="0">
+              <a:rPr lang="zh-CN" altLang="en-US" dirty="0">
                 <a:solidFill>
                   <a:schemeClr val="tx1">
                     <a:lumMod val="75000"/>
@@ -1840,7 +1843,7 @@
               </a:rPr>
               <a:t>自动问答一直是自然语言处理领域一个十分热门的研究方向，</a:t>
             </a:r>
-            <a:endParaRPr lang="en-US" altLang="zh-CN" dirty="0" smtClean="0">
+            <a:endParaRPr lang="en-US" altLang="zh-CN" dirty="0">
               <a:solidFill>
                 <a:schemeClr val="tx1">
                   <a:lumMod val="75000"/>
@@ -1863,7 +1866,7 @@
               <a:buNone/>
             </a:pPr>
             <a:r>
-              <a:rPr lang="zh-CN" altLang="en-US" dirty="0" smtClean="0">
+              <a:rPr lang="zh-CN" altLang="en-US" dirty="0">
                 <a:solidFill>
                   <a:schemeClr val="tx1">
                     <a:lumMod val="75000"/>
@@ -1876,7 +1879,7 @@
               </a:rPr>
               <a:t>它综合运用了各种自然语言处理技术。自动问答在学术界得到了广泛关注，很多成果也被用于工业界中。</a:t>
             </a:r>
-            <a:endParaRPr lang="en-US" altLang="zh-CN" dirty="0" smtClean="0">
+            <a:endParaRPr lang="en-US" altLang="zh-CN" dirty="0">
               <a:solidFill>
                 <a:schemeClr val="tx1">
                   <a:lumMod val="75000"/>
@@ -1899,7 +1902,7 @@
               <a:buNone/>
             </a:pPr>
             <a:r>
-              <a:rPr lang="zh-CN" altLang="en-US" dirty="0" smtClean="0">
+              <a:rPr lang="zh-CN" altLang="en-US" dirty="0">
                 <a:solidFill>
                   <a:schemeClr val="tx1">
                     <a:lumMod val="75000"/>
@@ -2010,7 +2013,7 @@
               <a:buNone/>
             </a:pPr>
             <a:r>
-              <a:rPr lang="zh-CN" altLang="en-US" dirty="0" smtClean="0">
+              <a:rPr lang="zh-CN" altLang="en-US" dirty="0">
                 <a:solidFill>
                   <a:schemeClr val="tx1">
                     <a:lumMod val="75000"/>
@@ -2023,7 +2026,7 @@
               </a:rPr>
               <a:t>自动问答一直是自然语言处理领域一个十分热门的研究方向，</a:t>
             </a:r>
-            <a:endParaRPr lang="en-US" altLang="zh-CN" dirty="0" smtClean="0">
+            <a:endParaRPr lang="en-US" altLang="zh-CN" dirty="0">
               <a:solidFill>
                 <a:schemeClr val="tx1">
                   <a:lumMod val="75000"/>
@@ -2046,7 +2049,7 @@
               <a:buNone/>
             </a:pPr>
             <a:r>
-              <a:rPr lang="zh-CN" altLang="en-US" dirty="0" smtClean="0">
+              <a:rPr lang="zh-CN" altLang="en-US" dirty="0">
                 <a:solidFill>
                   <a:schemeClr val="tx1">
                     <a:lumMod val="75000"/>
@@ -2059,7 +2062,7 @@
               </a:rPr>
               <a:t>它综合运用了各种自然语言处理技术。自动问答在学术界得到了广泛关注，很多成果也被用于工业界中。</a:t>
             </a:r>
-            <a:endParaRPr lang="en-US" altLang="zh-CN" dirty="0" smtClean="0">
+            <a:endParaRPr lang="en-US" altLang="zh-CN" dirty="0">
               <a:solidFill>
                 <a:schemeClr val="tx1">
                   <a:lumMod val="75000"/>
@@ -2082,7 +2085,7 @@
               <a:buNone/>
             </a:pPr>
             <a:r>
-              <a:rPr lang="zh-CN" altLang="en-US" dirty="0" smtClean="0">
+              <a:rPr lang="zh-CN" altLang="en-US" dirty="0">
                 <a:solidFill>
                   <a:schemeClr val="tx1">
                     <a:lumMod val="75000"/>
@@ -2193,7 +2196,7 @@
               <a:buNone/>
             </a:pPr>
             <a:r>
-              <a:rPr lang="zh-CN" altLang="en-US" dirty="0" smtClean="0">
+              <a:rPr lang="zh-CN" altLang="en-US" dirty="0">
                 <a:solidFill>
                   <a:schemeClr val="tx1">
                     <a:lumMod val="75000"/>
@@ -2206,7 +2209,7 @@
               </a:rPr>
               <a:t>自动问答一直是自然语言处理领域一个十分热门的研究方向，</a:t>
             </a:r>
-            <a:endParaRPr lang="en-US" altLang="zh-CN" dirty="0" smtClean="0">
+            <a:endParaRPr lang="en-US" altLang="zh-CN" dirty="0">
               <a:solidFill>
                 <a:schemeClr val="tx1">
                   <a:lumMod val="75000"/>
@@ -2229,7 +2232,7 @@
               <a:buNone/>
             </a:pPr>
             <a:r>
-              <a:rPr lang="zh-CN" altLang="en-US" dirty="0" smtClean="0">
+              <a:rPr lang="zh-CN" altLang="en-US" dirty="0">
                 <a:solidFill>
                   <a:schemeClr val="tx1">
                     <a:lumMod val="75000"/>
@@ -2242,7 +2245,7 @@
               </a:rPr>
               <a:t>它综合运用了各种自然语言处理技术。自动问答在学术界得到了广泛关注，很多成果也被用于工业界中。</a:t>
             </a:r>
-            <a:endParaRPr lang="en-US" altLang="zh-CN" dirty="0" smtClean="0">
+            <a:endParaRPr lang="en-US" altLang="zh-CN" dirty="0">
               <a:solidFill>
                 <a:schemeClr val="tx1">
                   <a:lumMod val="75000"/>
@@ -2265,7 +2268,7 @@
               <a:buNone/>
             </a:pPr>
             <a:r>
-              <a:rPr lang="zh-CN" altLang="en-US" dirty="0" smtClean="0">
+              <a:rPr lang="zh-CN" altLang="en-US" dirty="0">
                 <a:solidFill>
                   <a:schemeClr val="tx1">
                     <a:lumMod val="75000"/>
@@ -2376,7 +2379,7 @@
               <a:buNone/>
             </a:pPr>
             <a:r>
-              <a:rPr lang="zh-CN" altLang="en-US" dirty="0" smtClean="0">
+              <a:rPr lang="zh-CN" altLang="en-US" dirty="0">
                 <a:solidFill>
                   <a:schemeClr val="tx1">
                     <a:lumMod val="75000"/>
@@ -2389,7 +2392,7 @@
               </a:rPr>
               <a:t>自动问答一直是自然语言处理领域一个十分热门的研究方向，</a:t>
             </a:r>
-            <a:endParaRPr lang="en-US" altLang="zh-CN" dirty="0" smtClean="0">
+            <a:endParaRPr lang="en-US" altLang="zh-CN" dirty="0">
               <a:solidFill>
                 <a:schemeClr val="tx1">
                   <a:lumMod val="75000"/>
@@ -2412,7 +2415,7 @@
               <a:buNone/>
             </a:pPr>
             <a:r>
-              <a:rPr lang="zh-CN" altLang="en-US" dirty="0" smtClean="0">
+              <a:rPr lang="zh-CN" altLang="en-US" dirty="0">
                 <a:solidFill>
                   <a:schemeClr val="tx1">
                     <a:lumMod val="75000"/>
@@ -2425,7 +2428,7 @@
               </a:rPr>
               <a:t>它综合运用了各种自然语言处理技术。自动问答在学术界得到了广泛关注，很多成果也被用于工业界中。</a:t>
             </a:r>
-            <a:endParaRPr lang="en-US" altLang="zh-CN" dirty="0" smtClean="0">
+            <a:endParaRPr lang="en-US" altLang="zh-CN" dirty="0">
               <a:solidFill>
                 <a:schemeClr val="tx1">
                   <a:lumMod val="75000"/>
@@ -2448,7 +2451,7 @@
               <a:buNone/>
             </a:pPr>
             <a:r>
-              <a:rPr lang="zh-CN" altLang="en-US" dirty="0" smtClean="0">
+              <a:rPr lang="zh-CN" altLang="en-US" dirty="0">
                 <a:solidFill>
                   <a:schemeClr val="tx1">
                     <a:lumMod val="75000"/>
@@ -2559,7 +2562,7 @@
               <a:buNone/>
             </a:pPr>
             <a:r>
-              <a:rPr lang="zh-CN" altLang="en-US" dirty="0" smtClean="0">
+              <a:rPr lang="zh-CN" altLang="en-US" dirty="0">
                 <a:solidFill>
                   <a:schemeClr val="tx1">
                     <a:lumMod val="75000"/>
@@ -2572,7 +2575,7 @@
               </a:rPr>
               <a:t>自动问答一直是自然语言处理领域一个十分热门的研究方向，</a:t>
             </a:r>
-            <a:endParaRPr lang="en-US" altLang="zh-CN" dirty="0" smtClean="0">
+            <a:endParaRPr lang="en-US" altLang="zh-CN" dirty="0">
               <a:solidFill>
                 <a:schemeClr val="tx1">
                   <a:lumMod val="75000"/>
@@ -2595,7 +2598,7 @@
               <a:buNone/>
             </a:pPr>
             <a:r>
-              <a:rPr lang="zh-CN" altLang="en-US" dirty="0" smtClean="0">
+              <a:rPr lang="zh-CN" altLang="en-US" dirty="0">
                 <a:solidFill>
                   <a:schemeClr val="tx1">
                     <a:lumMod val="75000"/>
@@ -2608,7 +2611,7 @@
               </a:rPr>
               <a:t>它综合运用了各种自然语言处理技术。自动问答在学术界得到了广泛关注，很多成果也被用于工业界中。</a:t>
             </a:r>
-            <a:endParaRPr lang="en-US" altLang="zh-CN" dirty="0" smtClean="0">
+            <a:endParaRPr lang="en-US" altLang="zh-CN" dirty="0">
               <a:solidFill>
                 <a:schemeClr val="tx1">
                   <a:lumMod val="75000"/>
@@ -2631,7 +2634,7 @@
               <a:buNone/>
             </a:pPr>
             <a:r>
-              <a:rPr lang="zh-CN" altLang="en-US" dirty="0" smtClean="0">
+              <a:rPr lang="zh-CN" altLang="en-US" dirty="0">
                 <a:solidFill>
                   <a:schemeClr val="tx1">
                     <a:lumMod val="75000"/>
@@ -2742,7 +2745,7 @@
               <a:buNone/>
             </a:pPr>
             <a:r>
-              <a:rPr lang="zh-CN" altLang="en-US" dirty="0" smtClean="0">
+              <a:rPr lang="zh-CN" altLang="en-US" dirty="0">
                 <a:solidFill>
                   <a:schemeClr val="tx1">
                     <a:lumMod val="75000"/>
@@ -2755,7 +2758,7 @@
               </a:rPr>
               <a:t>自动问答一直是自然语言处理领域一个十分热门的研究方向，</a:t>
             </a:r>
-            <a:endParaRPr lang="en-US" altLang="zh-CN" dirty="0" smtClean="0">
+            <a:endParaRPr lang="en-US" altLang="zh-CN" dirty="0">
               <a:solidFill>
                 <a:schemeClr val="tx1">
                   <a:lumMod val="75000"/>
@@ -2778,7 +2781,7 @@
               <a:buNone/>
             </a:pPr>
             <a:r>
-              <a:rPr lang="zh-CN" altLang="en-US" dirty="0" smtClean="0">
+              <a:rPr lang="zh-CN" altLang="en-US" dirty="0">
                 <a:solidFill>
                   <a:schemeClr val="tx1">
                     <a:lumMod val="75000"/>
@@ -2791,7 +2794,7 @@
               </a:rPr>
               <a:t>它综合运用了各种自然语言处理技术。自动问答在学术界得到了广泛关注，很多成果也被用于工业界中。</a:t>
             </a:r>
-            <a:endParaRPr lang="en-US" altLang="zh-CN" dirty="0" smtClean="0">
+            <a:endParaRPr lang="en-US" altLang="zh-CN" dirty="0">
               <a:solidFill>
                 <a:schemeClr val="tx1">
                   <a:lumMod val="75000"/>
@@ -2814,7 +2817,7 @@
               <a:buNone/>
             </a:pPr>
             <a:r>
-              <a:rPr lang="zh-CN" altLang="en-US" dirty="0" smtClean="0">
+              <a:rPr lang="zh-CN" altLang="en-US" dirty="0">
                 <a:solidFill>
                   <a:schemeClr val="tx1">
                     <a:lumMod val="75000"/>
@@ -2925,7 +2928,7 @@
               <a:buNone/>
             </a:pPr>
             <a:r>
-              <a:rPr lang="zh-CN" altLang="en-US" dirty="0" smtClean="0">
+              <a:rPr lang="zh-CN" altLang="en-US" dirty="0">
                 <a:solidFill>
                   <a:schemeClr val="tx1">
                     <a:lumMod val="75000"/>
@@ -2938,7 +2941,7 @@
               </a:rPr>
               <a:t>自动问答一直是自然语言处理领域一个十分热门的研究方向，</a:t>
             </a:r>
-            <a:endParaRPr lang="en-US" altLang="zh-CN" dirty="0" smtClean="0">
+            <a:endParaRPr lang="en-US" altLang="zh-CN" dirty="0">
               <a:solidFill>
                 <a:schemeClr val="tx1">
                   <a:lumMod val="75000"/>
@@ -2961,7 +2964,7 @@
               <a:buNone/>
             </a:pPr>
             <a:r>
-              <a:rPr lang="zh-CN" altLang="en-US" dirty="0" smtClean="0">
+              <a:rPr lang="zh-CN" altLang="en-US" dirty="0">
                 <a:solidFill>
                   <a:schemeClr val="tx1">
                     <a:lumMod val="75000"/>
@@ -2974,7 +2977,7 @@
               </a:rPr>
               <a:t>它综合运用了各种自然语言处理技术。自动问答在学术界得到了广泛关注，很多成果也被用于工业界中。</a:t>
             </a:r>
-            <a:endParaRPr lang="en-US" altLang="zh-CN" dirty="0" smtClean="0">
+            <a:endParaRPr lang="en-US" altLang="zh-CN" dirty="0">
               <a:solidFill>
                 <a:schemeClr val="tx1">
                   <a:lumMod val="75000"/>
@@ -2997,7 +3000,7 @@
               <a:buNone/>
             </a:pPr>
             <a:r>
-              <a:rPr lang="zh-CN" altLang="en-US" dirty="0" smtClean="0">
+              <a:rPr lang="zh-CN" altLang="en-US" dirty="0">
                 <a:solidFill>
                   <a:schemeClr val="tx1">
                     <a:lumMod val="75000"/>
@@ -3108,7 +3111,7 @@
               <a:buNone/>
             </a:pPr>
             <a:r>
-              <a:rPr lang="zh-CN" altLang="en-US" dirty="0" smtClean="0">
+              <a:rPr lang="zh-CN" altLang="en-US" dirty="0">
                 <a:solidFill>
                   <a:schemeClr val="tx1">
                     <a:lumMod val="75000"/>
@@ -3121,7 +3124,7 @@
               </a:rPr>
               <a:t>自动问答一直是自然语言处理领域一个十分热门的研究方向，</a:t>
             </a:r>
-            <a:endParaRPr lang="en-US" altLang="zh-CN" dirty="0" smtClean="0">
+            <a:endParaRPr lang="en-US" altLang="zh-CN" dirty="0">
               <a:solidFill>
                 <a:schemeClr val="tx1">
                   <a:lumMod val="75000"/>
@@ -3144,7 +3147,7 @@
               <a:buNone/>
             </a:pPr>
             <a:r>
-              <a:rPr lang="zh-CN" altLang="en-US" dirty="0" smtClean="0">
+              <a:rPr lang="zh-CN" altLang="en-US" dirty="0">
                 <a:solidFill>
                   <a:schemeClr val="tx1">
                     <a:lumMod val="75000"/>
@@ -3157,7 +3160,7 @@
               </a:rPr>
               <a:t>它综合运用了各种自然语言处理技术。自动问答在学术界得到了广泛关注，很多成果也被用于工业界中。</a:t>
             </a:r>
-            <a:endParaRPr lang="en-US" altLang="zh-CN" dirty="0" smtClean="0">
+            <a:endParaRPr lang="en-US" altLang="zh-CN" dirty="0">
               <a:solidFill>
                 <a:schemeClr val="tx1">
                   <a:lumMod val="75000"/>
@@ -3180,7 +3183,7 @@
               <a:buNone/>
             </a:pPr>
             <a:r>
-              <a:rPr lang="zh-CN" altLang="en-US" dirty="0" smtClean="0">
+              <a:rPr lang="zh-CN" altLang="en-US" dirty="0">
                 <a:solidFill>
                   <a:schemeClr val="tx1">
                     <a:lumMod val="75000"/>
@@ -3291,7 +3294,7 @@
               <a:buNone/>
             </a:pPr>
             <a:r>
-              <a:rPr lang="zh-CN" altLang="en-US" dirty="0" smtClean="0">
+              <a:rPr lang="zh-CN" altLang="en-US" dirty="0">
                 <a:solidFill>
                   <a:schemeClr val="tx1">
                     <a:lumMod val="75000"/>
@@ -3304,7 +3307,7 @@
               </a:rPr>
               <a:t>自动问答一直是自然语言处理领域一个十分热门的研究方向，</a:t>
             </a:r>
-            <a:endParaRPr lang="en-US" altLang="zh-CN" dirty="0" smtClean="0">
+            <a:endParaRPr lang="en-US" altLang="zh-CN" dirty="0">
               <a:solidFill>
                 <a:schemeClr val="tx1">
                   <a:lumMod val="75000"/>
@@ -3327,7 +3330,7 @@
               <a:buNone/>
             </a:pPr>
             <a:r>
-              <a:rPr lang="zh-CN" altLang="en-US" dirty="0" smtClean="0">
+              <a:rPr lang="zh-CN" altLang="en-US" dirty="0">
                 <a:solidFill>
                   <a:schemeClr val="tx1">
                     <a:lumMod val="75000"/>
@@ -3340,7 +3343,7 @@
               </a:rPr>
               <a:t>它综合运用了各种自然语言处理技术。自动问答在学术界得到了广泛关注，很多成果也被用于工业界中。</a:t>
             </a:r>
-            <a:endParaRPr lang="en-US" altLang="zh-CN" dirty="0" smtClean="0">
+            <a:endParaRPr lang="en-US" altLang="zh-CN" dirty="0">
               <a:solidFill>
                 <a:schemeClr val="tx1">
                   <a:lumMod val="75000"/>
@@ -3363,7 +3366,7 @@
               <a:buNone/>
             </a:pPr>
             <a:r>
-              <a:rPr lang="zh-CN" altLang="en-US" dirty="0" smtClean="0">
+              <a:rPr lang="zh-CN" altLang="en-US" dirty="0">
                 <a:solidFill>
                   <a:schemeClr val="tx1">
                     <a:lumMod val="75000"/>
@@ -3474,7 +3477,7 @@
               <a:buNone/>
             </a:pPr>
             <a:r>
-              <a:rPr lang="zh-CN" altLang="en-US" dirty="0" smtClean="0">
+              <a:rPr lang="zh-CN" altLang="en-US" dirty="0">
                 <a:solidFill>
                   <a:schemeClr val="tx1">
                     <a:lumMod val="75000"/>
@@ -3487,7 +3490,7 @@
               </a:rPr>
               <a:t>自动问答一直是自然语言处理领域一个十分热门的研究方向，</a:t>
             </a:r>
-            <a:endParaRPr lang="en-US" altLang="zh-CN" dirty="0" smtClean="0">
+            <a:endParaRPr lang="en-US" altLang="zh-CN" dirty="0">
               <a:solidFill>
                 <a:schemeClr val="tx1">
                   <a:lumMod val="75000"/>
@@ -3510,7 +3513,7 @@
               <a:buNone/>
             </a:pPr>
             <a:r>
-              <a:rPr lang="zh-CN" altLang="en-US" dirty="0" smtClean="0">
+              <a:rPr lang="zh-CN" altLang="en-US" dirty="0">
                 <a:solidFill>
                   <a:schemeClr val="tx1">
                     <a:lumMod val="75000"/>
@@ -3523,7 +3526,7 @@
               </a:rPr>
               <a:t>它综合运用了各种自然语言处理技术。自动问答在学术界得到了广泛关注，很多成果也被用于工业界中。</a:t>
             </a:r>
-            <a:endParaRPr lang="en-US" altLang="zh-CN" dirty="0" smtClean="0">
+            <a:endParaRPr lang="en-US" altLang="zh-CN" dirty="0">
               <a:solidFill>
                 <a:schemeClr val="tx1">
                   <a:lumMod val="75000"/>
@@ -3546,7 +3549,7 @@
               <a:buNone/>
             </a:pPr>
             <a:r>
-              <a:rPr lang="zh-CN" altLang="en-US" dirty="0" smtClean="0">
+              <a:rPr lang="zh-CN" altLang="en-US" dirty="0">
                 <a:solidFill>
                   <a:schemeClr val="tx1">
                     <a:lumMod val="75000"/>
@@ -3657,7 +3660,7 @@
               <a:buNone/>
             </a:pPr>
             <a:r>
-              <a:rPr lang="zh-CN" altLang="en-US" dirty="0" smtClean="0">
+              <a:rPr lang="zh-CN" altLang="en-US" dirty="0">
                 <a:solidFill>
                   <a:schemeClr val="tx1">
                     <a:lumMod val="75000"/>
@@ -3670,7 +3673,7 @@
               </a:rPr>
               <a:t>自动问答一直是自然语言处理领域一个十分热门的研究方向，</a:t>
             </a:r>
-            <a:endParaRPr lang="en-US" altLang="zh-CN" dirty="0" smtClean="0">
+            <a:endParaRPr lang="en-US" altLang="zh-CN" dirty="0">
               <a:solidFill>
                 <a:schemeClr val="tx1">
                   <a:lumMod val="75000"/>
@@ -3693,7 +3696,7 @@
               <a:buNone/>
             </a:pPr>
             <a:r>
-              <a:rPr lang="zh-CN" altLang="en-US" dirty="0" smtClean="0">
+              <a:rPr lang="zh-CN" altLang="en-US" dirty="0">
                 <a:solidFill>
                   <a:schemeClr val="tx1">
                     <a:lumMod val="75000"/>
@@ -3706,7 +3709,7 @@
               </a:rPr>
               <a:t>它综合运用了各种自然语言处理技术。自动问答在学术界得到了广泛关注，很多成果也被用于工业界中。</a:t>
             </a:r>
-            <a:endParaRPr lang="en-US" altLang="zh-CN" dirty="0" smtClean="0">
+            <a:endParaRPr lang="en-US" altLang="zh-CN" dirty="0">
               <a:solidFill>
                 <a:schemeClr val="tx1">
                   <a:lumMod val="75000"/>
@@ -3729,7 +3732,7 @@
               <a:buNone/>
             </a:pPr>
             <a:r>
-              <a:rPr lang="zh-CN" altLang="en-US" dirty="0" smtClean="0">
+              <a:rPr lang="zh-CN" altLang="en-US" dirty="0">
                 <a:solidFill>
                   <a:schemeClr val="tx1">
                     <a:lumMod val="75000"/>
@@ -3840,7 +3843,7 @@
               <a:buNone/>
             </a:pPr>
             <a:r>
-              <a:rPr lang="zh-CN" altLang="en-US" dirty="0" smtClean="0">
+              <a:rPr lang="zh-CN" altLang="en-US" dirty="0">
                 <a:solidFill>
                   <a:schemeClr val="tx1">
                     <a:lumMod val="75000"/>
@@ -3853,7 +3856,7 @@
               </a:rPr>
               <a:t>自动问答一直是自然语言处理领域一个十分热门的研究方向，</a:t>
             </a:r>
-            <a:endParaRPr lang="en-US" altLang="zh-CN" dirty="0" smtClean="0">
+            <a:endParaRPr lang="en-US" altLang="zh-CN" dirty="0">
               <a:solidFill>
                 <a:schemeClr val="tx1">
                   <a:lumMod val="75000"/>
@@ -3876,7 +3879,7 @@
               <a:buNone/>
             </a:pPr>
             <a:r>
-              <a:rPr lang="zh-CN" altLang="en-US" dirty="0" smtClean="0">
+              <a:rPr lang="zh-CN" altLang="en-US" dirty="0">
                 <a:solidFill>
                   <a:schemeClr val="tx1">
                     <a:lumMod val="75000"/>
@@ -3889,7 +3892,7 @@
               </a:rPr>
               <a:t>它综合运用了各种自然语言处理技术。自动问答在学术界得到了广泛关注，很多成果也被用于工业界中。</a:t>
             </a:r>
-            <a:endParaRPr lang="en-US" altLang="zh-CN" dirty="0" smtClean="0">
+            <a:endParaRPr lang="en-US" altLang="zh-CN" dirty="0">
               <a:solidFill>
                 <a:schemeClr val="tx1">
                   <a:lumMod val="75000"/>
@@ -3912,7 +3915,7 @@
               <a:buNone/>
             </a:pPr>
             <a:r>
-              <a:rPr lang="zh-CN" altLang="en-US" dirty="0" smtClean="0">
+              <a:rPr lang="zh-CN" altLang="en-US" dirty="0">
                 <a:solidFill>
                   <a:schemeClr val="tx1">
                     <a:lumMod val="75000"/>
@@ -4023,7 +4026,7 @@
               <a:buNone/>
             </a:pPr>
             <a:r>
-              <a:rPr lang="zh-CN" altLang="en-US" dirty="0" smtClean="0">
+              <a:rPr lang="zh-CN" altLang="en-US" dirty="0">
                 <a:solidFill>
                   <a:schemeClr val="tx1">
                     <a:lumMod val="75000"/>
@@ -4036,7 +4039,7 @@
               </a:rPr>
               <a:t>自动问答一直是自然语言处理领域一个十分热门的研究方向，</a:t>
             </a:r>
-            <a:endParaRPr lang="en-US" altLang="zh-CN" dirty="0" smtClean="0">
+            <a:endParaRPr lang="en-US" altLang="zh-CN" dirty="0">
               <a:solidFill>
                 <a:schemeClr val="tx1">
                   <a:lumMod val="75000"/>
@@ -4059,7 +4062,7 @@
               <a:buNone/>
             </a:pPr>
             <a:r>
-              <a:rPr lang="zh-CN" altLang="en-US" dirty="0" smtClean="0">
+              <a:rPr lang="zh-CN" altLang="en-US" dirty="0">
                 <a:solidFill>
                   <a:schemeClr val="tx1">
                     <a:lumMod val="75000"/>
@@ -4072,7 +4075,7 @@
               </a:rPr>
               <a:t>它综合运用了各种自然语言处理技术。自动问答在学术界得到了广泛关注，很多成果也被用于工业界中。</a:t>
             </a:r>
-            <a:endParaRPr lang="en-US" altLang="zh-CN" dirty="0" smtClean="0">
+            <a:endParaRPr lang="en-US" altLang="zh-CN" dirty="0">
               <a:solidFill>
                 <a:schemeClr val="tx1">
                   <a:lumMod val="75000"/>
@@ -4095,7 +4098,7 @@
               <a:buNone/>
             </a:pPr>
             <a:r>
-              <a:rPr lang="zh-CN" altLang="en-US" dirty="0" smtClean="0">
+              <a:rPr lang="zh-CN" altLang="en-US" dirty="0">
                 <a:solidFill>
                   <a:schemeClr val="tx1">
                     <a:lumMod val="75000"/>
@@ -4206,7 +4209,7 @@
               <a:buNone/>
             </a:pPr>
             <a:r>
-              <a:rPr lang="zh-CN" altLang="en-US" dirty="0" smtClean="0">
+              <a:rPr lang="zh-CN" altLang="en-US" dirty="0">
                 <a:solidFill>
                   <a:schemeClr val="tx1">
                     <a:lumMod val="75000"/>
@@ -4219,7 +4222,7 @@
               </a:rPr>
               <a:t>自动问答一直是自然语言处理领域一个十分热门的研究方向，</a:t>
             </a:r>
-            <a:endParaRPr lang="en-US" altLang="zh-CN" dirty="0" smtClean="0">
+            <a:endParaRPr lang="en-US" altLang="zh-CN" dirty="0">
               <a:solidFill>
                 <a:schemeClr val="tx1">
                   <a:lumMod val="75000"/>
@@ -4242,7 +4245,7 @@
               <a:buNone/>
             </a:pPr>
             <a:r>
-              <a:rPr lang="zh-CN" altLang="en-US" dirty="0" smtClean="0">
+              <a:rPr lang="zh-CN" altLang="en-US" dirty="0">
                 <a:solidFill>
                   <a:schemeClr val="tx1">
                     <a:lumMod val="75000"/>
@@ -4255,7 +4258,7 @@
               </a:rPr>
               <a:t>它综合运用了各种自然语言处理技术。自动问答在学术界得到了广泛关注，很多成果也被用于工业界中。</a:t>
             </a:r>
-            <a:endParaRPr lang="en-US" altLang="zh-CN" dirty="0" smtClean="0">
+            <a:endParaRPr lang="en-US" altLang="zh-CN" dirty="0">
               <a:solidFill>
                 <a:schemeClr val="tx1">
                   <a:lumMod val="75000"/>
@@ -4278,7 +4281,7 @@
               <a:buNone/>
             </a:pPr>
             <a:r>
-              <a:rPr lang="zh-CN" altLang="en-US" dirty="0" smtClean="0">
+              <a:rPr lang="zh-CN" altLang="en-US" dirty="0">
                 <a:solidFill>
                   <a:schemeClr val="tx1">
                     <a:lumMod val="75000"/>
@@ -4389,7 +4392,7 @@
               <a:buNone/>
             </a:pPr>
             <a:r>
-              <a:rPr lang="zh-CN" altLang="en-US" dirty="0" smtClean="0">
+              <a:rPr lang="zh-CN" altLang="en-US" dirty="0">
                 <a:solidFill>
                   <a:schemeClr val="tx1">
                     <a:lumMod val="75000"/>
@@ -4402,7 +4405,7 @@
               </a:rPr>
               <a:t>自动问答一直是自然语言处理领域一个十分热门的研究方向，</a:t>
             </a:r>
-            <a:endParaRPr lang="en-US" altLang="zh-CN" dirty="0" smtClean="0">
+            <a:endParaRPr lang="en-US" altLang="zh-CN" dirty="0">
               <a:solidFill>
                 <a:schemeClr val="tx1">
                   <a:lumMod val="75000"/>
@@ -4425,7 +4428,7 @@
               <a:buNone/>
             </a:pPr>
             <a:r>
-              <a:rPr lang="zh-CN" altLang="en-US" dirty="0" smtClean="0">
+              <a:rPr lang="zh-CN" altLang="en-US" dirty="0">
                 <a:solidFill>
                   <a:schemeClr val="tx1">
                     <a:lumMod val="75000"/>
@@ -4438,7 +4441,7 @@
               </a:rPr>
               <a:t>它综合运用了各种自然语言处理技术。自动问答在学术界得到了广泛关注，很多成果也被用于工业界中。</a:t>
             </a:r>
-            <a:endParaRPr lang="en-US" altLang="zh-CN" dirty="0" smtClean="0">
+            <a:endParaRPr lang="en-US" altLang="zh-CN" dirty="0">
               <a:solidFill>
                 <a:schemeClr val="tx1">
                   <a:lumMod val="75000"/>
@@ -4461,7 +4464,7 @@
               <a:buNone/>
             </a:pPr>
             <a:r>
-              <a:rPr lang="zh-CN" altLang="en-US" dirty="0" smtClean="0">
+              <a:rPr lang="zh-CN" altLang="en-US" dirty="0">
                 <a:solidFill>
                   <a:schemeClr val="tx1">
                     <a:lumMod val="75000"/>
@@ -4572,7 +4575,7 @@
               <a:buNone/>
             </a:pPr>
             <a:r>
-              <a:rPr lang="zh-CN" altLang="en-US" dirty="0" smtClean="0">
+              <a:rPr lang="zh-CN" altLang="en-US" dirty="0">
                 <a:solidFill>
                   <a:schemeClr val="tx1">
                     <a:lumMod val="75000"/>
@@ -4585,7 +4588,7 @@
               </a:rPr>
               <a:t>自动问答一直是自然语言处理领域一个十分热门的研究方向，</a:t>
             </a:r>
-            <a:endParaRPr lang="en-US" altLang="zh-CN" dirty="0" smtClean="0">
+            <a:endParaRPr lang="en-US" altLang="zh-CN" dirty="0">
               <a:solidFill>
                 <a:schemeClr val="tx1">
                   <a:lumMod val="75000"/>
@@ -4608,7 +4611,7 @@
               <a:buNone/>
             </a:pPr>
             <a:r>
-              <a:rPr lang="zh-CN" altLang="en-US" dirty="0" smtClean="0">
+              <a:rPr lang="zh-CN" altLang="en-US" dirty="0">
                 <a:solidFill>
                   <a:schemeClr val="tx1">
                     <a:lumMod val="75000"/>
@@ -4621,7 +4624,7 @@
               </a:rPr>
               <a:t>它综合运用了各种自然语言处理技术。自动问答在学术界得到了广泛关注，很多成果也被用于工业界中。</a:t>
             </a:r>
-            <a:endParaRPr lang="en-US" altLang="zh-CN" dirty="0" smtClean="0">
+            <a:endParaRPr lang="en-US" altLang="zh-CN" dirty="0">
               <a:solidFill>
                 <a:schemeClr val="tx1">
                   <a:lumMod val="75000"/>
@@ -4644,7 +4647,7 @@
               <a:buNone/>
             </a:pPr>
             <a:r>
-              <a:rPr lang="zh-CN" altLang="en-US" dirty="0" smtClean="0">
+              <a:rPr lang="zh-CN" altLang="en-US" dirty="0">
                 <a:solidFill>
                   <a:schemeClr val="tx1">
                     <a:lumMod val="75000"/>
@@ -4755,7 +4758,7 @@
               <a:buNone/>
             </a:pPr>
             <a:r>
-              <a:rPr lang="zh-CN" altLang="en-US" dirty="0" smtClean="0">
+              <a:rPr lang="zh-CN" altLang="en-US" dirty="0">
                 <a:solidFill>
                   <a:schemeClr val="tx1">
                     <a:lumMod val="75000"/>
@@ -4768,7 +4771,7 @@
               </a:rPr>
               <a:t>自动问答一直是自然语言处理领域一个十分热门的研究方向，</a:t>
             </a:r>
-            <a:endParaRPr lang="en-US" altLang="zh-CN" dirty="0" smtClean="0">
+            <a:endParaRPr lang="en-US" altLang="zh-CN" dirty="0">
               <a:solidFill>
                 <a:schemeClr val="tx1">
                   <a:lumMod val="75000"/>
@@ -4791,7 +4794,7 @@
               <a:buNone/>
             </a:pPr>
             <a:r>
-              <a:rPr lang="zh-CN" altLang="en-US" dirty="0" smtClean="0">
+              <a:rPr lang="zh-CN" altLang="en-US" dirty="0">
                 <a:solidFill>
                   <a:schemeClr val="tx1">
                     <a:lumMod val="75000"/>
@@ -4804,7 +4807,7 @@
               </a:rPr>
               <a:t>它综合运用了各种自然语言处理技术。自动问答在学术界得到了广泛关注，很多成果也被用于工业界中。</a:t>
             </a:r>
-            <a:endParaRPr lang="en-US" altLang="zh-CN" dirty="0" smtClean="0">
+            <a:endParaRPr lang="en-US" altLang="zh-CN" dirty="0">
               <a:solidFill>
                 <a:schemeClr val="tx1">
                   <a:lumMod val="75000"/>
@@ -4827,7 +4830,7 @@
               <a:buNone/>
             </a:pPr>
             <a:r>
-              <a:rPr lang="zh-CN" altLang="en-US" dirty="0" smtClean="0">
+              <a:rPr lang="zh-CN" altLang="en-US" dirty="0">
                 <a:solidFill>
                   <a:schemeClr val="tx1">
                     <a:lumMod val="75000"/>
@@ -4924,10 +4927,9 @@
           </a:lstStyle>
           <a:p>
             <a:r>
-              <a:rPr lang="zh-CN" altLang="en-US" smtClean="0"/>
+              <a:rPr lang="zh-CN" altLang="en-US"/>
               <a:t>单击此处编辑母版标题样式</a:t>
             </a:r>
-            <a:endParaRPr lang="zh-CN" altLang="en-US"/>
           </a:p>
         </p:txBody>
       </p:sp>
@@ -4989,10 +4991,9 @@
           </a:lstStyle>
           <a:p>
             <a:r>
-              <a:rPr lang="zh-CN" altLang="en-US" smtClean="0"/>
+              <a:rPr lang="zh-CN" altLang="en-US"/>
               <a:t>单击此处编辑母版副标题样式</a:t>
             </a:r>
-            <a:endParaRPr lang="zh-CN" altLang="en-US"/>
           </a:p>
         </p:txBody>
       </p:sp>
@@ -5013,7 +5014,7 @@
           <a:p>
             <a:fld id="{CF58F6F5-F0C6-4ABB-B9FB-470D5B157132}" type="datetimeFigureOut">
               <a:rPr lang="zh-CN" altLang="en-US" smtClean="0"/>
-              <a:t>2017/4/22</a:t>
+              <a:t>2017/6/10</a:t>
             </a:fld>
             <a:endParaRPr lang="zh-CN" altLang="en-US"/>
           </a:p>
@@ -5102,10 +5103,9 @@
           <a:lstStyle/>
           <a:p>
             <a:r>
-              <a:rPr lang="zh-CN" altLang="en-US" smtClean="0"/>
+              <a:rPr lang="zh-CN" altLang="en-US"/>
               <a:t>单击此处编辑母版标题样式</a:t>
             </a:r>
-            <a:endParaRPr lang="zh-CN" altLang="en-US"/>
           </a:p>
         </p:txBody>
       </p:sp>
@@ -5126,38 +5126,37 @@
           <a:p>
             <a:pPr lvl="0"/>
             <a:r>
-              <a:rPr lang="zh-CN" altLang="en-US" smtClean="0"/>
+              <a:rPr lang="zh-CN" altLang="en-US"/>
               <a:t>单击此处编辑母版文本样式</a:t>
             </a:r>
           </a:p>
           <a:p>
             <a:pPr lvl="1"/>
             <a:r>
-              <a:rPr lang="zh-CN" altLang="en-US" smtClean="0"/>
+              <a:rPr lang="zh-CN" altLang="en-US"/>
               <a:t>第二级</a:t>
             </a:r>
           </a:p>
           <a:p>
             <a:pPr lvl="2"/>
             <a:r>
-              <a:rPr lang="zh-CN" altLang="en-US" smtClean="0"/>
+              <a:rPr lang="zh-CN" altLang="en-US"/>
               <a:t>第三级</a:t>
             </a:r>
           </a:p>
           <a:p>
             <a:pPr lvl="3"/>
             <a:r>
-              <a:rPr lang="zh-CN" altLang="en-US" smtClean="0"/>
+              <a:rPr lang="zh-CN" altLang="en-US"/>
               <a:t>第四级</a:t>
             </a:r>
           </a:p>
           <a:p>
             <a:pPr lvl="4"/>
             <a:r>
-              <a:rPr lang="zh-CN" altLang="en-US" smtClean="0"/>
+              <a:rPr lang="zh-CN" altLang="en-US"/>
               <a:t>第五级</a:t>
             </a:r>
-            <a:endParaRPr lang="zh-CN" altLang="en-US"/>
           </a:p>
         </p:txBody>
       </p:sp>
@@ -5178,7 +5177,7 @@
           <a:p>
             <a:fld id="{CF58F6F5-F0C6-4ABB-B9FB-470D5B157132}" type="datetimeFigureOut">
               <a:rPr lang="zh-CN" altLang="en-US" smtClean="0"/>
-              <a:t>2017/4/22</a:t>
+              <a:t>2017/6/10</a:t>
             </a:fld>
             <a:endParaRPr lang="zh-CN" altLang="en-US"/>
           </a:p>
@@ -5272,10 +5271,9 @@
           <a:lstStyle/>
           <a:p>
             <a:r>
-              <a:rPr lang="zh-CN" altLang="en-US" smtClean="0"/>
+              <a:rPr lang="zh-CN" altLang="en-US"/>
               <a:t>单击此处编辑母版标题样式</a:t>
             </a:r>
-            <a:endParaRPr lang="zh-CN" altLang="en-US"/>
           </a:p>
         </p:txBody>
       </p:sp>
@@ -5301,38 +5299,37 @@
           <a:p>
             <a:pPr lvl="0"/>
             <a:r>
-              <a:rPr lang="zh-CN" altLang="en-US" smtClean="0"/>
+              <a:rPr lang="zh-CN" altLang="en-US"/>
               <a:t>单击此处编辑母版文本样式</a:t>
             </a:r>
           </a:p>
           <a:p>
             <a:pPr lvl="1"/>
             <a:r>
-              <a:rPr lang="zh-CN" altLang="en-US" smtClean="0"/>
+              <a:rPr lang="zh-CN" altLang="en-US"/>
               <a:t>第二级</a:t>
             </a:r>
           </a:p>
           <a:p>
             <a:pPr lvl="2"/>
             <a:r>
-              <a:rPr lang="zh-CN" altLang="en-US" smtClean="0"/>
+              <a:rPr lang="zh-CN" altLang="en-US"/>
               <a:t>第三级</a:t>
             </a:r>
           </a:p>
           <a:p>
             <a:pPr lvl="3"/>
             <a:r>
-              <a:rPr lang="zh-CN" altLang="en-US" smtClean="0"/>
+              <a:rPr lang="zh-CN" altLang="en-US"/>
               <a:t>第四级</a:t>
             </a:r>
           </a:p>
           <a:p>
             <a:pPr lvl="4"/>
             <a:r>
-              <a:rPr lang="zh-CN" altLang="en-US" smtClean="0"/>
+              <a:rPr lang="zh-CN" altLang="en-US"/>
               <a:t>第五级</a:t>
             </a:r>
-            <a:endParaRPr lang="zh-CN" altLang="en-US"/>
           </a:p>
         </p:txBody>
       </p:sp>
@@ -5353,7 +5350,7 @@
           <a:p>
             <a:fld id="{CF58F6F5-F0C6-4ABB-B9FB-470D5B157132}" type="datetimeFigureOut">
               <a:rPr lang="zh-CN" altLang="en-US" smtClean="0"/>
-              <a:t>2017/4/22</a:t>
+              <a:t>2017/6/10</a:t>
             </a:fld>
             <a:endParaRPr lang="zh-CN" altLang="en-US"/>
           </a:p>
@@ -5442,10 +5439,9 @@
           <a:lstStyle/>
           <a:p>
             <a:r>
-              <a:rPr lang="zh-CN" altLang="en-US" smtClean="0"/>
+              <a:rPr lang="zh-CN" altLang="en-US"/>
               <a:t>单击此处编辑母版标题样式</a:t>
             </a:r>
-            <a:endParaRPr lang="zh-CN" altLang="en-US"/>
           </a:p>
         </p:txBody>
       </p:sp>
@@ -5466,38 +5462,37 @@
           <a:p>
             <a:pPr lvl="0"/>
             <a:r>
-              <a:rPr lang="zh-CN" altLang="en-US" smtClean="0"/>
+              <a:rPr lang="zh-CN" altLang="en-US"/>
               <a:t>单击此处编辑母版文本样式</a:t>
             </a:r>
           </a:p>
           <a:p>
             <a:pPr lvl="1"/>
             <a:r>
-              <a:rPr lang="zh-CN" altLang="en-US" smtClean="0"/>
+              <a:rPr lang="zh-CN" altLang="en-US"/>
               <a:t>第二级</a:t>
             </a:r>
           </a:p>
           <a:p>
             <a:pPr lvl="2"/>
             <a:r>
-              <a:rPr lang="zh-CN" altLang="en-US" smtClean="0"/>
+              <a:rPr lang="zh-CN" altLang="en-US"/>
               <a:t>第三级</a:t>
             </a:r>
           </a:p>
           <a:p>
             <a:pPr lvl="3"/>
             <a:r>
-              <a:rPr lang="zh-CN" altLang="en-US" smtClean="0"/>
+              <a:rPr lang="zh-CN" altLang="en-US"/>
               <a:t>第四级</a:t>
             </a:r>
           </a:p>
           <a:p>
             <a:pPr lvl="4"/>
             <a:r>
-              <a:rPr lang="zh-CN" altLang="en-US" smtClean="0"/>
+              <a:rPr lang="zh-CN" altLang="en-US"/>
               <a:t>第五级</a:t>
             </a:r>
-            <a:endParaRPr lang="zh-CN" altLang="en-US"/>
           </a:p>
         </p:txBody>
       </p:sp>
@@ -5518,7 +5513,7 @@
           <a:p>
             <a:fld id="{CF58F6F5-F0C6-4ABB-B9FB-470D5B157132}" type="datetimeFigureOut">
               <a:rPr lang="zh-CN" altLang="en-US" smtClean="0"/>
-              <a:t>2017/4/22</a:t>
+              <a:t>2017/6/10</a:t>
             </a:fld>
             <a:endParaRPr lang="zh-CN" altLang="en-US"/>
           </a:p>
@@ -5616,10 +5611,9 @@
           </a:lstStyle>
           <a:p>
             <a:r>
-              <a:rPr lang="zh-CN" altLang="en-US" smtClean="0"/>
+              <a:rPr lang="zh-CN" altLang="en-US"/>
               <a:t>单击此处编辑母版标题样式</a:t>
             </a:r>
-            <a:endParaRPr lang="zh-CN" altLang="en-US"/>
           </a:p>
         </p:txBody>
       </p:sp>
@@ -5736,7 +5730,7 @@
           <a:p>
             <a:pPr lvl="0"/>
             <a:r>
-              <a:rPr lang="zh-CN" altLang="en-US" smtClean="0"/>
+              <a:rPr lang="zh-CN" altLang="en-US"/>
               <a:t>单击此处编辑母版文本样式</a:t>
             </a:r>
           </a:p>
@@ -5759,7 +5753,7 @@
           <a:p>
             <a:fld id="{CF58F6F5-F0C6-4ABB-B9FB-470D5B157132}" type="datetimeFigureOut">
               <a:rPr lang="zh-CN" altLang="en-US" smtClean="0"/>
-              <a:t>2017/4/22</a:t>
+              <a:t>2017/6/10</a:t>
             </a:fld>
             <a:endParaRPr lang="zh-CN" altLang="en-US"/>
           </a:p>
@@ -5848,10 +5842,9 @@
           <a:lstStyle/>
           <a:p>
             <a:r>
-              <a:rPr lang="zh-CN" altLang="en-US" smtClean="0"/>
+              <a:rPr lang="zh-CN" altLang="en-US"/>
               <a:t>单击此处编辑母版标题样式</a:t>
             </a:r>
-            <a:endParaRPr lang="zh-CN" altLang="en-US"/>
           </a:p>
         </p:txBody>
       </p:sp>
@@ -5877,38 +5870,37 @@
           <a:p>
             <a:pPr lvl="0"/>
             <a:r>
-              <a:rPr lang="zh-CN" altLang="en-US" smtClean="0"/>
+              <a:rPr lang="zh-CN" altLang="en-US"/>
               <a:t>单击此处编辑母版文本样式</a:t>
             </a:r>
           </a:p>
           <a:p>
             <a:pPr lvl="1"/>
             <a:r>
-              <a:rPr lang="zh-CN" altLang="en-US" smtClean="0"/>
+              <a:rPr lang="zh-CN" altLang="en-US"/>
               <a:t>第二级</a:t>
             </a:r>
           </a:p>
           <a:p>
             <a:pPr lvl="2"/>
             <a:r>
-              <a:rPr lang="zh-CN" altLang="en-US" smtClean="0"/>
+              <a:rPr lang="zh-CN" altLang="en-US"/>
               <a:t>第三级</a:t>
             </a:r>
           </a:p>
           <a:p>
             <a:pPr lvl="3"/>
             <a:r>
-              <a:rPr lang="zh-CN" altLang="en-US" smtClean="0"/>
+              <a:rPr lang="zh-CN" altLang="en-US"/>
               <a:t>第四级</a:t>
             </a:r>
           </a:p>
           <a:p>
             <a:pPr lvl="4"/>
             <a:r>
-              <a:rPr lang="zh-CN" altLang="en-US" smtClean="0"/>
+              <a:rPr lang="zh-CN" altLang="en-US"/>
               <a:t>第五级</a:t>
             </a:r>
-            <a:endParaRPr lang="zh-CN" altLang="en-US"/>
           </a:p>
         </p:txBody>
       </p:sp>
@@ -5934,38 +5926,37 @@
           <a:p>
             <a:pPr lvl="0"/>
             <a:r>
-              <a:rPr lang="zh-CN" altLang="en-US" smtClean="0"/>
+              <a:rPr lang="zh-CN" altLang="en-US"/>
               <a:t>单击此处编辑母版文本样式</a:t>
             </a:r>
           </a:p>
           <a:p>
             <a:pPr lvl="1"/>
             <a:r>
-              <a:rPr lang="zh-CN" altLang="en-US" smtClean="0"/>
+              <a:rPr lang="zh-CN" altLang="en-US"/>
               <a:t>第二级</a:t>
             </a:r>
           </a:p>
           <a:p>
             <a:pPr lvl="2"/>
             <a:r>
-              <a:rPr lang="zh-CN" altLang="en-US" smtClean="0"/>
+              <a:rPr lang="zh-CN" altLang="en-US"/>
               <a:t>第三级</a:t>
             </a:r>
           </a:p>
           <a:p>
             <a:pPr lvl="3"/>
             <a:r>
-              <a:rPr lang="zh-CN" altLang="en-US" smtClean="0"/>
+              <a:rPr lang="zh-CN" altLang="en-US"/>
               <a:t>第四级</a:t>
             </a:r>
           </a:p>
           <a:p>
             <a:pPr lvl="4"/>
             <a:r>
-              <a:rPr lang="zh-CN" altLang="en-US" smtClean="0"/>
+              <a:rPr lang="zh-CN" altLang="en-US"/>
               <a:t>第五级</a:t>
             </a:r>
-            <a:endParaRPr lang="zh-CN" altLang="en-US"/>
           </a:p>
         </p:txBody>
       </p:sp>
@@ -5986,7 +5977,7 @@
           <a:p>
             <a:fld id="{CF58F6F5-F0C6-4ABB-B9FB-470D5B157132}" type="datetimeFigureOut">
               <a:rPr lang="zh-CN" altLang="en-US" smtClean="0"/>
-              <a:t>2017/4/22</a:t>
+              <a:t>2017/6/10</a:t>
             </a:fld>
             <a:endParaRPr lang="zh-CN" altLang="en-US"/>
           </a:p>
@@ -6080,10 +6071,9 @@
           <a:lstStyle/>
           <a:p>
             <a:r>
-              <a:rPr lang="zh-CN" altLang="en-US" smtClean="0"/>
+              <a:rPr lang="zh-CN" altLang="en-US"/>
               <a:t>单击此处编辑母版标题样式</a:t>
             </a:r>
-            <a:endParaRPr lang="zh-CN" altLang="en-US"/>
           </a:p>
         </p:txBody>
       </p:sp>
@@ -6146,7 +6136,7 @@
           <a:p>
             <a:pPr lvl="0"/>
             <a:r>
-              <a:rPr lang="zh-CN" altLang="en-US" smtClean="0"/>
+              <a:rPr lang="zh-CN" altLang="en-US"/>
               <a:t>单击此处编辑母版文本样式</a:t>
             </a:r>
           </a:p>
@@ -6174,38 +6164,37 @@
           <a:p>
             <a:pPr lvl="0"/>
             <a:r>
-              <a:rPr lang="zh-CN" altLang="en-US" smtClean="0"/>
+              <a:rPr lang="zh-CN" altLang="en-US"/>
               <a:t>单击此处编辑母版文本样式</a:t>
             </a:r>
           </a:p>
           <a:p>
             <a:pPr lvl="1"/>
             <a:r>
-              <a:rPr lang="zh-CN" altLang="en-US" smtClean="0"/>
+              <a:rPr lang="zh-CN" altLang="en-US"/>
               <a:t>第二级</a:t>
             </a:r>
           </a:p>
           <a:p>
             <a:pPr lvl="2"/>
             <a:r>
-              <a:rPr lang="zh-CN" altLang="en-US" smtClean="0"/>
+              <a:rPr lang="zh-CN" altLang="en-US"/>
               <a:t>第三级</a:t>
             </a:r>
           </a:p>
           <a:p>
             <a:pPr lvl="3"/>
             <a:r>
-              <a:rPr lang="zh-CN" altLang="en-US" smtClean="0"/>
+              <a:rPr lang="zh-CN" altLang="en-US"/>
               <a:t>第四级</a:t>
             </a:r>
           </a:p>
           <a:p>
             <a:pPr lvl="4"/>
             <a:r>
-              <a:rPr lang="zh-CN" altLang="en-US" smtClean="0"/>
+              <a:rPr lang="zh-CN" altLang="en-US"/>
               <a:t>第五级</a:t>
             </a:r>
-            <a:endParaRPr lang="zh-CN" altLang="en-US"/>
           </a:p>
         </p:txBody>
       </p:sp>
@@ -6268,7 +6257,7 @@
           <a:p>
             <a:pPr lvl="0"/>
             <a:r>
-              <a:rPr lang="zh-CN" altLang="en-US" smtClean="0"/>
+              <a:rPr lang="zh-CN" altLang="en-US"/>
               <a:t>单击此处编辑母版文本样式</a:t>
             </a:r>
           </a:p>
@@ -6296,38 +6285,37 @@
           <a:p>
             <a:pPr lvl="0"/>
             <a:r>
-              <a:rPr lang="zh-CN" altLang="en-US" smtClean="0"/>
+              <a:rPr lang="zh-CN" altLang="en-US"/>
               <a:t>单击此处编辑母版文本样式</a:t>
             </a:r>
           </a:p>
           <a:p>
             <a:pPr lvl="1"/>
             <a:r>
-              <a:rPr lang="zh-CN" altLang="en-US" smtClean="0"/>
+              <a:rPr lang="zh-CN" altLang="en-US"/>
               <a:t>第二级</a:t>
             </a:r>
           </a:p>
           <a:p>
             <a:pPr lvl="2"/>
             <a:r>
-              <a:rPr lang="zh-CN" altLang="en-US" smtClean="0"/>
+              <a:rPr lang="zh-CN" altLang="en-US"/>
               <a:t>第三级</a:t>
             </a:r>
           </a:p>
           <a:p>
             <a:pPr lvl="3"/>
             <a:r>
-              <a:rPr lang="zh-CN" altLang="en-US" smtClean="0"/>
+              <a:rPr lang="zh-CN" altLang="en-US"/>
               <a:t>第四级</a:t>
             </a:r>
           </a:p>
           <a:p>
             <a:pPr lvl="4"/>
             <a:r>
-              <a:rPr lang="zh-CN" altLang="en-US" smtClean="0"/>
+              <a:rPr lang="zh-CN" altLang="en-US"/>
               <a:t>第五级</a:t>
             </a:r>
-            <a:endParaRPr lang="zh-CN" altLang="en-US"/>
           </a:p>
         </p:txBody>
       </p:sp>
@@ -6348,7 +6336,7 @@
           <a:p>
             <a:fld id="{CF58F6F5-F0C6-4ABB-B9FB-470D5B157132}" type="datetimeFigureOut">
               <a:rPr lang="zh-CN" altLang="en-US" smtClean="0"/>
-              <a:t>2017/4/22</a:t>
+              <a:t>2017/6/10</a:t>
             </a:fld>
             <a:endParaRPr lang="zh-CN" altLang="en-US"/>
           </a:p>
@@ -6437,10 +6425,9 @@
           <a:lstStyle/>
           <a:p>
             <a:r>
-              <a:rPr lang="zh-CN" altLang="en-US" smtClean="0"/>
+              <a:rPr lang="zh-CN" altLang="en-US"/>
               <a:t>单击此处编辑母版标题样式</a:t>
             </a:r>
-            <a:endParaRPr lang="zh-CN" altLang="en-US"/>
           </a:p>
         </p:txBody>
       </p:sp>
@@ -6461,7 +6448,7 @@
           <a:p>
             <a:fld id="{CF58F6F5-F0C6-4ABB-B9FB-470D5B157132}" type="datetimeFigureOut">
               <a:rPr lang="zh-CN" altLang="en-US" smtClean="0"/>
-              <a:t>2017/4/22</a:t>
+              <a:t>2017/6/10</a:t>
             </a:fld>
             <a:endParaRPr lang="zh-CN" altLang="en-US"/>
           </a:p>
@@ -6551,7 +6538,7 @@
           <a:p>
             <a:fld id="{CF58F6F5-F0C6-4ABB-B9FB-470D5B157132}" type="datetimeFigureOut">
               <a:rPr lang="zh-CN" altLang="en-US" smtClean="0"/>
-              <a:t>2017/4/22</a:t>
+              <a:t>2017/6/10</a:t>
             </a:fld>
             <a:endParaRPr lang="zh-CN" altLang="en-US"/>
           </a:p>
@@ -6649,10 +6636,9 @@
           </a:lstStyle>
           <a:p>
             <a:r>
-              <a:rPr lang="zh-CN" altLang="en-US" smtClean="0"/>
+              <a:rPr lang="zh-CN" altLang="en-US"/>
               <a:t>单击此处编辑母版标题样式</a:t>
             </a:r>
-            <a:endParaRPr lang="zh-CN" altLang="en-US"/>
           </a:p>
         </p:txBody>
       </p:sp>
@@ -6706,38 +6692,37 @@
           <a:p>
             <a:pPr lvl="0"/>
             <a:r>
-              <a:rPr lang="zh-CN" altLang="en-US" smtClean="0"/>
+              <a:rPr lang="zh-CN" altLang="en-US"/>
               <a:t>单击此处编辑母版文本样式</a:t>
             </a:r>
           </a:p>
           <a:p>
             <a:pPr lvl="1"/>
             <a:r>
-              <a:rPr lang="zh-CN" altLang="en-US" smtClean="0"/>
+              <a:rPr lang="zh-CN" altLang="en-US"/>
               <a:t>第二级</a:t>
             </a:r>
           </a:p>
           <a:p>
             <a:pPr lvl="2"/>
             <a:r>
-              <a:rPr lang="zh-CN" altLang="en-US" smtClean="0"/>
+              <a:rPr lang="zh-CN" altLang="en-US"/>
               <a:t>第三级</a:t>
             </a:r>
           </a:p>
           <a:p>
             <a:pPr lvl="3"/>
             <a:r>
-              <a:rPr lang="zh-CN" altLang="en-US" smtClean="0"/>
+              <a:rPr lang="zh-CN" altLang="en-US"/>
               <a:t>第四级</a:t>
             </a:r>
           </a:p>
           <a:p>
             <a:pPr lvl="4"/>
             <a:r>
-              <a:rPr lang="zh-CN" altLang="en-US" smtClean="0"/>
+              <a:rPr lang="zh-CN" altLang="en-US"/>
               <a:t>第五级</a:t>
             </a:r>
-            <a:endParaRPr lang="zh-CN" altLang="en-US"/>
           </a:p>
         </p:txBody>
       </p:sp>
@@ -6800,7 +6785,7 @@
           <a:p>
             <a:pPr lvl="0"/>
             <a:r>
-              <a:rPr lang="zh-CN" altLang="en-US" smtClean="0"/>
+              <a:rPr lang="zh-CN" altLang="en-US"/>
               <a:t>单击此处编辑母版文本样式</a:t>
             </a:r>
           </a:p>
@@ -6823,7 +6808,7 @@
           <a:p>
             <a:fld id="{CF58F6F5-F0C6-4ABB-B9FB-470D5B157132}" type="datetimeFigureOut">
               <a:rPr lang="zh-CN" altLang="en-US" smtClean="0"/>
-              <a:t>2017/4/22</a:t>
+              <a:t>2017/6/10</a:t>
             </a:fld>
             <a:endParaRPr lang="zh-CN" altLang="en-US"/>
           </a:p>
@@ -6921,10 +6906,9 @@
           </a:lstStyle>
           <a:p>
             <a:r>
-              <a:rPr lang="zh-CN" altLang="en-US" smtClean="0"/>
+              <a:rPr lang="zh-CN" altLang="en-US"/>
               <a:t>单击此处编辑母版标题样式</a:t>
             </a:r>
-            <a:endParaRPr lang="zh-CN" altLang="en-US"/>
           </a:p>
         </p:txBody>
       </p:sp>
@@ -7048,7 +7032,7 @@
           <a:p>
             <a:pPr lvl="0"/>
             <a:r>
-              <a:rPr lang="zh-CN" altLang="en-US" smtClean="0"/>
+              <a:rPr lang="zh-CN" altLang="en-US"/>
               <a:t>单击此处编辑母版文本样式</a:t>
             </a:r>
           </a:p>
@@ -7071,7 +7055,7 @@
           <a:p>
             <a:fld id="{CF58F6F5-F0C6-4ABB-B9FB-470D5B157132}" type="datetimeFigureOut">
               <a:rPr lang="zh-CN" altLang="en-US" smtClean="0"/>
-              <a:t>2017/4/22</a:t>
+              <a:t>2017/6/10</a:t>
             </a:fld>
             <a:endParaRPr lang="zh-CN" altLang="en-US"/>
           </a:p>
@@ -7175,10 +7159,9 @@
           <a:lstStyle/>
           <a:p>
             <a:r>
-              <a:rPr lang="zh-CN" altLang="en-US" smtClean="0"/>
+              <a:rPr lang="zh-CN" altLang="en-US"/>
               <a:t>单击此处编辑母版标题样式</a:t>
             </a:r>
-            <a:endParaRPr lang="zh-CN" altLang="en-US"/>
           </a:p>
         </p:txBody>
       </p:sp>
@@ -7209,38 +7192,37 @@
           <a:p>
             <a:pPr lvl="0"/>
             <a:r>
-              <a:rPr lang="zh-CN" altLang="en-US" smtClean="0"/>
+              <a:rPr lang="zh-CN" altLang="en-US"/>
               <a:t>单击此处编辑母版文本样式</a:t>
             </a:r>
           </a:p>
           <a:p>
             <a:pPr lvl="1"/>
             <a:r>
-              <a:rPr lang="zh-CN" altLang="en-US" smtClean="0"/>
+              <a:rPr lang="zh-CN" altLang="en-US"/>
               <a:t>第二级</a:t>
             </a:r>
           </a:p>
           <a:p>
             <a:pPr lvl="2"/>
             <a:r>
-              <a:rPr lang="zh-CN" altLang="en-US" smtClean="0"/>
+              <a:rPr lang="zh-CN" altLang="en-US"/>
               <a:t>第三级</a:t>
             </a:r>
           </a:p>
           <a:p>
             <a:pPr lvl="3"/>
             <a:r>
-              <a:rPr lang="zh-CN" altLang="en-US" smtClean="0"/>
+              <a:rPr lang="zh-CN" altLang="en-US"/>
               <a:t>第四级</a:t>
             </a:r>
           </a:p>
           <a:p>
             <a:pPr lvl="4"/>
             <a:r>
-              <a:rPr lang="zh-CN" altLang="en-US" smtClean="0"/>
+              <a:rPr lang="zh-CN" altLang="en-US"/>
               <a:t>第五级</a:t>
             </a:r>
-            <a:endParaRPr lang="zh-CN" altLang="en-US"/>
           </a:p>
         </p:txBody>
       </p:sp>
@@ -7279,7 +7261,7 @@
           <a:p>
             <a:fld id="{CF58F6F5-F0C6-4ABB-B9FB-470D5B157132}" type="datetimeFigureOut">
               <a:rPr lang="zh-CN" altLang="en-US" smtClean="0"/>
-              <a:t>2017/4/22</a:t>
+              <a:t>2017/6/10</a:t>
             </a:fld>
             <a:endParaRPr lang="zh-CN" altLang="en-US"/>
           </a:p>
@@ -7929,31 +7911,6 @@
           <a:p>
             <a:pPr algn="ctr"/>
             <a:r>
-              <a:rPr lang="zh-CN" altLang="en-US" sz="3600" dirty="0" smtClean="0">
-                <a:ln w="18415" cmpd="sng">
-                  <a:noFill/>
-                  <a:prstDash val="solid"/>
-                </a:ln>
-                <a:solidFill>
-                  <a:schemeClr val="tx1">
-                    <a:lumMod val="85000"/>
-                    <a:lumOff val="15000"/>
-                  </a:schemeClr>
-                </a:solidFill>
-                <a:effectLst>
-                  <a:outerShdw blurRad="50800" dist="38100" dir="2700000" algn="tl" rotWithShape="0">
-                    <a:prstClr val="black">
-                      <a:alpha val="40000"/>
-                    </a:prstClr>
-                  </a:outerShdw>
-                </a:effectLst>
-                <a:latin typeface="黑体" panose="02010609060101010101" pitchFamily="49" charset="-122"/>
-                <a:ea typeface="黑体" panose="02010609060101010101" pitchFamily="49" charset="-122"/>
-                <a:cs typeface="Aharoni" pitchFamily="2" charset="-79"/>
-              </a:rPr>
-              <a:t>毕业设计</a:t>
-            </a:r>
-            <a:r>
               <a:rPr lang="zh-CN" altLang="en-US" sz="3600" dirty="0">
                 <a:ln w="18415" cmpd="sng">
                   <a:noFill/>
@@ -7976,55 +7933,8 @@
                 <a:ea typeface="黑体" panose="02010609060101010101" pitchFamily="49" charset="-122"/>
                 <a:cs typeface="Aharoni" pitchFamily="2" charset="-79"/>
               </a:rPr>
-              <a:t>中期</a:t>
-            </a:r>
-            <a:r>
-              <a:rPr lang="zh-CN" altLang="en-US" sz="3600" dirty="0" smtClean="0">
-                <a:ln w="18415" cmpd="sng">
-                  <a:noFill/>
-                  <a:prstDash val="solid"/>
-                </a:ln>
-                <a:solidFill>
-                  <a:schemeClr val="tx1">
-                    <a:lumMod val="85000"/>
-                    <a:lumOff val="15000"/>
-                  </a:schemeClr>
-                </a:solidFill>
-                <a:effectLst>
-                  <a:outerShdw blurRad="50800" dist="38100" dir="2700000" algn="tl" rotWithShape="0">
-                    <a:prstClr val="black">
-                      <a:alpha val="40000"/>
-                    </a:prstClr>
-                  </a:outerShdw>
-                </a:effectLst>
-                <a:latin typeface="黑体" panose="02010609060101010101" pitchFamily="49" charset="-122"/>
-                <a:ea typeface="黑体" panose="02010609060101010101" pitchFamily="49" charset="-122"/>
-                <a:cs typeface="Aharoni" pitchFamily="2" charset="-79"/>
-              </a:rPr>
-              <a:t>报告</a:t>
-            </a:r>
-            <a:endParaRPr lang="zh-CN" altLang="en-US" sz="3600" dirty="0">
-              <a:ln w="18415" cmpd="sng">
-                <a:noFill/>
-                <a:prstDash val="solid"/>
-              </a:ln>
-              <a:solidFill>
-                <a:schemeClr val="tx1">
-                  <a:lumMod val="85000"/>
-                  <a:lumOff val="15000"/>
-                </a:schemeClr>
-              </a:solidFill>
-              <a:effectLst>
-                <a:outerShdw blurRad="50800" dist="38100" dir="2700000" algn="tl" rotWithShape="0">
-                  <a:prstClr val="black">
-                    <a:alpha val="40000"/>
-                  </a:prstClr>
-                </a:outerShdw>
-              </a:effectLst>
-              <a:latin typeface="黑体" panose="02010609060101010101" pitchFamily="49" charset="-122"/>
-              <a:ea typeface="黑体" panose="02010609060101010101" pitchFamily="49" charset="-122"/>
-              <a:cs typeface="Aharoni" pitchFamily="2" charset="-79"/>
-            </a:endParaRPr>
+              <a:t>毕业设计中期报告</a:t>
+            </a:r>
           </a:p>
         </p:txBody>
       </p:sp>
@@ -8051,7 +7961,7 @@
           <a:lstStyle/>
           <a:p>
             <a:r>
-              <a:rPr lang="zh-CN" altLang="en-US" sz="3200" dirty="0" smtClean="0">
+              <a:rPr lang="zh-CN" altLang="en-US" sz="3200" dirty="0">
                 <a:solidFill>
                   <a:schemeClr val="tx1">
                     <a:lumMod val="85000"/>
@@ -8063,7 +7973,7 @@
               </a:rPr>
               <a:t>姓名：周建宇</a:t>
             </a:r>
-            <a:endParaRPr lang="en-US" altLang="zh-CN" sz="3200" dirty="0" smtClean="0">
+            <a:endParaRPr lang="en-US" altLang="zh-CN" sz="3200" dirty="0">
               <a:solidFill>
                 <a:schemeClr val="tx1">
                   <a:lumMod val="85000"/>
@@ -8076,7 +7986,7 @@
           </a:p>
           <a:p>
             <a:r>
-              <a:rPr lang="zh-CN" altLang="en-US" sz="3200" dirty="0" smtClean="0">
+              <a:rPr lang="zh-CN" altLang="en-US" sz="3200" dirty="0">
                 <a:solidFill>
                   <a:schemeClr val="tx1">
                     <a:lumMod val="85000"/>
@@ -8089,7 +7999,7 @@
               <a:t>班级：计</a:t>
             </a:r>
             <a:r>
-              <a:rPr lang="en-US" altLang="zh-CN" sz="3200" dirty="0" smtClean="0">
+              <a:rPr lang="en-US" altLang="zh-CN" sz="3200" dirty="0">
                 <a:solidFill>
                   <a:schemeClr val="tx1">
                     <a:lumMod val="85000"/>
@@ -8114,23 +8024,10 @@
                 <a:latin typeface="隶书" panose="02010509060101010101" pitchFamily="49" charset="-122"/>
                 <a:ea typeface="隶书" panose="02010509060101010101" pitchFamily="49" charset="-122"/>
               </a:rPr>
-              <a:t>学</a:t>
-            </a:r>
-            <a:r>
-              <a:rPr lang="zh-CN" altLang="en-US" sz="3200" dirty="0" smtClean="0">
-                <a:solidFill>
-                  <a:schemeClr val="tx1">
-                    <a:lumMod val="85000"/>
-                    <a:lumOff val="15000"/>
-                  </a:schemeClr>
-                </a:solidFill>
-                <a:latin typeface="隶书" panose="02010509060101010101" pitchFamily="49" charset="-122"/>
-                <a:ea typeface="隶书" panose="02010509060101010101" pitchFamily="49" charset="-122"/>
-              </a:rPr>
-              <a:t>号：</a:t>
-            </a:r>
-            <a:r>
-              <a:rPr lang="en-US" altLang="zh-CN" sz="3200" dirty="0" smtClean="0">
+              <a:t>学号：</a:t>
+            </a:r>
+            <a:r>
+              <a:rPr lang="en-US" altLang="zh-CN" sz="3200" dirty="0">
                 <a:solidFill>
                   <a:schemeClr val="tx1">
                     <a:lumMod val="85000"/>
@@ -8145,7 +8042,7 @@
           </a:p>
           <a:p>
             <a:r>
-              <a:rPr lang="zh-CN" altLang="en-US" sz="3200" dirty="0" smtClean="0">
+              <a:rPr lang="zh-CN" altLang="en-US" sz="3200" dirty="0">
                 <a:solidFill>
                   <a:schemeClr val="tx1">
                     <a:lumMod val="85000"/>
@@ -8157,16 +8054,6 @@
               </a:rPr>
               <a:t>指导教师：徐华</a:t>
             </a:r>
-            <a:endParaRPr lang="zh-CN" altLang="en-US" sz="3200" dirty="0">
-              <a:solidFill>
-                <a:schemeClr val="tx1">
-                  <a:lumMod val="85000"/>
-                  <a:lumOff val="15000"/>
-                </a:schemeClr>
-              </a:solidFill>
-              <a:latin typeface="隶书" panose="02010509060101010101" pitchFamily="49" charset="-122"/>
-              <a:ea typeface="隶书" panose="02010509060101010101" pitchFamily="49" charset="-122"/>
-            </a:endParaRPr>
           </a:p>
         </p:txBody>
       </p:sp>
@@ -8242,7 +8129,7 @@
           <a:p>
             <a:pPr algn="ctr"/>
             <a:r>
-              <a:rPr lang="zh-CN" altLang="en-US" sz="4265" spc="400" dirty="0" smtClean="0">
+              <a:rPr lang="zh-CN" altLang="en-US" sz="4265" spc="400" dirty="0">
                 <a:ln w="18415" cmpd="sng">
                   <a:noFill/>
                   <a:prstDash val="solid"/>
@@ -8256,7 +8143,7 @@
               <a:t>基于双向</a:t>
             </a:r>
             <a:r>
-              <a:rPr lang="en-US" altLang="zh-CN" sz="4265" spc="400" dirty="0" smtClean="0">
+              <a:rPr lang="en-US" altLang="zh-CN" sz="4265" spc="400" dirty="0">
                 <a:ln w="18415" cmpd="sng">
                   <a:noFill/>
                   <a:prstDash val="solid"/>
@@ -8270,7 +8157,7 @@
               <a:t>attention</a:t>
             </a:r>
             <a:r>
-              <a:rPr lang="zh-CN" altLang="en-US" sz="4265" spc="400" dirty="0" smtClean="0">
+              <a:rPr lang="zh-CN" altLang="en-US" sz="4265" spc="400" dirty="0">
                 <a:ln w="18415" cmpd="sng">
                   <a:noFill/>
                   <a:prstDash val="solid"/>
@@ -8283,7 +8170,7 @@
               </a:rPr>
               <a:t>的中文问题</a:t>
             </a:r>
-            <a:endParaRPr lang="en-US" altLang="zh-CN" sz="4265" spc="400" dirty="0" smtClean="0">
+            <a:endParaRPr lang="en-US" altLang="zh-CN" sz="4265" spc="400" dirty="0">
               <a:ln w="18415" cmpd="sng">
                 <a:noFill/>
                 <a:prstDash val="solid"/>
@@ -8298,7 +8185,7 @@
           <a:p>
             <a:pPr algn="ctr"/>
             <a:r>
-              <a:rPr lang="zh-CN" altLang="en-US" sz="4265" spc="400" dirty="0" smtClean="0">
+              <a:rPr lang="zh-CN" altLang="en-US" sz="4265" spc="400" dirty="0">
                 <a:ln w="18415" cmpd="sng">
                   <a:noFill/>
                   <a:prstDash val="solid"/>
@@ -8311,17 +8198,6 @@
               </a:rPr>
               <a:t>答案抽取方法研究</a:t>
             </a:r>
-            <a:endParaRPr lang="zh-CN" altLang="en-US" sz="4265" spc="400" dirty="0">
-              <a:ln w="18415" cmpd="sng">
-                <a:noFill/>
-                <a:prstDash val="solid"/>
-              </a:ln>
-              <a:solidFill>
-                <a:schemeClr val="bg1"/>
-              </a:solidFill>
-              <a:latin typeface="微软雅黑" panose="020B0503020204020204" pitchFamily="34" charset="-122"/>
-              <a:ea typeface="微软雅黑" panose="020B0503020204020204" pitchFamily="34" charset="-122"/>
-            </a:endParaRPr>
           </a:p>
         </p:txBody>
       </p:sp>
@@ -8560,13 +8436,6 @@
   <p:clrMapOvr>
     <a:masterClrMapping/>
   </p:clrMapOvr>
-  <p:timing>
-    <p:tnLst>
-      <p:par>
-        <p:cTn id="1" dur="indefinite" restart="never" nodeType="tmRoot"/>
-      </p:par>
-    </p:tnLst>
-  </p:timing>
 </p:sld>
 </file>
 
@@ -8614,25 +8483,6 @@
               </a:spcBef>
             </a:pPr>
             <a:r>
-              <a:rPr lang="zh-CN" altLang="en-US" sz="4265" kern="0" dirty="0" smtClean="0">
-                <a:gradFill>
-                  <a:gsLst>
-                    <a:gs pos="0">
-                      <a:schemeClr val="tx1"/>
-                    </a:gs>
-                    <a:gs pos="86000">
-                      <a:schemeClr val="tx1"/>
-                    </a:gs>
-                  </a:gsLst>
-                  <a:lin ang="5400000" scaled="0"/>
-                </a:gradFill>
-                <a:latin typeface="微软雅黑" panose="020B0503020204020204" pitchFamily="34" charset="-122"/>
-                <a:ea typeface="微软雅黑" panose="020B0503020204020204" pitchFamily="34" charset="-122"/>
-                <a:cs typeface="Segoe UI" panose="020B0502040204020203" pitchFamily="34" charset="0"/>
-              </a:rPr>
-              <a:t>数据</a:t>
-            </a:r>
-            <a:r>
               <a:rPr lang="zh-CN" altLang="en-US" sz="4265" kern="0" dirty="0">
                 <a:gradFill>
                   <a:gsLst>
@@ -8649,7 +8499,7 @@
                 <a:ea typeface="微软雅黑" panose="020B0503020204020204" pitchFamily="34" charset="-122"/>
                 <a:cs typeface="Segoe UI" panose="020B0502040204020203" pitchFamily="34" charset="0"/>
               </a:rPr>
-              <a:t>预处理</a:t>
+              <a:t>数据预处理</a:t>
             </a:r>
             <a:endParaRPr lang="zh-CN" altLang="en-US" sz="4265" dirty="0">
               <a:solidFill>
@@ -8864,7 +8714,7 @@
             <a:pPr marL="457200" lvl="1" indent="0">
               <a:buNone/>
             </a:pPr>
-            <a:endParaRPr lang="en-US" altLang="zh-CN" sz="2800" dirty="0" smtClean="0">
+            <a:endParaRPr lang="en-US" altLang="zh-CN" sz="2800" dirty="0">
               <a:latin typeface="微软雅黑" panose="020B0503020204020204" pitchFamily="34" charset="-122"/>
               <a:ea typeface="微软雅黑" panose="020B0503020204020204" pitchFamily="34" charset="-122"/>
             </a:endParaRPr>
@@ -8924,16 +8774,9 @@
                 <a:latin typeface="微软雅黑" panose="020B0503020204020204" pitchFamily="34" charset="-122"/>
                 <a:ea typeface="微软雅黑" panose="020B0503020204020204" pitchFamily="34" charset="-122"/>
               </a:rPr>
-              <a:t>填空式疑问句</a:t>
-            </a:r>
-            <a:r>
-              <a:rPr lang="zh-CN" altLang="en-US" dirty="0" smtClean="0">
-                <a:latin typeface="微软雅黑" panose="020B0503020204020204" pitchFamily="34" charset="-122"/>
-                <a:ea typeface="微软雅黑" panose="020B0503020204020204" pitchFamily="34" charset="-122"/>
-              </a:rPr>
-              <a:t>生成</a:t>
-            </a:r>
-            <a:endParaRPr lang="en-US" altLang="zh-CN" sz="2800" dirty="0" smtClean="0">
+              <a:t>填空式疑问句生成</a:t>
+            </a:r>
+            <a:endParaRPr lang="en-US" altLang="zh-CN" sz="2800" dirty="0">
               <a:latin typeface="微软雅黑" panose="020B0503020204020204" pitchFamily="34" charset="-122"/>
               <a:ea typeface="微软雅黑" panose="020B0503020204020204" pitchFamily="34" charset="-122"/>
             </a:endParaRPr>
@@ -9245,25 +9088,6 @@
               </a:spcBef>
             </a:pPr>
             <a:r>
-              <a:rPr lang="zh-CN" altLang="en-US" sz="4265" kern="0" dirty="0" smtClean="0">
-                <a:gradFill>
-                  <a:gsLst>
-                    <a:gs pos="0">
-                      <a:schemeClr val="tx1"/>
-                    </a:gs>
-                    <a:gs pos="86000">
-                      <a:schemeClr val="tx1"/>
-                    </a:gs>
-                  </a:gsLst>
-                  <a:lin ang="5400000" scaled="0"/>
-                </a:gradFill>
-                <a:latin typeface="微软雅黑" panose="020B0503020204020204" pitchFamily="34" charset="-122"/>
-                <a:ea typeface="微软雅黑" panose="020B0503020204020204" pitchFamily="34" charset="-122"/>
-                <a:cs typeface="Segoe UI" panose="020B0502040204020203" pitchFamily="34" charset="0"/>
-              </a:rPr>
-              <a:t>数据</a:t>
-            </a:r>
-            <a:r>
               <a:rPr lang="zh-CN" altLang="en-US" sz="4265" kern="0" dirty="0">
                 <a:gradFill>
                   <a:gsLst>
@@ -9280,7 +9104,7 @@
                 <a:ea typeface="微软雅黑" panose="020B0503020204020204" pitchFamily="34" charset="-122"/>
                 <a:cs typeface="Segoe UI" panose="020B0502040204020203" pitchFamily="34" charset="0"/>
               </a:rPr>
-              <a:t>预处理</a:t>
+              <a:t>数据预处理</a:t>
             </a:r>
             <a:endParaRPr lang="zh-CN" altLang="en-US" sz="4265" dirty="0">
               <a:solidFill>
@@ -9404,7 +9228,7 @@
           <a:lstStyle/>
           <a:p>
             <a:pPr lvl="1"/>
-            <a:endParaRPr lang="en-US" altLang="zh-CN" dirty="0" smtClean="0">
+            <a:endParaRPr lang="en-US" altLang="zh-CN" dirty="0">
               <a:latin typeface="微软雅黑" panose="020B0503020204020204" pitchFamily="34" charset="-122"/>
               <a:ea typeface="微软雅黑" panose="020B0503020204020204" pitchFamily="34" charset="-122"/>
             </a:endParaRPr>
@@ -9456,13 +9280,13 @@
               <a:t>Unk</a:t>
             </a:r>
             <a:r>
-              <a:rPr lang="zh-CN" altLang="en-US" dirty="0" smtClean="0">
+              <a:rPr lang="zh-CN" altLang="en-US" dirty="0">
                 <a:latin typeface="微软雅黑" panose="020B0503020204020204" pitchFamily="34" charset="-122"/>
                 <a:ea typeface="微软雅黑" panose="020B0503020204020204" pitchFamily="34" charset="-122"/>
               </a:rPr>
               <a:t>标记</a:t>
             </a:r>
-            <a:endParaRPr lang="en-US" altLang="zh-CN" dirty="0" smtClean="0">
+            <a:endParaRPr lang="en-US" altLang="zh-CN" dirty="0">
               <a:latin typeface="微软雅黑" panose="020B0503020204020204" pitchFamily="34" charset="-122"/>
               <a:ea typeface="微软雅黑" panose="020B0503020204020204" pitchFamily="34" charset="-122"/>
             </a:endParaRPr>
@@ -9478,20 +9302,20 @@
           </a:p>
           <a:p>
             <a:r>
-              <a:rPr lang="en-US" altLang="zh-CN" dirty="0" err="1" smtClean="0">
+              <a:rPr lang="en-US" altLang="zh-CN" dirty="0" err="1">
                 <a:latin typeface="微软雅黑" panose="020B0503020204020204" pitchFamily="34" charset="-122"/>
                 <a:ea typeface="微软雅黑" panose="020B0503020204020204" pitchFamily="34" charset="-122"/>
               </a:rPr>
               <a:t>Json</a:t>
             </a:r>
             <a:r>
-              <a:rPr lang="zh-CN" altLang="en-US" dirty="0" smtClean="0">
+              <a:rPr lang="zh-CN" altLang="en-US" dirty="0">
                 <a:latin typeface="微软雅黑" panose="020B0503020204020204" pitchFamily="34" charset="-122"/>
                 <a:ea typeface="微软雅黑" panose="020B0503020204020204" pitchFamily="34" charset="-122"/>
               </a:rPr>
               <a:t>化</a:t>
             </a:r>
-            <a:endParaRPr lang="en-US" altLang="zh-CN" dirty="0" smtClean="0">
+            <a:endParaRPr lang="en-US" altLang="zh-CN" dirty="0">
               <a:latin typeface="微软雅黑" panose="020B0503020204020204" pitchFamily="34" charset="-122"/>
               <a:ea typeface="微软雅黑" panose="020B0503020204020204" pitchFamily="34" charset="-122"/>
             </a:endParaRPr>
@@ -9503,16 +9327,12 @@
               </a:lnSpc>
             </a:pPr>
             <a:r>
-              <a:rPr lang="en-US" altLang="zh-CN" dirty="0" smtClean="0">
+              <a:rPr lang="en-US" altLang="zh-CN" dirty="0">
                 <a:latin typeface="微软雅黑" panose="020B0503020204020204" pitchFamily="34" charset="-122"/>
                 <a:ea typeface="微软雅黑" panose="020B0503020204020204" pitchFamily="34" charset="-122"/>
               </a:rPr>
               <a:t>title</a:t>
             </a:r>
-            <a:endParaRPr lang="en-US" altLang="zh-CN" dirty="0">
-              <a:latin typeface="微软雅黑" panose="020B0503020204020204" pitchFamily="34" charset="-122"/>
-              <a:ea typeface="微软雅黑" panose="020B0503020204020204" pitchFamily="34" charset="-122"/>
-            </a:endParaRPr>
           </a:p>
           <a:p>
             <a:pPr lvl="1">
@@ -9521,16 +9341,12 @@
               </a:lnSpc>
             </a:pPr>
             <a:r>
-              <a:rPr lang="en-US" altLang="zh-CN" dirty="0" smtClean="0">
+              <a:rPr lang="en-US" altLang="zh-CN" dirty="0">
                 <a:latin typeface="微软雅黑" panose="020B0503020204020204" pitchFamily="34" charset="-122"/>
                 <a:ea typeface="微软雅黑" panose="020B0503020204020204" pitchFamily="34" charset="-122"/>
               </a:rPr>
               <a:t>context</a:t>
             </a:r>
-            <a:endParaRPr lang="en-US" altLang="zh-CN" dirty="0">
-              <a:latin typeface="微软雅黑" panose="020B0503020204020204" pitchFamily="34" charset="-122"/>
-              <a:ea typeface="微软雅黑" panose="020B0503020204020204" pitchFamily="34" charset="-122"/>
-            </a:endParaRPr>
           </a:p>
           <a:p>
             <a:pPr lvl="1">
@@ -9539,16 +9355,12 @@
               </a:lnSpc>
             </a:pPr>
             <a:r>
-              <a:rPr lang="en-US" altLang="zh-CN" dirty="0" smtClean="0">
+              <a:rPr lang="en-US" altLang="zh-CN" dirty="0">
                 <a:latin typeface="微软雅黑" panose="020B0503020204020204" pitchFamily="34" charset="-122"/>
                 <a:ea typeface="微软雅黑" panose="020B0503020204020204" pitchFamily="34" charset="-122"/>
               </a:rPr>
               <a:t>question</a:t>
             </a:r>
-            <a:endParaRPr lang="en-US" altLang="zh-CN" dirty="0">
-              <a:latin typeface="微软雅黑" panose="020B0503020204020204" pitchFamily="34" charset="-122"/>
-              <a:ea typeface="微软雅黑" panose="020B0503020204020204" pitchFamily="34" charset="-122"/>
-            </a:endParaRPr>
           </a:p>
           <a:p>
             <a:pPr lvl="1">
@@ -10354,7 +10166,7 @@
               <a:buChar char="•"/>
             </a:pPr>
             <a:r>
-              <a:rPr lang="zh-CN" altLang="en-US" sz="3200" dirty="0" smtClean="0">
+              <a:rPr lang="zh-CN" altLang="en-US" sz="3200" dirty="0">
                 <a:solidFill>
                   <a:schemeClr val="bg2">
                     <a:lumMod val="75000"/>
@@ -10654,7 +10466,7 @@
               </a:spcBef>
             </a:pPr>
             <a:r>
-              <a:rPr lang="zh-CN" altLang="en-US" sz="4265" kern="0" dirty="0" smtClean="0">
+              <a:rPr lang="zh-CN" altLang="en-US" sz="4265" kern="0" dirty="0">
                 <a:gradFill>
                   <a:gsLst>
                     <a:gs pos="0">
@@ -10794,82 +10606,75 @@
           <a:lstStyle/>
           <a:p>
             <a:r>
-              <a:rPr lang="zh-CN" altLang="en-US" dirty="0" smtClean="0">
+              <a:rPr lang="zh-CN" altLang="en-US" dirty="0">
                 <a:latin typeface="微软雅黑" panose="020B0503020204020204" pitchFamily="34" charset="-122"/>
                 <a:ea typeface="微软雅黑" panose="020B0503020204020204" pitchFamily="34" charset="-122"/>
               </a:rPr>
               <a:t>字符编码层（</a:t>
             </a:r>
             <a:r>
-              <a:rPr lang="en-US" altLang="zh-CN" dirty="0" smtClean="0">
+              <a:rPr lang="en-US" altLang="zh-CN" dirty="0">
                 <a:latin typeface="微软雅黑" panose="020B0503020204020204" pitchFamily="34" charset="-122"/>
                 <a:ea typeface="微软雅黑" panose="020B0503020204020204" pitchFamily="34" charset="-122"/>
               </a:rPr>
               <a:t>Character Embedding Layer</a:t>
             </a:r>
             <a:r>
-              <a:rPr lang="zh-CN" altLang="en-US" dirty="0" smtClean="0">
+              <a:rPr lang="zh-CN" altLang="en-US" dirty="0">
                 <a:latin typeface="微软雅黑" panose="020B0503020204020204" pitchFamily="34" charset="-122"/>
                 <a:ea typeface="微软雅黑" panose="020B0503020204020204" pitchFamily="34" charset="-122"/>
               </a:rPr>
               <a:t>）</a:t>
             </a:r>
-            <a:endParaRPr lang="en-US" altLang="zh-CN" sz="2800" dirty="0" smtClean="0">
+            <a:endParaRPr lang="en-US" altLang="zh-CN" sz="2800" dirty="0">
               <a:latin typeface="微软雅黑" panose="020B0503020204020204" pitchFamily="34" charset="-122"/>
               <a:ea typeface="微软雅黑" panose="020B0503020204020204" pitchFamily="34" charset="-122"/>
             </a:endParaRPr>
           </a:p>
           <a:p>
-            <a:r>
-              <a:rPr lang="zh-CN" altLang="en-US" dirty="0" smtClean="0">
-                <a:latin typeface="微软雅黑" panose="020B0503020204020204" pitchFamily="34" charset="-122"/>
-                <a:ea typeface="微软雅黑" panose="020B0503020204020204" pitchFamily="34" charset="-122"/>
-              </a:rPr>
-              <a:t>词语编码层</a:t>
-            </a:r>
             <a:r>
               <a:rPr lang="zh-CN" altLang="en-US" dirty="0">
                 <a:latin typeface="微软雅黑" panose="020B0503020204020204" pitchFamily="34" charset="-122"/>
                 <a:ea typeface="微软雅黑" panose="020B0503020204020204" pitchFamily="34" charset="-122"/>
               </a:rPr>
-              <a:t>（</a:t>
-            </a:r>
-            <a:r>
-              <a:rPr lang="en-US" altLang="zh-CN" dirty="0" smtClean="0">
+              <a:t>词语编码层（</a:t>
+            </a:r>
+            <a:r>
+              <a:rPr lang="en-US" altLang="zh-CN" dirty="0">
                 <a:latin typeface="微软雅黑" panose="020B0503020204020204" pitchFamily="34" charset="-122"/>
                 <a:ea typeface="微软雅黑" panose="020B0503020204020204" pitchFamily="34" charset="-122"/>
               </a:rPr>
               <a:t>Word Embedding Layer</a:t>
             </a:r>
             <a:r>
-              <a:rPr lang="zh-CN" altLang="en-US" dirty="0" smtClean="0">
+              <a:rPr lang="zh-CN" altLang="en-US" dirty="0">
                 <a:latin typeface="微软雅黑" panose="020B0503020204020204" pitchFamily="34" charset="-122"/>
                 <a:ea typeface="微软雅黑" panose="020B0503020204020204" pitchFamily="34" charset="-122"/>
               </a:rPr>
               <a:t>）</a:t>
             </a:r>
-            <a:endParaRPr lang="en-US" altLang="zh-CN" dirty="0" smtClean="0">
+            <a:endParaRPr lang="en-US" altLang="zh-CN" dirty="0">
               <a:latin typeface="微软雅黑" panose="020B0503020204020204" pitchFamily="34" charset="-122"/>
               <a:ea typeface="微软雅黑" panose="020B0503020204020204" pitchFamily="34" charset="-122"/>
             </a:endParaRPr>
           </a:p>
           <a:p>
             <a:r>
-              <a:rPr lang="zh-CN" altLang="en-US" dirty="0" smtClean="0">
+              <a:rPr lang="zh-CN" altLang="en-US" dirty="0">
                 <a:latin typeface="微软雅黑" panose="020B0503020204020204" pitchFamily="34" charset="-122"/>
                 <a:ea typeface="微软雅黑" panose="020B0503020204020204" pitchFamily="34" charset="-122"/>
               </a:rPr>
               <a:t>词组编码层（</a:t>
             </a:r>
             <a:r>
-              <a:rPr lang="en-US" altLang="zh-CN" dirty="0" smtClean="0">
+              <a:rPr lang="en-US" altLang="zh-CN" dirty="0">
                 <a:latin typeface="微软雅黑" panose="020B0503020204020204" pitchFamily="34" charset="-122"/>
                 <a:ea typeface="微软雅黑" panose="020B0503020204020204" pitchFamily="34" charset="-122"/>
               </a:rPr>
               <a:t>Phrase Embedding Layer</a:t>
             </a:r>
             <a:r>
-              <a:rPr lang="zh-CN" altLang="en-US" dirty="0" smtClean="0">
+              <a:rPr lang="zh-CN" altLang="en-US" dirty="0">
                 <a:latin typeface="微软雅黑" panose="020B0503020204020204" pitchFamily="34" charset="-122"/>
                 <a:ea typeface="微软雅黑" panose="020B0503020204020204" pitchFamily="34" charset="-122"/>
               </a:rPr>
@@ -10882,75 +10687,75 @@
           </a:p>
           <a:p>
             <a:r>
-              <a:rPr lang="zh-CN" altLang="en-US" dirty="0" smtClean="0">
+              <a:rPr lang="zh-CN" altLang="en-US" dirty="0">
                 <a:latin typeface="微软雅黑" panose="020B0503020204020204" pitchFamily="34" charset="-122"/>
                 <a:ea typeface="微软雅黑" panose="020B0503020204020204" pitchFamily="34" charset="-122"/>
               </a:rPr>
               <a:t>注意流层（</a:t>
             </a:r>
             <a:r>
-              <a:rPr lang="en-US" altLang="zh-CN" dirty="0" smtClean="0">
+              <a:rPr lang="en-US" altLang="zh-CN" dirty="0">
                 <a:latin typeface="微软雅黑" panose="020B0503020204020204" pitchFamily="34" charset="-122"/>
                 <a:ea typeface="微软雅黑" panose="020B0503020204020204" pitchFamily="34" charset="-122"/>
               </a:rPr>
               <a:t>Attention Flow Layer</a:t>
             </a:r>
             <a:r>
-              <a:rPr lang="zh-CN" altLang="en-US" dirty="0" smtClean="0">
+              <a:rPr lang="zh-CN" altLang="en-US" dirty="0">
                 <a:latin typeface="微软雅黑" panose="020B0503020204020204" pitchFamily="34" charset="-122"/>
                 <a:ea typeface="微软雅黑" panose="020B0503020204020204" pitchFamily="34" charset="-122"/>
               </a:rPr>
               <a:t>）</a:t>
             </a:r>
-            <a:endParaRPr lang="en-US" altLang="zh-CN" dirty="0" smtClean="0">
+            <a:endParaRPr lang="en-US" altLang="zh-CN" dirty="0">
               <a:latin typeface="微软雅黑" panose="020B0503020204020204" pitchFamily="34" charset="-122"/>
               <a:ea typeface="微软雅黑" panose="020B0503020204020204" pitchFamily="34" charset="-122"/>
             </a:endParaRPr>
           </a:p>
           <a:p>
             <a:r>
-              <a:rPr lang="zh-CN" altLang="en-US" sz="2800" dirty="0" smtClean="0">
+              <a:rPr lang="zh-CN" altLang="en-US" sz="2800" dirty="0">
                 <a:latin typeface="微软雅黑" panose="020B0503020204020204" pitchFamily="34" charset="-122"/>
                 <a:ea typeface="微软雅黑" panose="020B0503020204020204" pitchFamily="34" charset="-122"/>
               </a:rPr>
               <a:t>模型层（</a:t>
             </a:r>
             <a:r>
-              <a:rPr lang="en-US" altLang="zh-CN" sz="2800" dirty="0" smtClean="0">
+              <a:rPr lang="en-US" altLang="zh-CN" sz="2800" dirty="0">
                 <a:latin typeface="微软雅黑" panose="020B0503020204020204" pitchFamily="34" charset="-122"/>
                 <a:ea typeface="微软雅黑" panose="020B0503020204020204" pitchFamily="34" charset="-122"/>
               </a:rPr>
               <a:t>Modeling Layer</a:t>
             </a:r>
             <a:r>
-              <a:rPr lang="zh-CN" altLang="en-US" sz="2800" dirty="0" smtClean="0">
+              <a:rPr lang="zh-CN" altLang="en-US" sz="2800" dirty="0">
                 <a:latin typeface="微软雅黑" panose="020B0503020204020204" pitchFamily="34" charset="-122"/>
                 <a:ea typeface="微软雅黑" panose="020B0503020204020204" pitchFamily="34" charset="-122"/>
               </a:rPr>
               <a:t>）</a:t>
             </a:r>
-            <a:endParaRPr lang="en-US" altLang="zh-CN" sz="2800" dirty="0" smtClean="0">
+            <a:endParaRPr lang="en-US" altLang="zh-CN" sz="2800" dirty="0">
               <a:latin typeface="微软雅黑" panose="020B0503020204020204" pitchFamily="34" charset="-122"/>
               <a:ea typeface="微软雅黑" panose="020B0503020204020204" pitchFamily="34" charset="-122"/>
             </a:endParaRPr>
           </a:p>
           <a:p>
             <a:r>
-              <a:rPr lang="zh-CN" altLang="en-US" dirty="0" smtClean="0">
+              <a:rPr lang="zh-CN" altLang="en-US" dirty="0">
                 <a:latin typeface="微软雅黑" panose="020B0503020204020204" pitchFamily="34" charset="-122"/>
                 <a:ea typeface="微软雅黑" panose="020B0503020204020204" pitchFamily="34" charset="-122"/>
               </a:rPr>
               <a:t>输出层（</a:t>
             </a:r>
             <a:r>
-              <a:rPr lang="en-US" altLang="zh-CN" dirty="0" smtClean="0">
+              <a:rPr lang="en-US" altLang="zh-CN" dirty="0">
                 <a:latin typeface="微软雅黑" panose="020B0503020204020204" pitchFamily="34" charset="-122"/>
                 <a:ea typeface="微软雅黑" panose="020B0503020204020204" pitchFamily="34" charset="-122"/>
               </a:rPr>
               <a:t>Output Layer</a:t>
             </a:r>
             <a:r>
-              <a:rPr lang="zh-CN" altLang="en-US" dirty="0" smtClean="0">
+              <a:rPr lang="zh-CN" altLang="en-US" dirty="0">
                 <a:latin typeface="微软雅黑" panose="020B0503020204020204" pitchFamily="34" charset="-122"/>
                 <a:ea typeface="微软雅黑" panose="020B0503020204020204" pitchFamily="34" charset="-122"/>
               </a:rPr>
@@ -11437,7 +11242,7 @@
               </a:spcBef>
             </a:pPr>
             <a:r>
-              <a:rPr lang="zh-CN" altLang="en-US" sz="4265" kern="0" dirty="0" smtClean="0">
+              <a:rPr lang="zh-CN" altLang="en-US" sz="4265" kern="0" dirty="0">
                 <a:gradFill>
                   <a:gsLst>
                     <a:gs pos="0">
@@ -11579,7 +11384,7 @@
               <a:lstStyle/>
               <a:p>
                 <a:r>
-                  <a:rPr lang="en-US" altLang="zh-CN" dirty="0" smtClean="0">
+                  <a:rPr lang="en-US" altLang="zh-CN" dirty="0">
                     <a:latin typeface="微软雅黑" panose="020B0503020204020204" pitchFamily="34" charset="-122"/>
                     <a:ea typeface="微软雅黑" panose="020B0503020204020204" pitchFamily="34" charset="-122"/>
                   </a:rPr>
@@ -11763,7 +11568,7 @@
                     </m:sSup>
                   </m:oMath>
                 </a14:m>
-                <a:endParaRPr lang="en-US" altLang="zh-CN" dirty="0" smtClean="0">
+                <a:endParaRPr lang="en-US" altLang="zh-CN" dirty="0">
                   <a:latin typeface="微软雅黑" panose="020B0503020204020204" pitchFamily="34" charset="-122"/>
                   <a:ea typeface="微软雅黑" panose="020B0503020204020204" pitchFamily="34" charset="-122"/>
                 </a:endParaRPr>
@@ -11935,13 +11740,13 @@
                     </m:sSup>
                   </m:oMath>
                 </a14:m>
-                <a:endParaRPr lang="en-US" altLang="zh-CN" dirty="0" smtClean="0">
+                <a:endParaRPr lang="en-US" altLang="zh-CN" dirty="0">
                   <a:latin typeface="微软雅黑" panose="020B0503020204020204" pitchFamily="34" charset="-122"/>
                   <a:ea typeface="Cambria Math" panose="02040503050406030204" pitchFamily="18" charset="0"/>
                 </a:endParaRPr>
               </a:p>
               <a:p>
-                <a:endParaRPr lang="en-US" altLang="zh-CN" b="0" i="1" dirty="0" smtClean="0">
+                <a:endParaRPr lang="en-US" altLang="zh-CN" b="0" i="1" dirty="0">
                   <a:latin typeface="Cambria Math" panose="02040503050406030204" pitchFamily="18" charset="0"/>
                   <a:ea typeface="微软雅黑" panose="020B0503020204020204" pitchFamily="34" charset="-122"/>
                 </a:endParaRPr>
@@ -11952,16 +11757,9 @@
                     <a:latin typeface="微软雅黑" panose="020B0503020204020204" pitchFamily="34" charset="-122"/>
                     <a:ea typeface="微软雅黑" panose="020B0503020204020204" pitchFamily="34" charset="-122"/>
                   </a:rPr>
-                  <a:t>Phrase embedding </a:t>
+                  <a:t>Phrase embedding Layer</a:t>
                 </a:r>
-                <a:r>
-                  <a:rPr lang="en-US" altLang="zh-CN" dirty="0" smtClean="0">
-                    <a:latin typeface="微软雅黑" panose="020B0503020204020204" pitchFamily="34" charset="-122"/>
-                    <a:ea typeface="微软雅黑" panose="020B0503020204020204" pitchFamily="34" charset="-122"/>
-                  </a:rPr>
-                  <a:t>Layer</a:t>
-                </a:r>
-                <a:endParaRPr lang="en-US" altLang="zh-CN" dirty="0" smtClean="0">
+                <a:endParaRPr lang="en-US" altLang="zh-CN" dirty="0">
                   <a:latin typeface="Cambria Math" panose="02040503050406030204" pitchFamily="18" charset="0"/>
                   <a:ea typeface="微软雅黑" panose="020B0503020204020204" pitchFamily="34" charset="-122"/>
                 </a:endParaRPr>
@@ -12087,7 +11885,7 @@
                     </m:sSup>
                   </m:oMath>
                 </a14:m>
-                <a:endParaRPr lang="en-US" altLang="zh-CN" b="0" i="1" dirty="0" smtClean="0">
+                <a:endParaRPr lang="en-US" altLang="zh-CN" b="0" i="1" dirty="0">
                   <a:latin typeface="Cambria Math" panose="02040503050406030204" pitchFamily="18" charset="0"/>
                   <a:ea typeface="微软雅黑" panose="020B0503020204020204" pitchFamily="34" charset="-122"/>
                 </a:endParaRPr>
@@ -12213,7 +12011,7 @@
                     </m:sSup>
                   </m:oMath>
                 </a14:m>
-                <a:endParaRPr lang="en-US" altLang="zh-CN" dirty="0" smtClean="0">
+                <a:endParaRPr lang="en-US" altLang="zh-CN" dirty="0">
                   <a:latin typeface="微软雅黑" panose="020B0503020204020204" pitchFamily="34" charset="-122"/>
                   <a:ea typeface="微软雅黑" panose="020B0503020204020204" pitchFamily="34" charset="-122"/>
                 </a:endParaRPr>
@@ -12222,20 +12020,20 @@
                 <a:pPr marL="0" indent="0">
                   <a:buNone/>
                 </a:pPr>
-                <a:endParaRPr lang="en-US" altLang="zh-CN" b="0" dirty="0" smtClean="0">
+                <a:endParaRPr lang="en-US" altLang="zh-CN" b="0" dirty="0">
                   <a:latin typeface="微软雅黑" panose="020B0503020204020204" pitchFamily="34" charset="-122"/>
                   <a:ea typeface="微软雅黑" panose="020B0503020204020204" pitchFamily="34" charset="-122"/>
                 </a:endParaRPr>
               </a:p>
               <a:p>
                 <a:pPr lvl="1"/>
-                <a:endParaRPr lang="en-US" altLang="zh-CN" dirty="0" smtClean="0">
+                <a:endParaRPr lang="en-US" altLang="zh-CN" dirty="0">
                   <a:latin typeface="微软雅黑" panose="020B0503020204020204" pitchFamily="34" charset="-122"/>
                   <a:ea typeface="微软雅黑" panose="020B0503020204020204" pitchFamily="34" charset="-122"/>
                 </a:endParaRPr>
               </a:p>
               <a:p>
-                <a:endParaRPr lang="en-US" altLang="zh-CN" dirty="0" smtClean="0">
+                <a:endParaRPr lang="en-US" altLang="zh-CN" dirty="0">
                   <a:latin typeface="微软雅黑" panose="020B0503020204020204" pitchFamily="34" charset="-122"/>
                   <a:ea typeface="微软雅黑" panose="020B0503020204020204" pitchFamily="34" charset="-122"/>
                 </a:endParaRPr>
@@ -12677,7 +12475,7 @@
               </a:spcBef>
             </a:pPr>
             <a:r>
-              <a:rPr lang="zh-CN" altLang="en-US" sz="4265" kern="0" dirty="0" smtClean="0">
+              <a:rPr lang="zh-CN" altLang="en-US" sz="4265" kern="0" dirty="0">
                 <a:gradFill>
                   <a:gsLst>
                     <a:gs pos="0">
@@ -12819,7 +12617,7 @@
               <a:lstStyle/>
               <a:p>
                 <a:r>
-                  <a:rPr lang="en-US" altLang="zh-CN" dirty="0" smtClean="0">
+                  <a:rPr lang="en-US" altLang="zh-CN" dirty="0">
                     <a:latin typeface="微软雅黑" panose="020B0503020204020204" pitchFamily="34" charset="-122"/>
                     <a:ea typeface="微软雅黑" panose="020B0503020204020204" pitchFamily="34" charset="-122"/>
                   </a:rPr>
@@ -13071,14 +12869,14 @@
                     </m:r>
                   </m:oMath>
                 </a14:m>
-                <a:endParaRPr lang="en-US" altLang="zh-CN" b="0" dirty="0" smtClean="0">
+                <a:endParaRPr lang="en-US" altLang="zh-CN" b="0" dirty="0">
                   <a:latin typeface="微软雅黑" panose="020B0503020204020204" pitchFamily="34" charset="-122"/>
                   <a:ea typeface="Cambria Math" panose="02040503050406030204" pitchFamily="18" charset="0"/>
                 </a:endParaRPr>
               </a:p>
               <a:p>
                 <a:pPr lvl="1"/>
-                <a:endParaRPr lang="en-US" altLang="zh-CN" b="0" dirty="0" smtClean="0">
+                <a:endParaRPr lang="en-US" altLang="zh-CN" b="0" dirty="0">
                   <a:latin typeface="微软雅黑" panose="020B0503020204020204" pitchFamily="34" charset="-122"/>
                   <a:ea typeface="Cambria Math" panose="02040503050406030204" pitchFamily="18" charset="0"/>
                 </a:endParaRPr>
@@ -13455,14 +13253,14 @@
                     </m:sSup>
                   </m:oMath>
                 </a14:m>
-                <a:endParaRPr lang="en-US" altLang="zh-CN" b="0" dirty="0" smtClean="0">
+                <a:endParaRPr lang="en-US" altLang="zh-CN" b="0" dirty="0">
                   <a:latin typeface="微软雅黑" panose="020B0503020204020204" pitchFamily="34" charset="-122"/>
                   <a:ea typeface="Cambria Math" panose="02040503050406030204" pitchFamily="18" charset="0"/>
                 </a:endParaRPr>
               </a:p>
               <a:p>
                 <a:pPr lvl="1"/>
-                <a:endParaRPr lang="en-US" altLang="zh-CN" dirty="0" smtClean="0">
+                <a:endParaRPr lang="en-US" altLang="zh-CN" dirty="0">
                   <a:latin typeface="微软雅黑" panose="020B0503020204020204" pitchFamily="34" charset="-122"/>
                   <a:ea typeface="微软雅黑" panose="020B0503020204020204" pitchFamily="34" charset="-122"/>
                 </a:endParaRPr>
@@ -13795,14 +13593,14 @@
                     </m:nary>
                   </m:oMath>
                 </a14:m>
-                <a:endParaRPr lang="en-US" altLang="zh-CN" b="0" dirty="0" smtClean="0">
+                <a:endParaRPr lang="en-US" altLang="zh-CN" b="0" dirty="0">
                   <a:latin typeface="微软雅黑" panose="020B0503020204020204" pitchFamily="34" charset="-122"/>
                   <a:ea typeface="微软雅黑" panose="020B0503020204020204" pitchFamily="34" charset="-122"/>
                 </a:endParaRPr>
               </a:p>
               <a:p>
                 <a:pPr lvl="1"/>
-                <a:endParaRPr lang="en-US" altLang="zh-CN" b="0" dirty="0" smtClean="0">
+                <a:endParaRPr lang="en-US" altLang="zh-CN" b="0" dirty="0">
                   <a:latin typeface="微软雅黑" panose="020B0503020204020204" pitchFamily="34" charset="-122"/>
                   <a:ea typeface="微软雅黑" panose="020B0503020204020204" pitchFamily="34" charset="-122"/>
                 </a:endParaRPr>
@@ -13810,7 +13608,7 @@
               <a:p>
                 <a:pPr lvl="1"/>
                 <a:r>
-                  <a:rPr lang="en-US" altLang="zh-CN" b="0" dirty="0" smtClean="0">
+                  <a:rPr lang="en-US" altLang="zh-CN" b="0" dirty="0">
                     <a:ea typeface="微软雅黑" panose="020B0503020204020204" pitchFamily="34" charset="-122"/>
                   </a:rPr>
                   <a:t>C</a:t>
@@ -14359,26 +14157,26 @@
                     </m:r>
                   </m:oMath>
                 </a14:m>
-                <a:endParaRPr lang="en-US" altLang="zh-CN" dirty="0" smtClean="0">
+                <a:endParaRPr lang="en-US" altLang="zh-CN" dirty="0">
                   <a:latin typeface="微软雅黑" panose="020B0503020204020204" pitchFamily="34" charset="-122"/>
                   <a:ea typeface="微软雅黑" panose="020B0503020204020204" pitchFamily="34" charset="-122"/>
                 </a:endParaRPr>
               </a:p>
               <a:p>
-                <a:endParaRPr lang="en-US" altLang="zh-CN" b="0" dirty="0" smtClean="0">
+                <a:endParaRPr lang="en-US" altLang="zh-CN" b="0" dirty="0">
                   <a:latin typeface="微软雅黑" panose="020B0503020204020204" pitchFamily="34" charset="-122"/>
                   <a:ea typeface="微软雅黑" panose="020B0503020204020204" pitchFamily="34" charset="-122"/>
                 </a:endParaRPr>
               </a:p>
               <a:p>
                 <a:pPr lvl="1"/>
-                <a:endParaRPr lang="en-US" altLang="zh-CN" dirty="0" smtClean="0">
+                <a:endParaRPr lang="en-US" altLang="zh-CN" dirty="0">
                   <a:latin typeface="微软雅黑" panose="020B0503020204020204" pitchFamily="34" charset="-122"/>
                   <a:ea typeface="微软雅黑" panose="020B0503020204020204" pitchFamily="34" charset="-122"/>
                 </a:endParaRPr>
               </a:p>
               <a:p>
-                <a:endParaRPr lang="en-US" altLang="zh-CN" dirty="0" smtClean="0">
+                <a:endParaRPr lang="en-US" altLang="zh-CN" dirty="0">
                   <a:latin typeface="微软雅黑" panose="020B0503020204020204" pitchFamily="34" charset="-122"/>
                   <a:ea typeface="微软雅黑" panose="020B0503020204020204" pitchFamily="34" charset="-122"/>
                 </a:endParaRPr>
@@ -14759,7 +14557,7 @@
               </a:spcBef>
             </a:pPr>
             <a:r>
-              <a:rPr lang="zh-CN" altLang="en-US" sz="4265" kern="0" dirty="0" smtClean="0">
+              <a:rPr lang="zh-CN" altLang="en-US" sz="4265" kern="0" dirty="0">
                 <a:gradFill>
                   <a:gsLst>
                     <a:gs pos="0">
@@ -14901,25 +14699,11 @@
               <a:lstStyle/>
               <a:p>
                 <a:r>
-                  <a:rPr lang="en-US" altLang="zh-CN" dirty="0" smtClean="0">
-                    <a:latin typeface="微软雅黑" panose="020B0503020204020204" pitchFamily="34" charset="-122"/>
-                    <a:ea typeface="微软雅黑" panose="020B0503020204020204" pitchFamily="34" charset="-122"/>
-                  </a:rPr>
-                  <a:t>Modeling</a:t>
-                </a:r>
-                <a:r>
                   <a:rPr lang="en-US" altLang="zh-CN" dirty="0">
                     <a:latin typeface="微软雅黑" panose="020B0503020204020204" pitchFamily="34" charset="-122"/>
                     <a:ea typeface="微软雅黑" panose="020B0503020204020204" pitchFamily="34" charset="-122"/>
                   </a:rPr>
-                  <a:t> </a:t>
-                </a:r>
-                <a:r>
-                  <a:rPr lang="en-US" altLang="zh-CN" dirty="0" smtClean="0">
-                    <a:latin typeface="微软雅黑" panose="020B0503020204020204" pitchFamily="34" charset="-122"/>
-                    <a:ea typeface="微软雅黑" panose="020B0503020204020204" pitchFamily="34" charset="-122"/>
-                  </a:rPr>
-                  <a:t>Layer</a:t>
+                  <a:t>Modeling Layer</a:t>
                 </a:r>
               </a:p>
               <a:p>
@@ -15046,27 +14830,27 @@
                     </m:sSup>
                   </m:oMath>
                 </a14:m>
-                <a:endParaRPr lang="en-US" altLang="zh-CN" dirty="0" smtClean="0">
+                <a:endParaRPr lang="en-US" altLang="zh-CN" dirty="0">
                   <a:latin typeface="微软雅黑" panose="020B0503020204020204" pitchFamily="34" charset="-122"/>
                   <a:ea typeface="微软雅黑" panose="020B0503020204020204" pitchFamily="34" charset="-122"/>
                 </a:endParaRPr>
               </a:p>
               <a:p>
                 <a:pPr lvl="1"/>
-                <a:endParaRPr lang="en-US" altLang="zh-CN" dirty="0" smtClean="0">
+                <a:endParaRPr lang="en-US" altLang="zh-CN" dirty="0">
                   <a:latin typeface="微软雅黑" panose="020B0503020204020204" pitchFamily="34" charset="-122"/>
                   <a:ea typeface="微软雅黑" panose="020B0503020204020204" pitchFamily="34" charset="-122"/>
                 </a:endParaRPr>
               </a:p>
               <a:p>
                 <a:r>
-                  <a:rPr lang="en-US" altLang="zh-CN" dirty="0" smtClean="0">
+                  <a:rPr lang="en-US" altLang="zh-CN" dirty="0">
                     <a:latin typeface="微软雅黑" panose="020B0503020204020204" pitchFamily="34" charset="-122"/>
                     <a:ea typeface="微软雅黑" panose="020B0503020204020204" pitchFamily="34" charset="-122"/>
                   </a:rPr>
                   <a:t>Output Layer: </a:t>
                 </a:r>
-                <a:endParaRPr lang="en-US" altLang="zh-CN" i="1" dirty="0" smtClean="0">
+                <a:endParaRPr lang="en-US" altLang="zh-CN" i="1" dirty="0">
                   <a:latin typeface="Cambria Math" panose="02040503050406030204" pitchFamily="18" charset="0"/>
                   <a:ea typeface="微软雅黑" panose="020B0503020204020204" pitchFamily="34" charset="-122"/>
                 </a:endParaRPr>
@@ -15203,7 +14987,7 @@
                     </m:d>
                   </m:oMath>
                 </a14:m>
-                <a:endParaRPr lang="en-US" altLang="zh-CN" b="0" dirty="0" smtClean="0">
+                <a:endParaRPr lang="en-US" altLang="zh-CN" b="0" dirty="0">
                   <a:latin typeface="微软雅黑" panose="020B0503020204020204" pitchFamily="34" charset="-122"/>
                   <a:ea typeface="微软雅黑" panose="020B0503020204020204" pitchFamily="34" charset="-122"/>
                 </a:endParaRPr>
@@ -15366,21 +15150,21 @@
                     </m:r>
                   </m:oMath>
                 </a14:m>
-                <a:endParaRPr lang="en-US" altLang="zh-CN" b="0" dirty="0" smtClean="0">
+                <a:endParaRPr lang="en-US" altLang="zh-CN" b="0" dirty="0">
                   <a:latin typeface="微软雅黑" panose="020B0503020204020204" pitchFamily="34" charset="-122"/>
                   <a:ea typeface="微软雅黑" panose="020B0503020204020204" pitchFamily="34" charset="-122"/>
                 </a:endParaRPr>
               </a:p>
               <a:p>
                 <a:pPr lvl="1"/>
-                <a:endParaRPr lang="en-US" altLang="zh-CN" b="0" dirty="0" smtClean="0">
+                <a:endParaRPr lang="en-US" altLang="zh-CN" b="0" dirty="0">
                   <a:latin typeface="微软雅黑" panose="020B0503020204020204" pitchFamily="34" charset="-122"/>
                   <a:ea typeface="微软雅黑" panose="020B0503020204020204" pitchFamily="34" charset="-122"/>
                 </a:endParaRPr>
               </a:p>
               <a:p>
                 <a:r>
-                  <a:rPr lang="en-US" altLang="zh-CN" dirty="0" smtClean="0">
+                  <a:rPr lang="en-US" altLang="zh-CN" dirty="0">
                     <a:latin typeface="微软雅黑" panose="020B0503020204020204" pitchFamily="34" charset="-122"/>
                     <a:ea typeface="微软雅黑" panose="020B0503020204020204" pitchFamily="34" charset="-122"/>
                   </a:rPr>
@@ -15390,7 +15174,7 @@
               <a:p>
                 <a:pPr lvl="1"/>
                 <a:r>
-                  <a:rPr lang="en-US" altLang="zh-CN" b="0" dirty="0" smtClean="0">
+                  <a:rPr lang="en-US" altLang="zh-CN" b="0" dirty="0">
                     <a:latin typeface="微软雅黑" panose="020B0503020204020204" pitchFamily="34" charset="-122"/>
                     <a:ea typeface="微软雅黑" panose="020B0503020204020204" pitchFamily="34" charset="-122"/>
                   </a:rPr>
@@ -15690,20 +15474,20 @@
                     </m:nary>
                   </m:oMath>
                 </a14:m>
-                <a:endParaRPr lang="en-US" altLang="zh-CN" b="0" dirty="0" smtClean="0">
+                <a:endParaRPr lang="en-US" altLang="zh-CN" b="0" dirty="0">
                   <a:latin typeface="微软雅黑" panose="020B0503020204020204" pitchFamily="34" charset="-122"/>
                   <a:ea typeface="微软雅黑" panose="020B0503020204020204" pitchFamily="34" charset="-122"/>
                 </a:endParaRPr>
               </a:p>
               <a:p>
                 <a:pPr lvl="1"/>
-                <a:endParaRPr lang="en-US" altLang="zh-CN" dirty="0" smtClean="0">
+                <a:endParaRPr lang="en-US" altLang="zh-CN" dirty="0">
                   <a:latin typeface="微软雅黑" panose="020B0503020204020204" pitchFamily="34" charset="-122"/>
                   <a:ea typeface="微软雅黑" panose="020B0503020204020204" pitchFamily="34" charset="-122"/>
                 </a:endParaRPr>
               </a:p>
               <a:p>
-                <a:endParaRPr lang="en-US" altLang="zh-CN" dirty="0" smtClean="0">
+                <a:endParaRPr lang="en-US" altLang="zh-CN" dirty="0">
                   <a:latin typeface="微软雅黑" panose="020B0503020204020204" pitchFamily="34" charset="-122"/>
                   <a:ea typeface="微软雅黑" panose="020B0503020204020204" pitchFamily="34" charset="-122"/>
                 </a:endParaRPr>
@@ -16206,7 +15990,7 @@
               </a:spcBef>
             </a:pPr>
             <a:r>
-              <a:rPr lang="zh-CN" altLang="en-US" sz="4265" kern="0" dirty="0" smtClean="0">
+              <a:rPr lang="zh-CN" altLang="en-US" sz="4265" kern="0" dirty="0">
                 <a:gradFill>
                   <a:gsLst>
                     <a:gs pos="0">
@@ -16369,13 +16153,6 @@
       </p:transition>
     </mc:Fallback>
   </mc:AlternateContent>
-  <p:timing>
-    <p:tnLst>
-      <p:par>
-        <p:cTn id="1" dur="indefinite" restart="never" nodeType="tmRoot"/>
-      </p:par>
-    </p:tnLst>
-  </p:timing>
 </p:sld>
 </file>
 
@@ -16980,7 +16757,7 @@
               </a:spcBef>
             </a:pPr>
             <a:r>
-              <a:rPr lang="zh-CN" altLang="en-US" sz="4265" kern="0" dirty="0" smtClean="0">
+              <a:rPr lang="zh-CN" altLang="en-US" sz="4265" kern="0" dirty="0">
                 <a:gradFill>
                   <a:gsLst>
                     <a:gs pos="0">
@@ -17120,7 +16897,7 @@
           <a:lstStyle/>
           <a:p>
             <a:r>
-              <a:rPr lang="en-US" altLang="zh-CN" dirty="0" smtClean="0">
+              <a:rPr lang="en-US" altLang="zh-CN" dirty="0">
                 <a:latin typeface="微软雅黑" panose="020B0503020204020204" pitchFamily="34" charset="-122"/>
                 <a:ea typeface="微软雅黑" panose="020B0503020204020204" pitchFamily="34" charset="-122"/>
               </a:rPr>
@@ -17130,27 +16907,27 @@
           <a:p>
             <a:pPr lvl="1"/>
             <a:r>
-              <a:rPr lang="en-US" altLang="zh-CN" b="0" dirty="0" err="1" smtClean="0">
+              <a:rPr lang="en-US" altLang="zh-CN" b="0" dirty="0" err="1">
                 <a:latin typeface="微软雅黑" panose="020B0503020204020204" pitchFamily="34" charset="-122"/>
                 <a:ea typeface="微软雅黑" panose="020B0503020204020204" pitchFamily="34" charset="-122"/>
               </a:rPr>
               <a:t>SQuAD</a:t>
             </a:r>
             <a:r>
-              <a:rPr lang="en-US" altLang="zh-CN" b="0" dirty="0" smtClean="0">
+              <a:rPr lang="en-US" altLang="zh-CN" b="0" dirty="0">
                 <a:latin typeface="微软雅黑" panose="020B0503020204020204" pitchFamily="34" charset="-122"/>
                 <a:ea typeface="微软雅黑" panose="020B0503020204020204" pitchFamily="34" charset="-122"/>
               </a:rPr>
               <a:t> </a:t>
             </a:r>
             <a:r>
-              <a:rPr lang="zh-CN" altLang="en-US" b="0" dirty="0" smtClean="0">
+              <a:rPr lang="zh-CN" altLang="en-US" b="0" dirty="0">
                 <a:latin typeface="微软雅黑" panose="020B0503020204020204" pitchFamily="34" charset="-122"/>
                 <a:ea typeface="微软雅黑" panose="020B0503020204020204" pitchFamily="34" charset="-122"/>
               </a:rPr>
               <a:t>问答数据集</a:t>
             </a:r>
-            <a:endParaRPr lang="en-US" altLang="zh-CN" b="0" dirty="0" smtClean="0">
+            <a:endParaRPr lang="en-US" altLang="zh-CN" b="0" dirty="0">
               <a:latin typeface="微软雅黑" panose="020B0503020204020204" pitchFamily="34" charset="-122"/>
               <a:ea typeface="微软雅黑" panose="020B0503020204020204" pitchFamily="34" charset="-122"/>
             </a:endParaRPr>
@@ -17158,13 +16935,13 @@
           <a:p>
             <a:pPr lvl="1"/>
             <a:r>
-              <a:rPr lang="en-US" altLang="zh-CN" smtClean="0">
+              <a:rPr lang="en-US" altLang="zh-CN">
                 <a:latin typeface="微软雅黑" panose="020B0503020204020204" pitchFamily="34" charset="-122"/>
                 <a:ea typeface="微软雅黑" panose="020B0503020204020204" pitchFamily="34" charset="-122"/>
               </a:rPr>
               <a:t>Match-LSTM</a:t>
             </a:r>
-            <a:endParaRPr lang="en-US" altLang="zh-CN" b="0" dirty="0" smtClean="0">
+            <a:endParaRPr lang="en-US" altLang="zh-CN" b="0" dirty="0">
               <a:latin typeface="微软雅黑" panose="020B0503020204020204" pitchFamily="34" charset="-122"/>
               <a:ea typeface="微软雅黑" panose="020B0503020204020204" pitchFamily="34" charset="-122"/>
             </a:endParaRPr>
@@ -17172,7 +16949,7 @@
           <a:p>
             <a:pPr lvl="1"/>
             <a:r>
-              <a:rPr lang="en-US" altLang="zh-CN" dirty="0" smtClean="0">
+              <a:rPr lang="en-US" altLang="zh-CN" dirty="0">
                 <a:latin typeface="微软雅黑" panose="020B0503020204020204" pitchFamily="34" charset="-122"/>
                 <a:ea typeface="微软雅黑" panose="020B0503020204020204" pitchFamily="34" charset="-122"/>
               </a:rPr>
@@ -17190,13 +16967,13 @@
           </a:p>
           <a:p>
             <a:r>
-              <a:rPr lang="en-US" altLang="zh-CN" dirty="0" err="1" smtClean="0">
+              <a:rPr lang="en-US" altLang="zh-CN" dirty="0" err="1">
                 <a:latin typeface="微软雅黑" panose="020B0503020204020204" pitchFamily="34" charset="-122"/>
                 <a:ea typeface="微软雅黑" panose="020B0503020204020204" pitchFamily="34" charset="-122"/>
               </a:rPr>
               <a:t>BiDAF</a:t>
             </a:r>
-            <a:endParaRPr lang="en-US" altLang="zh-CN" dirty="0" smtClean="0">
+            <a:endParaRPr lang="en-US" altLang="zh-CN" dirty="0">
               <a:latin typeface="微软雅黑" panose="020B0503020204020204" pitchFamily="34" charset="-122"/>
               <a:ea typeface="微软雅黑" panose="020B0503020204020204" pitchFamily="34" charset="-122"/>
             </a:endParaRPr>
@@ -17232,7 +17009,7 @@
           <a:p>
             <a:pPr lvl="1"/>
             <a:r>
-              <a:rPr lang="en-US" altLang="zh-CN" dirty="0" smtClean="0">
+              <a:rPr lang="en-US" altLang="zh-CN" dirty="0">
                 <a:latin typeface="微软雅黑" panose="020B0503020204020204" pitchFamily="34" charset="-122"/>
                 <a:ea typeface="微软雅黑" panose="020B0503020204020204" pitchFamily="34" charset="-122"/>
               </a:rPr>
@@ -17242,7 +17019,7 @@
           <a:p>
             <a:pPr lvl="1"/>
             <a:r>
-              <a:rPr lang="en-US" altLang="zh-CN" dirty="0" smtClean="0">
+              <a:rPr lang="en-US" altLang="zh-CN" dirty="0">
                 <a:latin typeface="微软雅黑" panose="020B0503020204020204" pitchFamily="34" charset="-122"/>
                 <a:ea typeface="微软雅黑" panose="020B0503020204020204" pitchFamily="34" charset="-122"/>
               </a:rPr>
@@ -17250,7 +17027,7 @@
             </a:r>
           </a:p>
           <a:p>
-            <a:endParaRPr lang="en-US" altLang="zh-CN" dirty="0" smtClean="0">
+            <a:endParaRPr lang="en-US" altLang="zh-CN" dirty="0">
               <a:latin typeface="微软雅黑" panose="020B0503020204020204" pitchFamily="34" charset="-122"/>
               <a:ea typeface="微软雅黑" panose="020B0503020204020204" pitchFamily="34" charset="-122"/>
             </a:endParaRPr>
@@ -17304,11 +17081,11 @@
                     <a:lstStyle/>
                     <a:p>
                       <a:r>
-                        <a:rPr lang="en-US" altLang="zh-CN" dirty="0" smtClean="0"/>
+                        <a:rPr lang="en-US" altLang="zh-CN" dirty="0"/>
                         <a:t>Exact</a:t>
                       </a:r>
                       <a:r>
-                        <a:rPr lang="en-US" altLang="zh-CN" baseline="0" dirty="0" smtClean="0"/>
+                        <a:rPr lang="en-US" altLang="zh-CN" baseline="0" dirty="0"/>
                         <a:t> Match Score(EM)</a:t>
                       </a:r>
                       <a:endParaRPr lang="zh-CN" altLang="en-US" dirty="0"/>
@@ -17322,11 +17099,11 @@
                     <a:lstStyle/>
                     <a:p>
                       <a:r>
-                        <a:rPr lang="en-US" altLang="zh-CN" dirty="0" smtClean="0"/>
+                        <a:rPr lang="en-US" altLang="zh-CN" dirty="0"/>
                         <a:t>F1</a:t>
                       </a:r>
                       <a:r>
-                        <a:rPr lang="en-US" altLang="zh-CN" baseline="0" dirty="0" smtClean="0"/>
+                        <a:rPr lang="en-US" altLang="zh-CN" baseline="0" dirty="0"/>
                         <a:t> Score</a:t>
                       </a:r>
                       <a:endParaRPr lang="zh-CN" altLang="en-US" dirty="0"/>
@@ -17347,7 +17124,7 @@
                     <a:lstStyle/>
                     <a:p>
                       <a:r>
-                        <a:rPr lang="en-US" altLang="zh-CN" dirty="0" smtClean="0"/>
+                        <a:rPr lang="en-US" altLang="zh-CN" dirty="0"/>
                         <a:t>44.505</a:t>
                       </a:r>
                       <a:endParaRPr lang="zh-CN" altLang="en-US" dirty="0"/>
@@ -17361,7 +17138,7 @@
                     <a:lstStyle/>
                     <a:p>
                       <a:r>
-                        <a:rPr lang="en-US" altLang="zh-CN" dirty="0" smtClean="0"/>
+                        <a:rPr lang="en-US" altLang="zh-CN" dirty="0"/>
                         <a:t>57.748</a:t>
                       </a:r>
                       <a:endParaRPr lang="zh-CN" altLang="en-US" dirty="0"/>
@@ -17426,11 +17203,11 @@
                     <a:lstStyle/>
                     <a:p>
                       <a:r>
-                        <a:rPr lang="en-US" altLang="zh-CN" dirty="0" smtClean="0"/>
+                        <a:rPr lang="en-US" altLang="zh-CN" dirty="0"/>
                         <a:t>Exact</a:t>
                       </a:r>
                       <a:r>
-                        <a:rPr lang="en-US" altLang="zh-CN" baseline="0" dirty="0" smtClean="0"/>
+                        <a:rPr lang="en-US" altLang="zh-CN" baseline="0" dirty="0"/>
                         <a:t> Match Score(EM)</a:t>
                       </a:r>
                       <a:endParaRPr lang="zh-CN" altLang="en-US" dirty="0"/>
@@ -17444,11 +17221,11 @@
                     <a:lstStyle/>
                     <a:p>
                       <a:r>
-                        <a:rPr lang="en-US" altLang="zh-CN" dirty="0" smtClean="0"/>
+                        <a:rPr lang="en-US" altLang="zh-CN" dirty="0"/>
                         <a:t>F1</a:t>
                       </a:r>
                       <a:r>
-                        <a:rPr lang="en-US" altLang="zh-CN" baseline="0" dirty="0" smtClean="0"/>
+                        <a:rPr lang="en-US" altLang="zh-CN" baseline="0" dirty="0"/>
                         <a:t> Score</a:t>
                       </a:r>
                       <a:endParaRPr lang="zh-CN" altLang="en-US" dirty="0"/>
@@ -17469,7 +17246,7 @@
                     <a:lstStyle/>
                     <a:p>
                       <a:r>
-                        <a:rPr lang="en-US" altLang="zh-CN" dirty="0" smtClean="0"/>
+                        <a:rPr lang="en-US" altLang="zh-CN" dirty="0"/>
                         <a:t>67.974</a:t>
                       </a:r>
                       <a:endParaRPr lang="zh-CN" altLang="en-US" dirty="0"/>
@@ -17483,7 +17260,7 @@
                     <a:lstStyle/>
                     <a:p>
                       <a:r>
-                        <a:rPr lang="en-US" altLang="zh-CN" dirty="0" smtClean="0"/>
+                        <a:rPr lang="en-US" altLang="zh-CN" dirty="0"/>
                         <a:t>77.696</a:t>
                       </a:r>
                       <a:endParaRPr lang="zh-CN" altLang="en-US" dirty="0"/>
@@ -17983,25 +17760,6 @@
               </a:spcBef>
             </a:pPr>
             <a:r>
-              <a:rPr lang="zh-CN" altLang="en-US" sz="4265" kern="0" dirty="0" smtClean="0">
-                <a:gradFill>
-                  <a:gsLst>
-                    <a:gs pos="0">
-                      <a:schemeClr val="tx1"/>
-                    </a:gs>
-                    <a:gs pos="86000">
-                      <a:schemeClr val="tx1"/>
-                    </a:gs>
-                  </a:gsLst>
-                  <a:lin ang="5400000" scaled="0"/>
-                </a:gradFill>
-                <a:latin typeface="微软雅黑" panose="020B0503020204020204" pitchFamily="34" charset="-122"/>
-                <a:ea typeface="微软雅黑" panose="020B0503020204020204" pitchFamily="34" charset="-122"/>
-                <a:cs typeface="Segoe UI" panose="020B0502040204020203" pitchFamily="34" charset="0"/>
-              </a:rPr>
-              <a:t>内容</a:t>
-            </a:r>
-            <a:r>
               <a:rPr lang="zh-CN" altLang="en-US" sz="4265" kern="0" dirty="0">
                 <a:gradFill>
                   <a:gsLst>
@@ -18018,7 +17776,7 @@
                 <a:ea typeface="微软雅黑" panose="020B0503020204020204" pitchFamily="34" charset="-122"/>
                 <a:cs typeface="Segoe UI" panose="020B0502040204020203" pitchFamily="34" charset="0"/>
               </a:rPr>
-              <a:t>提要</a:t>
+              <a:t>内容提要</a:t>
             </a:r>
             <a:endParaRPr lang="zh-CN" altLang="en-US" sz="4265" dirty="0">
               <a:solidFill>
@@ -18560,7 +18318,7 @@
               </a:spcBef>
             </a:pPr>
             <a:r>
-              <a:rPr lang="zh-CN" altLang="en-US" sz="4265" kern="0" dirty="0" smtClean="0">
+              <a:rPr lang="zh-CN" altLang="en-US" sz="4265" kern="0" dirty="0">
                 <a:gradFill>
                   <a:gsLst>
                     <a:gs pos="0">
@@ -18757,62 +18515,54 @@
               </a:lnSpc>
             </a:pPr>
             <a:r>
-              <a:rPr lang="zh-CN" altLang="en-US" dirty="0" smtClean="0">
+              <a:rPr lang="zh-CN" altLang="en-US" dirty="0">
                 <a:latin typeface="微软雅黑" panose="020B0503020204020204" pitchFamily="34" charset="-122"/>
                 <a:ea typeface="微软雅黑" panose="020B0503020204020204" pitchFamily="34" charset="-122"/>
               </a:rPr>
               <a:t>对于</a:t>
             </a:r>
             <a:r>
-              <a:rPr lang="en-US" altLang="zh-CN" dirty="0" smtClean="0">
+              <a:rPr lang="en-US" altLang="zh-CN" dirty="0">
                 <a:latin typeface="微软雅黑" panose="020B0503020204020204" pitchFamily="34" charset="-122"/>
                 <a:ea typeface="微软雅黑" panose="020B0503020204020204" pitchFamily="34" charset="-122"/>
               </a:rPr>
               <a:t>word embedding </a:t>
             </a:r>
             <a:r>
-              <a:rPr lang="zh-CN" altLang="en-US" dirty="0" smtClean="0">
+              <a:rPr lang="zh-CN" altLang="en-US" dirty="0">
                 <a:latin typeface="微软雅黑" panose="020B0503020204020204" pitchFamily="34" charset="-122"/>
                 <a:ea typeface="微软雅黑" panose="020B0503020204020204" pitchFamily="34" charset="-122"/>
               </a:rPr>
               <a:t>层目前使用的是经过预训练的词向量</a:t>
             </a:r>
             <a:r>
-              <a:rPr lang="en-US" altLang="zh-CN" dirty="0" err="1" smtClean="0"/>
+              <a:rPr lang="en-US" altLang="zh-CN" dirty="0" err="1"/>
               <a:t>GloVe</a:t>
             </a:r>
             <a:r>
-              <a:rPr lang="en-US" altLang="zh-CN" dirty="0" smtClean="0"/>
-              <a:t>(Pennington </a:t>
-            </a:r>
-            <a:r>
               <a:rPr lang="en-US" altLang="zh-CN" dirty="0"/>
-              <a:t>et al., </a:t>
-            </a:r>
-            <a:r>
-              <a:rPr lang="en-US" altLang="zh-CN" dirty="0" smtClean="0"/>
-              <a:t>2014)</a:t>
-            </a:r>
-            <a:r>
-              <a:rPr lang="zh-CN" altLang="en-US" dirty="0" smtClean="0"/>
+              <a:t>(Pennington et al., 2014)</a:t>
+            </a:r>
+            <a:r>
+              <a:rPr lang="zh-CN" altLang="en-US" dirty="0"/>
               <a:t>，</a:t>
             </a:r>
             <a:r>
-              <a:rPr lang="zh-CN" altLang="en-US" dirty="0" smtClean="0">
+              <a:rPr lang="zh-CN" altLang="en-US" dirty="0">
                 <a:latin typeface="微软雅黑" panose="020B0503020204020204" pitchFamily="34" charset="-122"/>
                 <a:ea typeface="微软雅黑" panose="020B0503020204020204" pitchFamily="34" charset="-122"/>
               </a:rPr>
               <a:t>但应用到中文数据时需自己构造</a:t>
             </a:r>
             <a:r>
-              <a:rPr lang="en-US" altLang="zh-CN" dirty="0" smtClean="0">
+              <a:rPr lang="en-US" altLang="zh-CN" dirty="0">
                 <a:latin typeface="微软雅黑" panose="020B0503020204020204" pitchFamily="34" charset="-122"/>
                 <a:ea typeface="微软雅黑" panose="020B0503020204020204" pitchFamily="34" charset="-122"/>
               </a:rPr>
               <a:t>word embedding</a:t>
             </a:r>
             <a:r>
-              <a:rPr lang="zh-CN" altLang="en-US" dirty="0" smtClean="0">
+              <a:rPr lang="zh-CN" altLang="en-US" dirty="0">
                 <a:latin typeface="微软雅黑" panose="020B0503020204020204" pitchFamily="34" charset="-122"/>
                 <a:ea typeface="微软雅黑" panose="020B0503020204020204" pitchFamily="34" charset="-122"/>
               </a:rPr>
@@ -18824,7 +18574,7 @@
             </a:endParaRPr>
           </a:p>
           <a:p>
-            <a:endParaRPr lang="en-US" altLang="zh-CN" dirty="0" smtClean="0">
+            <a:endParaRPr lang="en-US" altLang="zh-CN" dirty="0">
               <a:latin typeface="微软雅黑" panose="020B0503020204020204" pitchFamily="34" charset="-122"/>
               <a:ea typeface="微软雅黑" panose="020B0503020204020204" pitchFamily="34" charset="-122"/>
             </a:endParaRPr>
@@ -19055,25 +18805,6 @@
               </a:spcBef>
             </a:pPr>
             <a:r>
-              <a:rPr lang="zh-CN" altLang="en-US" sz="4265" kern="0" dirty="0" smtClean="0">
-                <a:gradFill>
-                  <a:gsLst>
-                    <a:gs pos="0">
-                      <a:schemeClr val="tx1"/>
-                    </a:gs>
-                    <a:gs pos="86000">
-                      <a:schemeClr val="tx1"/>
-                    </a:gs>
-                  </a:gsLst>
-                  <a:lin ang="5400000" scaled="0"/>
-                </a:gradFill>
-                <a:latin typeface="微软雅黑" panose="020B0503020204020204" pitchFamily="34" charset="-122"/>
-                <a:ea typeface="微软雅黑" panose="020B0503020204020204" pitchFamily="34" charset="-122"/>
-                <a:cs typeface="Segoe UI" panose="020B0502040204020203" pitchFamily="34" charset="0"/>
-              </a:rPr>
-              <a:t>内容</a:t>
-            </a:r>
-            <a:r>
               <a:rPr lang="zh-CN" altLang="en-US" sz="4265" kern="0" dirty="0">
                 <a:gradFill>
                   <a:gsLst>
@@ -19090,7 +18821,7 @@
                 <a:ea typeface="微软雅黑" panose="020B0503020204020204" pitchFamily="34" charset="-122"/>
                 <a:cs typeface="Segoe UI" panose="020B0502040204020203" pitchFamily="34" charset="0"/>
               </a:rPr>
-              <a:t>提要</a:t>
+              <a:t>内容提要</a:t>
             </a:r>
             <a:endParaRPr lang="zh-CN" altLang="en-US" sz="4265" dirty="0">
               <a:solidFill>
@@ -19647,26 +19378,7 @@
                 <a:ea typeface="微软雅黑" panose="020B0503020204020204" pitchFamily="34" charset="-122"/>
                 <a:cs typeface="Segoe UI" panose="020B0502040204020203" pitchFamily="34" charset="0"/>
               </a:rPr>
-              <a:t>前期</a:t>
-            </a:r>
-            <a:r>
-              <a:rPr lang="zh-CN" altLang="en-US" sz="4265" kern="0" dirty="0" smtClean="0">
-                <a:gradFill>
-                  <a:gsLst>
-                    <a:gs pos="0">
-                      <a:schemeClr val="tx1"/>
-                    </a:gs>
-                    <a:gs pos="86000">
-                      <a:schemeClr val="tx1"/>
-                    </a:gs>
-                  </a:gsLst>
-                  <a:lin ang="5400000" scaled="0"/>
-                </a:gradFill>
-                <a:latin typeface="微软雅黑" panose="020B0503020204020204" pitchFamily="34" charset="-122"/>
-                <a:ea typeface="微软雅黑" panose="020B0503020204020204" pitchFamily="34" charset="-122"/>
-                <a:cs typeface="Segoe UI" panose="020B0502040204020203" pitchFamily="34" charset="0"/>
-              </a:rPr>
-              <a:t>工作总结</a:t>
+              <a:t>前期工作总结</a:t>
             </a:r>
             <a:endParaRPr lang="zh-CN" altLang="en-US" sz="4265" dirty="0">
               <a:solidFill>
@@ -19795,13 +19507,13 @@
               </a:lnSpc>
             </a:pPr>
             <a:r>
-              <a:rPr lang="zh-CN" altLang="en-US" dirty="0" smtClean="0">
+              <a:rPr lang="zh-CN" altLang="en-US" dirty="0">
                 <a:latin typeface="微软雅黑" panose="020B0503020204020204" pitchFamily="34" charset="-122"/>
                 <a:ea typeface="微软雅黑" panose="020B0503020204020204" pitchFamily="34" charset="-122"/>
               </a:rPr>
               <a:t>完成了数据采集和预处理工作</a:t>
             </a:r>
-            <a:endParaRPr lang="en-US" altLang="zh-CN" dirty="0" smtClean="0">
+            <a:endParaRPr lang="en-US" altLang="zh-CN" dirty="0">
               <a:latin typeface="微软雅黑" panose="020B0503020204020204" pitchFamily="34" charset="-122"/>
               <a:ea typeface="微软雅黑" panose="020B0503020204020204" pitchFamily="34" charset="-122"/>
             </a:endParaRPr>
@@ -19827,24 +19539,17 @@
                 <a:latin typeface="微软雅黑" panose="020B0503020204020204" pitchFamily="34" charset="-122"/>
                 <a:ea typeface="微软雅黑" panose="020B0503020204020204" pitchFamily="34" charset="-122"/>
               </a:rPr>
-              <a:t>位中国明星百度百科</a:t>
-            </a:r>
-            <a:r>
-              <a:rPr lang="zh-CN" altLang="en-US" dirty="0" smtClean="0">
-                <a:latin typeface="微软雅黑" panose="020B0503020204020204" pitchFamily="34" charset="-122"/>
-                <a:ea typeface="微软雅黑" panose="020B0503020204020204" pitchFamily="34" charset="-122"/>
-              </a:rPr>
-              <a:t>数据并生成伪中文</a:t>
-            </a:r>
-            <a:r>
-              <a:rPr lang="en-US" altLang="zh-CN" dirty="0" smtClean="0">
+              <a:t>位中国明星百度百科数据并生成伪中文</a:t>
+            </a:r>
+            <a:r>
+              <a:rPr lang="en-US" altLang="zh-CN" dirty="0">
                 <a:latin typeface="微软雅黑" panose="020B0503020204020204" pitchFamily="34" charset="-122"/>
                 <a:ea typeface="微软雅黑" panose="020B0503020204020204" pitchFamily="34" charset="-122"/>
               </a:rPr>
               <a:t>QA</a:t>
             </a:r>
             <a:r>
-              <a:rPr lang="zh-CN" altLang="en-US" dirty="0" smtClean="0">
+              <a:rPr lang="zh-CN" altLang="en-US" dirty="0">
                 <a:latin typeface="微软雅黑" panose="020B0503020204020204" pitchFamily="34" charset="-122"/>
                 <a:ea typeface="微软雅黑" panose="020B0503020204020204" pitchFamily="34" charset="-122"/>
               </a:rPr>
@@ -19862,7 +19567,7 @@
               </a:lnSpc>
             </a:pPr>
             <a:r>
-              <a:rPr lang="zh-CN" altLang="en-US" dirty="0" smtClean="0">
+              <a:rPr lang="zh-CN" altLang="en-US" dirty="0">
                 <a:latin typeface="微软雅黑" panose="020B0503020204020204" pitchFamily="34" charset="-122"/>
                 <a:ea typeface="微软雅黑" panose="020B0503020204020204" pitchFamily="34" charset="-122"/>
               </a:rPr>
@@ -19876,7 +19581,7 @@
               <a:t>2</a:t>
             </a:r>
             <a:r>
-              <a:rPr lang="zh-CN" altLang="en-US" dirty="0" smtClean="0">
+              <a:rPr lang="zh-CN" altLang="en-US" dirty="0">
                 <a:latin typeface="微软雅黑" panose="020B0503020204020204" pitchFamily="34" charset="-122"/>
                 <a:ea typeface="微软雅黑" panose="020B0503020204020204" pitchFamily="34" charset="-122"/>
               </a:rPr>
@@ -19887,23 +19592,16 @@
                 <a:latin typeface="微软雅黑" panose="020B0503020204020204" pitchFamily="34" charset="-122"/>
                 <a:ea typeface="微软雅黑" panose="020B0503020204020204" pitchFamily="34" charset="-122"/>
               </a:rPr>
-              <a:t>9</a:t>
-            </a:r>
-            <a:r>
-              <a:rPr lang="en-US" altLang="zh-CN" dirty="0" smtClean="0">
-                <a:latin typeface="微软雅黑" panose="020B0503020204020204" pitchFamily="34" charset="-122"/>
-                <a:ea typeface="微软雅黑" panose="020B0503020204020204" pitchFamily="34" charset="-122"/>
-              </a:rPr>
-              <a:t>00</a:t>
-            </a:r>
-            <a:r>
-              <a:rPr lang="zh-CN" altLang="en-US" dirty="0" smtClean="0">
+              <a:t>900</a:t>
+            </a:r>
+            <a:r>
+              <a:rPr lang="zh-CN" altLang="en-US" dirty="0">
                 <a:latin typeface="微软雅黑" panose="020B0503020204020204" pitchFamily="34" charset="-122"/>
                 <a:ea typeface="微软雅黑" panose="020B0503020204020204" pitchFamily="34" charset="-122"/>
               </a:rPr>
               <a:t>行</a:t>
             </a:r>
-            <a:endParaRPr lang="en-US" altLang="zh-CN" dirty="0" smtClean="0">
+            <a:endParaRPr lang="en-US" altLang="zh-CN" dirty="0">
               <a:latin typeface="微软雅黑" panose="020B0503020204020204" pitchFamily="34" charset="-122"/>
               <a:ea typeface="微软雅黑" panose="020B0503020204020204" pitchFamily="34" charset="-122"/>
             </a:endParaRPr>
@@ -19914,7 +19612,7 @@
                 <a:spcPct val="150000"/>
               </a:lnSpc>
             </a:pPr>
-            <a:endParaRPr lang="en-US" altLang="zh-CN" dirty="0" smtClean="0">
+            <a:endParaRPr lang="en-US" altLang="zh-CN" dirty="0">
               <a:latin typeface="微软雅黑" panose="020B0503020204020204" pitchFamily="34" charset="-122"/>
               <a:ea typeface="微软雅黑" panose="020B0503020204020204" pitchFamily="34" charset="-122"/>
             </a:endParaRPr>
@@ -19926,13 +19624,13 @@
               </a:lnSpc>
             </a:pPr>
             <a:r>
-              <a:rPr lang="zh-CN" altLang="en-US" dirty="0" smtClean="0">
+              <a:rPr lang="zh-CN" altLang="en-US" dirty="0">
                 <a:latin typeface="微软雅黑" panose="020B0503020204020204" pitchFamily="34" charset="-122"/>
                 <a:ea typeface="微软雅黑" panose="020B0503020204020204" pitchFamily="34" charset="-122"/>
               </a:rPr>
               <a:t>完成核心算法</a:t>
             </a:r>
-            <a:endParaRPr lang="en-US" altLang="zh-CN" dirty="0" smtClean="0">
+            <a:endParaRPr lang="en-US" altLang="zh-CN" dirty="0">
               <a:latin typeface="微软雅黑" panose="020B0503020204020204" pitchFamily="34" charset="-122"/>
               <a:ea typeface="微软雅黑" panose="020B0503020204020204" pitchFamily="34" charset="-122"/>
             </a:endParaRPr>
@@ -19944,27 +19642,27 @@
               </a:lnSpc>
             </a:pPr>
             <a:r>
-              <a:rPr lang="zh-CN" altLang="en-US" dirty="0" smtClean="0">
+              <a:rPr lang="zh-CN" altLang="en-US" dirty="0">
                 <a:latin typeface="微软雅黑" panose="020B0503020204020204" pitchFamily="34" charset="-122"/>
                 <a:ea typeface="微软雅黑" panose="020B0503020204020204" pitchFamily="34" charset="-122"/>
               </a:rPr>
               <a:t>给予</a:t>
             </a:r>
             <a:r>
-              <a:rPr lang="en-US" altLang="zh-CN" dirty="0" err="1" smtClean="0">
+              <a:rPr lang="en-US" altLang="zh-CN" dirty="0" err="1">
                 <a:latin typeface="微软雅黑" panose="020B0503020204020204" pitchFamily="34" charset="-122"/>
                 <a:ea typeface="微软雅黑" panose="020B0503020204020204" pitchFamily="34" charset="-122"/>
               </a:rPr>
               <a:t>tensorflow</a:t>
             </a:r>
             <a:r>
-              <a:rPr lang="zh-CN" altLang="en-US" dirty="0" smtClean="0">
+              <a:rPr lang="zh-CN" altLang="en-US" dirty="0">
                 <a:latin typeface="微软雅黑" panose="020B0503020204020204" pitchFamily="34" charset="-122"/>
                 <a:ea typeface="微软雅黑" panose="020B0503020204020204" pitchFamily="34" charset="-122"/>
               </a:rPr>
               <a:t>实现</a:t>
             </a:r>
-            <a:endParaRPr lang="en-US" altLang="zh-CN" dirty="0" smtClean="0">
+            <a:endParaRPr lang="en-US" altLang="zh-CN" dirty="0">
               <a:latin typeface="微软雅黑" panose="020B0503020204020204" pitchFamily="34" charset="-122"/>
               <a:ea typeface="微软雅黑" panose="020B0503020204020204" pitchFamily="34" charset="-122"/>
             </a:endParaRPr>
@@ -19976,7 +19674,7 @@
               </a:lnSpc>
             </a:pPr>
             <a:r>
-              <a:rPr lang="zh-CN" altLang="en-US" dirty="0" smtClean="0">
+              <a:rPr lang="zh-CN" altLang="en-US" dirty="0">
                 <a:latin typeface="微软雅黑" panose="020B0503020204020204" pitchFamily="34" charset="-122"/>
                 <a:ea typeface="微软雅黑" panose="020B0503020204020204" pitchFamily="34" charset="-122"/>
               </a:rPr>
@@ -19990,21 +19688,21 @@
               <a:t>3</a:t>
             </a:r>
             <a:r>
-              <a:rPr lang="zh-CN" altLang="en-US" dirty="0" smtClean="0">
+              <a:rPr lang="zh-CN" altLang="en-US" dirty="0">
                 <a:latin typeface="微软雅黑" panose="020B0503020204020204" pitchFamily="34" charset="-122"/>
                 <a:ea typeface="微软雅黑" panose="020B0503020204020204" pitchFamily="34" charset="-122"/>
               </a:rPr>
               <a:t>周时间，编写代码约</a:t>
             </a:r>
             <a:r>
-              <a:rPr lang="en-US" altLang="zh-CN" dirty="0" smtClean="0">
+              <a:rPr lang="en-US" altLang="zh-CN" dirty="0">
                 <a:latin typeface="微软雅黑" panose="020B0503020204020204" pitchFamily="34" charset="-122"/>
                 <a:ea typeface="微软雅黑" panose="020B0503020204020204" pitchFamily="34" charset="-122"/>
               </a:rPr>
               <a:t>2200</a:t>
             </a:r>
             <a:r>
-              <a:rPr lang="zh-CN" altLang="en-US" dirty="0" smtClean="0">
+              <a:rPr lang="zh-CN" altLang="en-US" dirty="0">
                 <a:latin typeface="微软雅黑" panose="020B0503020204020204" pitchFamily="34" charset="-122"/>
                 <a:ea typeface="微软雅黑" panose="020B0503020204020204" pitchFamily="34" charset="-122"/>
               </a:rPr>
@@ -20413,25 +20111,6 @@
               </a:spcBef>
             </a:pPr>
             <a:r>
-              <a:rPr lang="zh-CN" altLang="en-US" sz="4265" kern="0" dirty="0" smtClean="0">
-                <a:gradFill>
-                  <a:gsLst>
-                    <a:gs pos="0">
-                      <a:schemeClr val="tx1"/>
-                    </a:gs>
-                    <a:gs pos="86000">
-                      <a:schemeClr val="tx1"/>
-                    </a:gs>
-                  </a:gsLst>
-                  <a:lin ang="5400000" scaled="0"/>
-                </a:gradFill>
-                <a:latin typeface="微软雅黑" panose="020B0503020204020204" pitchFamily="34" charset="-122"/>
-                <a:ea typeface="微软雅黑" panose="020B0503020204020204" pitchFamily="34" charset="-122"/>
-                <a:cs typeface="Segoe UI" panose="020B0502040204020203" pitchFamily="34" charset="0"/>
-              </a:rPr>
-              <a:t>内容</a:t>
-            </a:r>
-            <a:r>
               <a:rPr lang="zh-CN" altLang="en-US" sz="4265" kern="0" dirty="0">
                 <a:gradFill>
                   <a:gsLst>
@@ -20448,7 +20127,7 @@
                 <a:ea typeface="微软雅黑" panose="020B0503020204020204" pitchFamily="34" charset="-122"/>
                 <a:cs typeface="Segoe UI" panose="020B0502040204020203" pitchFamily="34" charset="0"/>
               </a:rPr>
-              <a:t>提要</a:t>
+              <a:t>内容提要</a:t>
             </a:r>
             <a:endParaRPr lang="zh-CN" altLang="en-US" sz="4265" dirty="0">
               <a:solidFill>
@@ -20989,7 +20668,7 @@
               </a:spcBef>
             </a:pPr>
             <a:r>
-              <a:rPr lang="zh-CN" altLang="en-US" sz="4265" kern="0" dirty="0" smtClean="0">
+              <a:rPr lang="zh-CN" altLang="en-US" sz="4265" kern="0" dirty="0">
                 <a:gradFill>
                   <a:gsLst>
                     <a:gs pos="0">
@@ -21134,28 +20813,28 @@
               </a:lnSpc>
             </a:pPr>
             <a:r>
-              <a:rPr lang="zh-CN" altLang="en-US" dirty="0" smtClean="0">
+              <a:rPr lang="zh-CN" altLang="en-US" dirty="0">
                 <a:latin typeface="微软雅黑" panose="020B0503020204020204" pitchFamily="34" charset="-122"/>
                 <a:ea typeface="微软雅黑" panose="020B0503020204020204" pitchFamily="34" charset="-122"/>
               </a:rPr>
               <a:t>实现中文的</a:t>
             </a:r>
             <a:r>
-              <a:rPr lang="en-US" altLang="zh-CN" dirty="0" smtClean="0">
+              <a:rPr lang="en-US" altLang="zh-CN" dirty="0">
                 <a:latin typeface="微软雅黑" panose="020B0503020204020204" pitchFamily="34" charset="-122"/>
                 <a:ea typeface="微软雅黑" panose="020B0503020204020204" pitchFamily="34" charset="-122"/>
               </a:rPr>
               <a:t>word embedding layer</a:t>
             </a:r>
             <a:r>
-              <a:rPr lang="zh-CN" altLang="en-US" dirty="0" smtClean="0">
+              <a:rPr lang="zh-CN" altLang="en-US" dirty="0">
                 <a:latin typeface="微软雅黑" panose="020B0503020204020204" pitchFamily="34" charset="-122"/>
                 <a:ea typeface="微软雅黑" panose="020B0503020204020204" pitchFamily="34" charset="-122"/>
               </a:rPr>
               <a:t>和</a:t>
             </a:r>
             <a:r>
-              <a:rPr lang="en-US" altLang="zh-CN" dirty="0" smtClean="0">
+              <a:rPr lang="en-US" altLang="zh-CN" dirty="0">
                 <a:latin typeface="微软雅黑" panose="020B0503020204020204" pitchFamily="34" charset="-122"/>
                 <a:ea typeface="微软雅黑" panose="020B0503020204020204" pitchFamily="34" charset="-122"/>
               </a:rPr>
@@ -21169,27 +20848,27 @@
               </a:lnSpc>
             </a:pPr>
             <a:r>
-              <a:rPr lang="zh-CN" altLang="en-US" dirty="0" smtClean="0">
+              <a:rPr lang="zh-CN" altLang="en-US" dirty="0">
                 <a:latin typeface="微软雅黑" panose="020B0503020204020204" pitchFamily="34" charset="-122"/>
                 <a:ea typeface="微软雅黑" panose="020B0503020204020204" pitchFamily="34" charset="-122"/>
               </a:rPr>
               <a:t>实现当前</a:t>
             </a:r>
             <a:r>
-              <a:rPr lang="en-US" altLang="zh-CN" dirty="0" smtClean="0">
+              <a:rPr lang="en-US" altLang="zh-CN" dirty="0">
                 <a:latin typeface="微软雅黑" panose="020B0503020204020204" pitchFamily="34" charset="-122"/>
                 <a:ea typeface="微软雅黑" panose="020B0503020204020204" pitchFamily="34" charset="-122"/>
               </a:rPr>
               <a:t>model</a:t>
             </a:r>
             <a:r>
-              <a:rPr lang="zh-CN" altLang="en-US" dirty="0" smtClean="0">
+              <a:rPr lang="zh-CN" altLang="en-US" dirty="0">
                 <a:latin typeface="微软雅黑" panose="020B0503020204020204" pitchFamily="34" charset="-122"/>
                 <a:ea typeface="微软雅黑" panose="020B0503020204020204" pitchFamily="34" charset="-122"/>
               </a:rPr>
               <a:t>下基于翻译的中文问答系统</a:t>
             </a:r>
-            <a:endParaRPr lang="en-US" altLang="zh-CN" dirty="0" smtClean="0">
+            <a:endParaRPr lang="en-US" altLang="zh-CN" dirty="0">
               <a:latin typeface="微软雅黑" panose="020B0503020204020204" pitchFamily="34" charset="-122"/>
               <a:ea typeface="微软雅黑" panose="020B0503020204020204" pitchFamily="34" charset="-122"/>
             </a:endParaRPr>
@@ -21201,13 +20880,13 @@
               </a:lnSpc>
             </a:pPr>
             <a:r>
-              <a:rPr lang="zh-CN" altLang="en-US" dirty="0" smtClean="0">
+              <a:rPr lang="zh-CN" altLang="en-US" dirty="0">
                 <a:latin typeface="微软雅黑" panose="020B0503020204020204" pitchFamily="34" charset="-122"/>
                 <a:ea typeface="微软雅黑" panose="020B0503020204020204" pitchFamily="34" charset="-122"/>
               </a:rPr>
               <a:t>对上述两种方法在现有数据集上进行评测</a:t>
             </a:r>
-            <a:endParaRPr lang="en-US" altLang="zh-CN" dirty="0" smtClean="0">
+            <a:endParaRPr lang="en-US" altLang="zh-CN" dirty="0">
               <a:latin typeface="微软雅黑" panose="020B0503020204020204" pitchFamily="34" charset="-122"/>
               <a:ea typeface="微软雅黑" panose="020B0503020204020204" pitchFamily="34" charset="-122"/>
             </a:endParaRPr>
@@ -21223,30 +20902,23 @@
                 <a:latin typeface="微软雅黑" panose="020B0503020204020204" pitchFamily="34" charset="-122"/>
                 <a:ea typeface="微软雅黑" panose="020B0503020204020204" pitchFamily="34" charset="-122"/>
               </a:rPr>
-              <a:t>视</a:t>
-            </a:r>
-            <a:r>
-              <a:rPr lang="zh-CN" altLang="en-US" dirty="0" smtClean="0">
-                <a:latin typeface="微软雅黑" panose="020B0503020204020204" pitchFamily="34" charset="-122"/>
-                <a:ea typeface="微软雅黑" panose="020B0503020204020204" pitchFamily="34" charset="-122"/>
-              </a:rPr>
-              <a:t>情况收集其他领域中文问答数据（法律、金融、计算机</a:t>
-            </a:r>
-            <a:r>
-              <a:rPr lang="en-US" altLang="zh-CN" dirty="0" smtClean="0">
+              <a:t>视情况收集其他领域中文问答数据（法律、金融、计算机</a:t>
+            </a:r>
+            <a:r>
+              <a:rPr lang="en-US" altLang="zh-CN" dirty="0">
                 <a:latin typeface="微软雅黑" panose="020B0503020204020204" pitchFamily="34" charset="-122"/>
                 <a:ea typeface="微软雅黑" panose="020B0503020204020204" pitchFamily="34" charset="-122"/>
               </a:rPr>
               <a:t>……</a:t>
             </a:r>
             <a:r>
-              <a:rPr lang="zh-CN" altLang="en-US" dirty="0" smtClean="0">
+              <a:rPr lang="zh-CN" altLang="en-US" dirty="0">
                 <a:latin typeface="微软雅黑" panose="020B0503020204020204" pitchFamily="34" charset="-122"/>
                 <a:ea typeface="微软雅黑" panose="020B0503020204020204" pitchFamily="34" charset="-122"/>
               </a:rPr>
               <a:t>）</a:t>
             </a:r>
-            <a:endParaRPr lang="en-US" altLang="zh-CN" dirty="0" smtClean="0">
+            <a:endParaRPr lang="en-US" altLang="zh-CN" dirty="0">
               <a:latin typeface="微软雅黑" panose="020B0503020204020204" pitchFamily="34" charset="-122"/>
               <a:ea typeface="微软雅黑" panose="020B0503020204020204" pitchFamily="34" charset="-122"/>
             </a:endParaRPr>
@@ -21258,13 +20930,13 @@
               </a:lnSpc>
             </a:pPr>
             <a:r>
-              <a:rPr lang="zh-CN" altLang="en-US" dirty="0" smtClean="0">
+              <a:rPr lang="zh-CN" altLang="en-US" dirty="0">
                 <a:latin typeface="微软雅黑" panose="020B0503020204020204" pitchFamily="34" charset="-122"/>
                 <a:ea typeface="微软雅黑" panose="020B0503020204020204" pitchFamily="34" charset="-122"/>
               </a:rPr>
               <a:t>撰写毕业论文，准备答辩</a:t>
             </a:r>
-            <a:endParaRPr lang="en-US" altLang="zh-CN" dirty="0" smtClean="0">
+            <a:endParaRPr lang="en-US" altLang="zh-CN" dirty="0">
               <a:latin typeface="微软雅黑" panose="020B0503020204020204" pitchFamily="34" charset="-122"/>
               <a:ea typeface="微软雅黑" panose="020B0503020204020204" pitchFamily="34" charset="-122"/>
             </a:endParaRPr>
@@ -21933,50 +21605,40 @@
               <a:buChar char="•"/>
             </a:pPr>
             <a:r>
-              <a:rPr lang="en-US" altLang="zh-CN" sz="2400" b="1" dirty="0" smtClean="0"/>
+              <a:rPr lang="en-US" altLang="zh-CN" sz="2400" b="1" dirty="0"/>
               <a:t>[</a:t>
             </a:r>
             <a:r>
-              <a:rPr lang="en-US" altLang="zh-CN" sz="2400" b="1" dirty="0" err="1" smtClean="0"/>
+              <a:rPr lang="en-US" altLang="zh-CN" sz="2400" b="1" dirty="0" err="1"/>
               <a:t>Minjoon</a:t>
             </a:r>
             <a:r>
-              <a:rPr lang="en-US" altLang="zh-CN" sz="2400" b="1" dirty="0" smtClean="0"/>
+              <a:rPr lang="en-US" altLang="zh-CN" sz="2400" b="1" dirty="0"/>
               <a:t> </a:t>
             </a:r>
             <a:r>
-              <a:rPr lang="en-US" altLang="zh-CN" sz="2400" b="1" dirty="0" err="1" smtClean="0"/>
+              <a:rPr lang="en-US" altLang="zh-CN" sz="2400" b="1" dirty="0" err="1"/>
               <a:t>Seo</a:t>
             </a:r>
             <a:r>
-              <a:rPr lang="en-US" altLang="zh-CN" sz="2400" b="1" dirty="0" smtClean="0"/>
+              <a:rPr lang="en-US" altLang="zh-CN" sz="2400" b="1" dirty="0"/>
               <a:t>., </a:t>
             </a:r>
             <a:r>
-              <a:rPr lang="en-US" altLang="zh-CN" sz="2400" b="1" dirty="0" err="1" smtClean="0"/>
+              <a:rPr lang="en-US" altLang="zh-CN" sz="2400" b="1" dirty="0" err="1"/>
               <a:t>Aniruddha</a:t>
             </a:r>
             <a:r>
-              <a:rPr lang="en-US" altLang="zh-CN" sz="2400" b="1" dirty="0" smtClean="0"/>
+              <a:rPr lang="en-US" altLang="zh-CN" sz="2400" b="1" dirty="0"/>
               <a:t> </a:t>
             </a:r>
             <a:r>
-              <a:rPr lang="en-US" altLang="zh-CN" sz="2400" b="1" dirty="0" err="1" smtClean="0"/>
+              <a:rPr lang="en-US" altLang="zh-CN" sz="2400" b="1" dirty="0" err="1"/>
               <a:t>Kembhavi</a:t>
             </a:r>
             <a:r>
-              <a:rPr lang="en-US" altLang="zh-CN" sz="2400" b="1" dirty="0" smtClean="0"/>
+              <a:rPr lang="en-US" altLang="zh-CN" sz="2400" b="1" dirty="0"/>
               <a:t>, et al.16]</a:t>
-            </a:r>
-            <a:r>
-              <a:rPr lang="en-US" altLang="zh-CN" sz="2400" dirty="0" smtClean="0">
-                <a:solidFill>
-                  <a:schemeClr val="accent1">
-                    <a:lumMod val="75000"/>
-                  </a:schemeClr>
-                </a:solidFill>
-              </a:rPr>
-              <a:t> </a:t>
             </a:r>
             <a:r>
               <a:rPr lang="en-US" altLang="zh-CN" sz="2400" dirty="0">
@@ -21986,86 +21648,7 @@
                   </a:schemeClr>
                 </a:solidFill>
               </a:rPr>
-              <a:t>Bi-directional Attention Flow </a:t>
-            </a:r>
-            <a:r>
-              <a:rPr lang="en-US" altLang="zh-CN" sz="2400" dirty="0" smtClean="0">
-                <a:solidFill>
-                  <a:schemeClr val="accent1">
-                    <a:lumMod val="75000"/>
-                  </a:schemeClr>
-                </a:solidFill>
-              </a:rPr>
-              <a:t>for Machine Comprehension.</a:t>
-            </a:r>
-          </a:p>
-          <a:p>
-            <a:pPr marL="285750" indent="-285750">
-              <a:buFont typeface="Arial" panose="020B0604020202020204" pitchFamily="34" charset="0"/>
-              <a:buChar char="•"/>
-            </a:pPr>
-            <a:endParaRPr lang="en-US" altLang="zh-CN" sz="2400" dirty="0" smtClean="0">
-              <a:solidFill>
-                <a:schemeClr val="accent1">
-                  <a:lumMod val="75000"/>
-                </a:schemeClr>
-              </a:solidFill>
-            </a:endParaRPr>
-          </a:p>
-          <a:p>
-            <a:pPr marL="285750" indent="-285750">
-              <a:buFont typeface="Arial" panose="020B0604020202020204" pitchFamily="34" charset="0"/>
-              <a:buChar char="•"/>
-            </a:pPr>
-            <a:r>
-              <a:rPr lang="en-US" altLang="zh-CN" sz="2400" b="1" dirty="0" smtClean="0"/>
-              <a:t>[</a:t>
-            </a:r>
-            <a:r>
-              <a:rPr lang="en-US" altLang="zh-CN" sz="2400" b="1" dirty="0"/>
-              <a:t>Pranav </a:t>
-            </a:r>
-            <a:r>
-              <a:rPr lang="en-US" altLang="zh-CN" sz="2400" b="1" dirty="0" err="1"/>
-              <a:t>Rajpurkar</a:t>
-            </a:r>
-            <a:r>
-              <a:rPr lang="en-US" altLang="zh-CN" sz="2400" b="1" dirty="0"/>
-              <a:t>., et al</a:t>
-            </a:r>
-            <a:r>
-              <a:rPr lang="en-US" altLang="zh-CN" sz="2400" b="1" dirty="0" smtClean="0"/>
-              <a:t>. 15] </a:t>
-            </a:r>
-            <a:r>
-              <a:rPr lang="en-US" altLang="zh-CN" sz="2400" dirty="0" err="1">
-                <a:solidFill>
-                  <a:schemeClr val="accent1">
-                    <a:lumMod val="75000"/>
-                  </a:schemeClr>
-                </a:solidFill>
-              </a:rPr>
-              <a:t>SQuAD</a:t>
-            </a:r>
-            <a:r>
-              <a:rPr lang="en-US" altLang="zh-CN" sz="2400" dirty="0">
-                <a:solidFill>
-                  <a:schemeClr val="accent1">
-                    <a:lumMod val="75000"/>
-                  </a:schemeClr>
-                </a:solidFill>
-              </a:rPr>
-              <a:t>: 100,000+ Questions for Machine Comprehension of Text</a:t>
-            </a:r>
-            <a:r>
-              <a:rPr lang="en-US" altLang="zh-CN" sz="2400" dirty="0" smtClean="0">
-                <a:solidFill>
-                  <a:schemeClr val="accent1">
-                    <a:lumMod val="75000"/>
-                  </a:schemeClr>
-                </a:solidFill>
-              </a:rPr>
-              <a:t>.</a:t>
+              <a:t> Bi-directional Attention Flow for Machine Comprehension.</a:t>
             </a:r>
           </a:p>
           <a:p>
@@ -22087,8 +21670,26 @@
               <a:buChar char="•"/>
             </a:pPr>
             <a:r>
-              <a:rPr lang="en-US" altLang="zh-CN" sz="2400" b="1" dirty="0" smtClean="0"/>
-              <a:t>[Ting Liu., et al. 15] </a:t>
+              <a:rPr lang="en-US" altLang="zh-CN" sz="2400" b="1" dirty="0"/>
+              <a:t>[Pranav </a:t>
+            </a:r>
+            <a:r>
+              <a:rPr lang="en-US" altLang="zh-CN" sz="2400" b="1" dirty="0" err="1"/>
+              <a:t>Rajpurkar</a:t>
+            </a:r>
+            <a:r>
+              <a:rPr lang="en-US" altLang="zh-CN" sz="2400" b="1" dirty="0"/>
+              <a:t>., et al. 15] </a:t>
+            </a:r>
+            <a:r>
+              <a:rPr lang="en-US" altLang="zh-CN" sz="2400" dirty="0" err="1">
+                <a:solidFill>
+                  <a:schemeClr val="accent1">
+                    <a:lumMod val="75000"/>
+                  </a:schemeClr>
+                </a:solidFill>
+              </a:rPr>
+              <a:t>SQuAD</a:t>
             </a:r>
             <a:r>
               <a:rPr lang="en-US" altLang="zh-CN" sz="2400" dirty="0">
@@ -22098,17 +21699,7 @@
                   </a:schemeClr>
                 </a:solidFill>
               </a:rPr>
-              <a:t>Generating and Exploiting Large-scale Pseudo Training Data for Zero Pronoun Resolution</a:t>
-            </a:r>
-            <a:r>
-              <a:rPr lang="en-US" altLang="zh-CN" sz="2400" dirty="0" smtClean="0">
-                <a:solidFill>
-                  <a:schemeClr val="accent1">
-                    <a:lumMod val="75000"/>
-                  </a:schemeClr>
-                </a:solidFill>
-              </a:rPr>
-              <a:t>.</a:t>
+              <a:t>: 100,000+ Questions for Machine Comprehension of Text.</a:t>
             </a:r>
           </a:p>
           <a:p>
@@ -22116,7 +21707,7 @@
               <a:buFont typeface="Arial" panose="020B0604020202020204" pitchFamily="34" charset="0"/>
               <a:buChar char="•"/>
             </a:pPr>
-            <a:endParaRPr lang="en-US" altLang="zh-CN" sz="2400" dirty="0" smtClean="0">
+            <a:endParaRPr lang="en-US" altLang="zh-CN" sz="2400" dirty="0">
               <a:solidFill>
                 <a:schemeClr val="accent1">
                   <a:lumMod val="75000"/>
@@ -22130,16 +21721,8 @@
               <a:buChar char="•"/>
             </a:pPr>
             <a:r>
-              <a:rPr lang="en-US" altLang="zh-CN" sz="2400" b="1" dirty="0" smtClean="0"/>
-              <a:t>[</a:t>
-            </a:r>
-            <a:r>
-              <a:rPr lang="en-US" altLang="zh-CN" sz="2400" b="1" dirty="0" err="1" smtClean="0"/>
-              <a:t>Shuohang</a:t>
-            </a:r>
-            <a:r>
-              <a:rPr lang="en-US" altLang="zh-CN" sz="2400" b="1" dirty="0" smtClean="0"/>
-              <a:t> Wang.,&amp; Jing Jiang] </a:t>
+              <a:rPr lang="en-US" altLang="zh-CN" sz="2400" b="1" dirty="0"/>
+              <a:t>[Ting Liu., et al. 15] </a:t>
             </a:r>
             <a:r>
               <a:rPr lang="en-US" altLang="zh-CN" sz="2400" dirty="0">
@@ -22149,18 +21732,14 @@
                   </a:schemeClr>
                 </a:solidFill>
               </a:rPr>
-              <a:t>Machine Comprehension Using Match-LSTM and Answer Pointer</a:t>
-            </a:r>
-            <a:r>
-              <a:rPr lang="en-US" altLang="zh-CN" sz="2400" dirty="0" smtClean="0">
-                <a:solidFill>
-                  <a:schemeClr val="accent1">
-                    <a:lumMod val="75000"/>
-                  </a:schemeClr>
-                </a:solidFill>
-              </a:rPr>
-              <a:t>.</a:t>
-            </a:r>
+              <a:t>Generating and Exploiting Large-scale Pseudo Training Data for Zero Pronoun Resolution.</a:t>
+            </a:r>
+          </a:p>
+          <a:p>
+            <a:pPr marL="285750" indent="-285750">
+              <a:buFont typeface="Arial" panose="020B0604020202020204" pitchFamily="34" charset="0"/>
+              <a:buChar char="•"/>
+            </a:pPr>
             <a:endParaRPr lang="en-US" altLang="zh-CN" sz="2400" dirty="0">
               <a:solidFill>
                 <a:schemeClr val="accent1">
@@ -22168,6 +21747,34 @@
                 </a:schemeClr>
               </a:solidFill>
             </a:endParaRPr>
+          </a:p>
+          <a:p>
+            <a:pPr marL="285750" indent="-285750">
+              <a:buFont typeface="Arial" panose="020B0604020202020204" pitchFamily="34" charset="0"/>
+              <a:buChar char="•"/>
+            </a:pPr>
+            <a:r>
+              <a:rPr lang="en-US" altLang="zh-CN" sz="2400" b="1" dirty="0"/>
+              <a:t>[</a:t>
+            </a:r>
+            <a:r>
+              <a:rPr lang="en-US" altLang="zh-CN" sz="2400" b="1" dirty="0" err="1"/>
+              <a:t>Shuohang</a:t>
+            </a:r>
+            <a:r>
+              <a:rPr lang="en-US" altLang="zh-CN" sz="2400" b="1" dirty="0"/>
+              <a:t> Wang.,&amp; Jing Jiang] </a:t>
+            </a:r>
+            <a:r>
+              <a:rPr lang="en-US" altLang="zh-CN" sz="2400" dirty="0">
+                <a:solidFill>
+                  <a:schemeClr val="accent1">
+                    <a:lumMod val="75000"/>
+                  </a:schemeClr>
+                </a:solidFill>
+              </a:rPr>
+              <a:t>Machine Comprehension Using Match-LSTM and Answer Pointer.</a:t>
+            </a:r>
           </a:p>
         </p:txBody>
       </p:sp>
@@ -22459,7 +22066,7 @@
           <a:lstStyle/>
           <a:p>
             <a:r>
-              <a:rPr lang="en-US" altLang="zh-CN" sz="8000" b="1" dirty="0" smtClean="0">
+              <a:rPr lang="en-US" altLang="zh-CN" sz="8000" b="1" dirty="0">
                 <a:solidFill>
                   <a:schemeClr val="bg1"/>
                 </a:solidFill>
@@ -22685,25 +22292,6 @@
               </a:spcBef>
             </a:pPr>
             <a:r>
-              <a:rPr lang="zh-CN" altLang="en-US" sz="4265" kern="0" dirty="0" smtClean="0">
-                <a:gradFill>
-                  <a:gsLst>
-                    <a:gs pos="0">
-                      <a:schemeClr val="tx1"/>
-                    </a:gs>
-                    <a:gs pos="86000">
-                      <a:schemeClr val="tx1"/>
-                    </a:gs>
-                  </a:gsLst>
-                  <a:lin ang="5400000" scaled="0"/>
-                </a:gradFill>
-                <a:latin typeface="微软雅黑" panose="020B0503020204020204" pitchFamily="34" charset="-122"/>
-                <a:ea typeface="微软雅黑" panose="020B0503020204020204" pitchFamily="34" charset="-122"/>
-                <a:cs typeface="Segoe UI" panose="020B0502040204020203" pitchFamily="34" charset="0"/>
-              </a:rPr>
-              <a:t>内容</a:t>
-            </a:r>
-            <a:r>
               <a:rPr lang="zh-CN" altLang="en-US" sz="4265" kern="0" dirty="0">
                 <a:gradFill>
                   <a:gsLst>
@@ -22720,7 +22308,7 @@
                 <a:ea typeface="微软雅黑" panose="020B0503020204020204" pitchFamily="34" charset="-122"/>
                 <a:cs typeface="Segoe UI" panose="020B0502040204020203" pitchFamily="34" charset="0"/>
               </a:rPr>
-              <a:t>提要</a:t>
+              <a:t>内容提要</a:t>
             </a:r>
             <a:endParaRPr lang="zh-CN" altLang="en-US" sz="4265" dirty="0">
               <a:solidFill>
@@ -22854,7 +22442,7 @@
               <a:buChar char="•"/>
             </a:pPr>
             <a:r>
-              <a:rPr lang="zh-CN" altLang="en-US" sz="3200" b="1" dirty="0" smtClean="0">
+              <a:rPr lang="zh-CN" altLang="en-US" sz="3200" b="1" dirty="0">
                 <a:solidFill>
                   <a:schemeClr val="tx1">
                     <a:lumMod val="75000"/>
@@ -22926,7 +22514,7 @@
               <a:buChar char="•"/>
             </a:pPr>
             <a:r>
-              <a:rPr lang="zh-CN" altLang="en-US" sz="3200" dirty="0" smtClean="0">
+              <a:rPr lang="zh-CN" altLang="en-US" sz="3200" dirty="0">
                 <a:solidFill>
                   <a:schemeClr val="bg2">
                     <a:lumMod val="75000"/>
@@ -22971,20 +22559,7 @@
                 <a:ea typeface="微软雅黑" panose="020B0503020204020204" pitchFamily="34" charset="-122"/>
                 <a:sym typeface="微软雅黑" panose="020B0503020204020204" pitchFamily="34" charset="-122"/>
               </a:rPr>
-              <a:t>后期</a:t>
-            </a:r>
-            <a:r>
-              <a:rPr lang="zh-CN" altLang="en-US" sz="3200" dirty="0" smtClean="0">
-                <a:solidFill>
-                  <a:schemeClr val="bg2">
-                    <a:lumMod val="75000"/>
-                  </a:schemeClr>
-                </a:solidFill>
-                <a:latin typeface="微软雅黑" panose="020B0503020204020204" pitchFamily="34" charset="-122"/>
-                <a:ea typeface="微软雅黑" panose="020B0503020204020204" pitchFamily="34" charset="-122"/>
-                <a:sym typeface="微软雅黑" panose="020B0503020204020204" pitchFamily="34" charset="-122"/>
-              </a:rPr>
-              <a:t>工作安排</a:t>
+              <a:t>后期工作安排</a:t>
             </a:r>
             <a:endParaRPr lang="en-US" altLang="zh-CN" sz="3200" dirty="0">
               <a:solidFill>
@@ -23543,7 +23118,7 @@
               <a:buFontTx/>
               <a:buNone/>
             </a:pPr>
-            <a:endParaRPr kumimoji="0" lang="zh-CN" altLang="en-US" b="0" i="0" u="none" strike="noStrike" cap="none" normalizeH="0" baseline="0" smtClean="0">
+            <a:endParaRPr kumimoji="0" lang="zh-CN" altLang="en-US" b="0" i="0" u="none" strike="noStrike" cap="none" normalizeH="0" baseline="0">
               <a:ln>
                 <a:noFill/>
               </a:ln>
@@ -23603,13 +23178,13 @@
               <a:buNone/>
             </a:pPr>
             <a:r>
-              <a:rPr lang="zh-CN" altLang="en-US" dirty="0" smtClean="0">
+              <a:rPr lang="zh-CN" altLang="en-US" dirty="0">
                 <a:latin typeface="Times New Roman" panose="02020603050405020304" pitchFamily="18" charset="0"/>
                 <a:ea typeface="宋体" panose="02010600030101010101" pitchFamily="2" charset="-122"/>
               </a:rPr>
               <a:t>文本抽取、问题构造</a:t>
             </a:r>
-            <a:endParaRPr kumimoji="0" lang="zh-CN" altLang="en-US" b="0" i="0" u="none" strike="noStrike" cap="none" normalizeH="0" baseline="0" dirty="0" smtClean="0">
+            <a:endParaRPr kumimoji="0" lang="zh-CN" altLang="en-US" b="0" i="0" u="none" strike="noStrike" cap="none" normalizeH="0" baseline="0" dirty="0">
               <a:ln>
                 <a:noFill/>
               </a:ln>
@@ -23669,10 +23244,10 @@
               <a:buNone/>
             </a:pPr>
             <a:r>
-              <a:rPr lang="zh-CN" altLang="en-US" dirty="0" smtClean="0"/>
+              <a:rPr lang="zh-CN" altLang="en-US" dirty="0"/>
               <a:t>文本长度过滤</a:t>
             </a:r>
-            <a:endParaRPr kumimoji="0" lang="zh-CN" altLang="en-US" b="0" i="0" u="none" strike="noStrike" cap="none" normalizeH="0" baseline="0" dirty="0" smtClean="0">
+            <a:endParaRPr kumimoji="0" lang="zh-CN" altLang="en-US" b="0" i="0" u="none" strike="noStrike" cap="none" normalizeH="0" baseline="0" dirty="0">
               <a:ln>
                 <a:noFill/>
               </a:ln>
@@ -23730,7 +23305,7 @@
               <a:buNone/>
             </a:pPr>
             <a:r>
-              <a:rPr kumimoji="0" lang="zh-CN" altLang="en-US" b="0" i="0" u="none" strike="noStrike" cap="none" normalizeH="0" baseline="0" dirty="0" smtClean="0">
+              <a:rPr kumimoji="0" lang="zh-CN" altLang="en-US" b="0" i="0" u="none" strike="noStrike" cap="none" normalizeH="0" baseline="0" dirty="0">
                 <a:ln>
                   <a:noFill/>
                 </a:ln>
@@ -23744,21 +23319,14 @@
               <a:t>分词及</a:t>
             </a:r>
             <a:r>
-              <a:rPr lang="zh-CN" altLang="en-US" dirty="0" smtClean="0">
-                <a:latin typeface="Times New Roman" panose="02020603050405020304" pitchFamily="18" charset="0"/>
-                <a:ea typeface="宋体" panose="02010600030101010101" pitchFamily="2" charset="-122"/>
-              </a:rPr>
-              <a:t>主题</a:t>
-            </a:r>
-            <a:r>
               <a:rPr lang="zh-CN" altLang="en-US" dirty="0">
                 <a:latin typeface="Times New Roman" panose="02020603050405020304" pitchFamily="18" charset="0"/>
                 <a:ea typeface="宋体" panose="02010600030101010101" pitchFamily="2" charset="-122"/>
               </a:rPr>
-              <a:t>提取</a:t>
-            </a:r>
-            <a:r>
-              <a:rPr kumimoji="0" lang="zh-CN" altLang="en-US" b="0" i="0" u="none" strike="noStrike" cap="none" normalizeH="0" baseline="0" dirty="0" smtClean="0">
+              <a:t>主题提取</a:t>
+            </a:r>
+            <a:r>
+              <a:rPr kumimoji="0" lang="zh-CN" altLang="en-US" b="0" i="0" u="none" strike="noStrike" cap="none" normalizeH="0" baseline="0" dirty="0">
                 <a:ln>
                   <a:noFill/>
                 </a:ln>
@@ -23820,20 +23388,20 @@
               <a:buNone/>
             </a:pPr>
             <a:r>
-              <a:rPr lang="en-US" altLang="zh-CN" dirty="0" smtClean="0">
+              <a:rPr lang="en-US" altLang="zh-CN" dirty="0">
                 <a:latin typeface="Times New Roman" panose="02020603050405020304" pitchFamily="18" charset="0"/>
                 <a:ea typeface="宋体" panose="02010600030101010101" pitchFamily="2" charset="-122"/>
               </a:rPr>
               <a:t>BIDAF</a:t>
             </a:r>
             <a:r>
-              <a:rPr lang="zh-CN" altLang="en-US" dirty="0" smtClean="0">
+              <a:rPr lang="zh-CN" altLang="en-US" dirty="0">
                 <a:latin typeface="Times New Roman" panose="02020603050405020304" pitchFamily="18" charset="0"/>
                 <a:ea typeface="宋体" panose="02010600030101010101" pitchFamily="2" charset="-122"/>
               </a:rPr>
               <a:t>模型训练</a:t>
             </a:r>
-            <a:endParaRPr kumimoji="0" lang="zh-CN" altLang="en-US" b="0" i="0" u="none" strike="noStrike" cap="none" normalizeH="0" baseline="0" dirty="0" smtClean="0">
+            <a:endParaRPr kumimoji="0" lang="zh-CN" altLang="en-US" b="0" i="0" u="none" strike="noStrike" cap="none" normalizeH="0" baseline="0" dirty="0">
               <a:ln>
                 <a:noFill/>
               </a:ln>
@@ -23893,7 +23461,7 @@
               <a:buNone/>
             </a:pPr>
             <a:r>
-              <a:rPr kumimoji="0" lang="zh-CN" altLang="en-US" b="0" i="0" u="none" strike="noStrike" cap="none" normalizeH="0" baseline="0" dirty="0" smtClean="0">
+              <a:rPr kumimoji="0" lang="zh-CN" altLang="en-US" b="0" i="0" u="none" strike="noStrike" cap="none" normalizeH="0" baseline="0" dirty="0">
                 <a:ln>
                   <a:noFill/>
                 </a:ln>
@@ -23955,7 +23523,7 @@
               <a:buNone/>
             </a:pPr>
             <a:r>
-              <a:rPr kumimoji="0" lang="zh-CN" altLang="en-US" b="0" i="0" u="none" strike="noStrike" cap="none" normalizeH="0" baseline="0" dirty="0" smtClean="0">
+              <a:rPr kumimoji="0" lang="zh-CN" altLang="en-US" b="0" i="0" u="none" strike="noStrike" cap="none" normalizeH="0" baseline="0" dirty="0">
                 <a:ln>
                   <a:noFill/>
                 </a:ln>
@@ -24014,7 +23582,7 @@
               <a:buNone/>
             </a:pPr>
             <a:r>
-              <a:rPr kumimoji="0" lang="zh-CN" altLang="en-US" b="0" i="0" u="none" strike="noStrike" cap="none" normalizeH="0" baseline="0" dirty="0" smtClean="0">
+              <a:rPr kumimoji="0" lang="zh-CN" altLang="en-US" b="0" i="0" u="none" strike="noStrike" cap="none" normalizeH="0" baseline="0" dirty="0">
                 <a:ln>
                   <a:noFill/>
                 </a:ln>
@@ -24073,7 +23641,7 @@
               <a:buNone/>
             </a:pPr>
             <a:r>
-              <a:rPr kumimoji="0" lang="zh-CN" altLang="en-US" b="0" i="0" u="none" strike="noStrike" cap="none" normalizeH="0" baseline="0" dirty="0" smtClean="0">
+              <a:rPr kumimoji="0" lang="zh-CN" altLang="en-US" b="0" i="0" u="none" strike="noStrike" cap="none" normalizeH="0" baseline="0" dirty="0">
                 <a:ln>
                   <a:noFill/>
                 </a:ln>
@@ -24132,7 +23700,7 @@
               <a:buNone/>
             </a:pPr>
             <a:r>
-              <a:rPr kumimoji="0" lang="zh-CN" altLang="en-US" b="0" i="0" u="none" strike="noStrike" cap="none" normalizeH="0" baseline="0" dirty="0" smtClean="0">
+              <a:rPr kumimoji="0" lang="zh-CN" altLang="en-US" b="0" i="0" u="none" strike="noStrike" cap="none" normalizeH="0" baseline="0" dirty="0">
                 <a:ln>
                   <a:noFill/>
                 </a:ln>
@@ -24191,13 +23759,13 @@
               <a:buNone/>
             </a:pPr>
             <a:r>
-              <a:rPr lang="zh-CN" altLang="en-US" dirty="0" smtClean="0">
+              <a:rPr lang="zh-CN" altLang="en-US" dirty="0">
                 <a:latin typeface="Times New Roman" panose="02020603050405020304" pitchFamily="18" charset="0"/>
                 <a:ea typeface="宋体" panose="02010600030101010101" pitchFamily="2" charset="-122"/>
               </a:rPr>
               <a:t>维基、百度百科知识库</a:t>
             </a:r>
-            <a:endParaRPr kumimoji="0" lang="zh-CN" altLang="en-US" b="0" i="0" u="none" strike="noStrike" cap="none" normalizeH="0" baseline="0" dirty="0" smtClean="0">
+            <a:endParaRPr kumimoji="0" lang="zh-CN" altLang="en-US" b="0" i="0" u="none" strike="noStrike" cap="none" normalizeH="0" baseline="0" dirty="0">
               <a:ln>
                 <a:noFill/>
               </a:ln>
@@ -24253,7 +23821,7 @@
               <a:buFontTx/>
               <a:buNone/>
             </a:pPr>
-            <a:endParaRPr kumimoji="0" lang="zh-CN" altLang="en-US" b="0" i="0" u="none" strike="noStrike" cap="none" normalizeH="0" baseline="0" smtClean="0">
+            <a:endParaRPr kumimoji="0" lang="zh-CN" altLang="en-US" b="0" i="0" u="none" strike="noStrike" cap="none" normalizeH="0" baseline="0">
               <a:ln>
                 <a:noFill/>
               </a:ln>
@@ -24312,7 +23880,7 @@
               <a:buFontTx/>
               <a:buNone/>
             </a:pPr>
-            <a:endParaRPr kumimoji="0" lang="zh-CN" altLang="en-US" sz="2000" b="0" i="0" u="none" strike="noStrike" cap="none" normalizeH="0" baseline="0" smtClean="0">
+            <a:endParaRPr kumimoji="0" lang="zh-CN" altLang="en-US" sz="2000" b="0" i="0" u="none" strike="noStrike" cap="none" normalizeH="0" baseline="0">
               <a:ln>
                 <a:noFill/>
               </a:ln>
@@ -24371,7 +23939,7 @@
               <a:buFontTx/>
               <a:buNone/>
             </a:pPr>
-            <a:endParaRPr kumimoji="0" lang="zh-CN" altLang="en-US" sz="2000" b="0" i="0" u="none" strike="noStrike" cap="none" normalizeH="0" baseline="0" smtClean="0">
+            <a:endParaRPr kumimoji="0" lang="zh-CN" altLang="en-US" sz="2000" b="0" i="0" u="none" strike="noStrike" cap="none" normalizeH="0" baseline="0">
               <a:ln>
                 <a:noFill/>
               </a:ln>
@@ -24430,7 +23998,7 @@
               <a:buFontTx/>
               <a:buNone/>
             </a:pPr>
-            <a:endParaRPr kumimoji="0" lang="zh-CN" altLang="en-US" sz="2000" b="0" i="0" u="none" strike="noStrike" cap="none" normalizeH="0" baseline="0" smtClean="0">
+            <a:endParaRPr kumimoji="0" lang="zh-CN" altLang="en-US" sz="2000" b="0" i="0" u="none" strike="noStrike" cap="none" normalizeH="0" baseline="0">
               <a:ln>
                 <a:noFill/>
               </a:ln>
@@ -24489,7 +24057,7 @@
               <a:buFontTx/>
               <a:buNone/>
             </a:pPr>
-            <a:endParaRPr kumimoji="0" lang="zh-CN" altLang="en-US" sz="2000" b="0" i="0" u="none" strike="noStrike" cap="none" normalizeH="0" baseline="0" smtClean="0">
+            <a:endParaRPr kumimoji="0" lang="zh-CN" altLang="en-US" sz="2000" b="0" i="0" u="none" strike="noStrike" cap="none" normalizeH="0" baseline="0">
               <a:ln>
                 <a:noFill/>
               </a:ln>
@@ -24548,7 +24116,7 @@
               <a:buFontTx/>
               <a:buNone/>
             </a:pPr>
-            <a:endParaRPr kumimoji="0" lang="zh-CN" altLang="en-US" sz="2000" b="0" i="0" u="none" strike="noStrike" cap="none" normalizeH="0" baseline="0" smtClean="0">
+            <a:endParaRPr kumimoji="0" lang="zh-CN" altLang="en-US" sz="2000" b="0" i="0" u="none" strike="noStrike" cap="none" normalizeH="0" baseline="0">
               <a:ln>
                 <a:noFill/>
               </a:ln>
@@ -24607,7 +24175,7 @@
               <a:buFontTx/>
               <a:buNone/>
             </a:pPr>
-            <a:endParaRPr kumimoji="0" lang="zh-CN" altLang="en-US" sz="2000" b="0" i="0" u="none" strike="noStrike" cap="none" normalizeH="0" baseline="0" smtClean="0">
+            <a:endParaRPr kumimoji="0" lang="zh-CN" altLang="en-US" sz="2000" b="0" i="0" u="none" strike="noStrike" cap="none" normalizeH="0" baseline="0">
               <a:ln>
                 <a:noFill/>
               </a:ln>
@@ -24674,7 +24242,7 @@
               <a:t>阅读理解</a:t>
             </a:r>
             <a:r>
-              <a:rPr kumimoji="0" lang="zh-CN" altLang="en-US" sz="2000" b="0" i="0" u="none" strike="noStrike" cap="none" normalizeH="0" baseline="0" dirty="0" smtClean="0">
+              <a:rPr kumimoji="0" lang="zh-CN" altLang="en-US" sz="2000" b="0" i="0" u="none" strike="noStrike" cap="none" normalizeH="0" baseline="0" dirty="0">
                 <a:ln>
                   <a:noFill/>
                 </a:ln>
@@ -24735,7 +24303,7 @@
               <a:buFontTx/>
               <a:buNone/>
             </a:pPr>
-            <a:endParaRPr kumimoji="0" lang="zh-CN" altLang="en-US" b="0" i="0" u="none" strike="noStrike" cap="none" normalizeH="0" baseline="0" smtClean="0">
+            <a:endParaRPr kumimoji="0" lang="zh-CN" altLang="en-US" b="0" i="0" u="none" strike="noStrike" cap="none" normalizeH="0" baseline="0">
               <a:ln>
                 <a:noFill/>
               </a:ln>
@@ -24794,7 +24362,7 @@
               <a:buFontTx/>
               <a:buNone/>
             </a:pPr>
-            <a:endParaRPr kumimoji="0" lang="zh-CN" altLang="en-US" sz="2000" b="0" i="0" u="none" strike="noStrike" cap="none" normalizeH="0" baseline="0" smtClean="0">
+            <a:endParaRPr kumimoji="0" lang="zh-CN" altLang="en-US" sz="2000" b="0" i="0" u="none" strike="noStrike" cap="none" normalizeH="0" baseline="0">
               <a:ln>
                 <a:noFill/>
               </a:ln>
@@ -24853,7 +24421,7 @@
               <a:buFontTx/>
               <a:buNone/>
             </a:pPr>
-            <a:endParaRPr kumimoji="0" lang="zh-CN" altLang="en-US" b="0" i="0" u="none" strike="noStrike" cap="none" normalizeH="0" baseline="0" smtClean="0">
+            <a:endParaRPr kumimoji="0" lang="zh-CN" altLang="en-US" b="0" i="0" u="none" strike="noStrike" cap="none" normalizeH="0" baseline="0">
               <a:ln>
                 <a:noFill/>
               </a:ln>
@@ -24912,7 +24480,7 @@
               <a:buFontTx/>
               <a:buNone/>
             </a:pPr>
-            <a:endParaRPr kumimoji="0" lang="zh-CN" altLang="en-US" sz="2000" b="0" i="0" u="none" strike="noStrike" cap="none" normalizeH="0" baseline="0" smtClean="0">
+            <a:endParaRPr kumimoji="0" lang="zh-CN" altLang="en-US" sz="2000" b="0" i="0" u="none" strike="noStrike" cap="none" normalizeH="0" baseline="0">
               <a:ln>
                 <a:noFill/>
               </a:ln>
@@ -24971,7 +24539,7 @@
               <a:buFontTx/>
               <a:buNone/>
             </a:pPr>
-            <a:endParaRPr kumimoji="0" lang="zh-CN" altLang="en-US" sz="2000" b="0" i="0" u="none" strike="noStrike" cap="none" normalizeH="0" baseline="0" smtClean="0">
+            <a:endParaRPr kumimoji="0" lang="zh-CN" altLang="en-US" sz="2000" b="0" i="0" u="none" strike="noStrike" cap="none" normalizeH="0" baseline="0">
               <a:ln>
                 <a:noFill/>
               </a:ln>
@@ -25030,7 +24598,7 @@
               <a:buFontTx/>
               <a:buNone/>
             </a:pPr>
-            <a:endParaRPr kumimoji="0" lang="zh-CN" altLang="en-US" sz="2000" b="0" i="0" u="none" strike="noStrike" cap="none" normalizeH="0" baseline="0" smtClean="0">
+            <a:endParaRPr kumimoji="0" lang="zh-CN" altLang="en-US" sz="2000" b="0" i="0" u="none" strike="noStrike" cap="none" normalizeH="0" baseline="0">
               <a:ln>
                 <a:noFill/>
               </a:ln>
@@ -25068,7 +24636,7 @@
           <a:p>
             <a:pPr algn="ctr"/>
             <a:r>
-              <a:rPr lang="zh-CN" altLang="en-US" dirty="0" smtClean="0">
+              <a:rPr lang="zh-CN" altLang="en-US" dirty="0">
                 <a:solidFill>
                   <a:schemeClr val="accent2"/>
                 </a:solidFill>
@@ -25173,7 +24741,7 @@
               <a:buFontTx/>
               <a:buNone/>
             </a:pPr>
-            <a:endParaRPr kumimoji="0" lang="zh-CN" altLang="en-US" sz="2000" b="0" i="0" u="none" strike="noStrike" cap="none" normalizeH="0" baseline="0" smtClean="0">
+            <a:endParaRPr kumimoji="0" lang="zh-CN" altLang="en-US" sz="2000" b="0" i="0" u="none" strike="noStrike" cap="none" normalizeH="0" baseline="0">
               <a:ln>
                 <a:noFill/>
               </a:ln>
@@ -25211,7 +24779,7 @@
           <a:p>
             <a:pPr algn="ctr"/>
             <a:r>
-              <a:rPr lang="zh-CN" altLang="en-US" dirty="0" smtClean="0">
+              <a:rPr lang="zh-CN" altLang="en-US" dirty="0">
                 <a:solidFill>
                   <a:schemeClr val="accent2"/>
                 </a:solidFill>
@@ -25220,13 +24788,6 @@
               </a:rPr>
               <a:t>训练网络模型</a:t>
             </a:r>
-            <a:endParaRPr lang="zh-CN" altLang="en-US" dirty="0">
-              <a:solidFill>
-                <a:schemeClr val="accent2"/>
-              </a:solidFill>
-              <a:latin typeface="+mn-ea"/>
-              <a:ea typeface="+mn-ea"/>
-            </a:endParaRPr>
           </a:p>
         </p:txBody>
       </p:sp>
@@ -25254,7 +24815,7 @@
           <a:p>
             <a:pPr algn="ctr"/>
             <a:r>
-              <a:rPr lang="zh-CN" altLang="en-US" dirty="0" smtClean="0">
+              <a:rPr lang="zh-CN" altLang="en-US" dirty="0">
                 <a:solidFill>
                   <a:schemeClr val="accent2"/>
                 </a:solidFill>
@@ -25264,7 +24825,7 @@
               <a:t>效果分析</a:t>
             </a:r>
             <a:r>
-              <a:rPr lang="zh-CN" altLang="en-US" dirty="0" smtClean="0">
+              <a:rPr lang="zh-CN" altLang="en-US" dirty="0">
                 <a:solidFill>
                   <a:schemeClr val="accent2"/>
                 </a:solidFill>
@@ -26859,7 +26420,7 @@
               </a:spcBef>
             </a:pPr>
             <a:r>
-              <a:rPr lang="zh-CN" altLang="en-US" sz="4265" kern="0" dirty="0" smtClean="0">
+              <a:rPr lang="zh-CN" altLang="en-US" sz="4265" kern="0" dirty="0">
                 <a:gradFill>
                   <a:gsLst>
                     <a:gs pos="0">
@@ -27081,7 +26642,7 @@
               <a:buChar char="•"/>
             </a:pPr>
             <a:r>
-              <a:rPr lang="zh-CN" altLang="en-US" sz="3200" dirty="0" smtClean="0">
+              <a:rPr lang="zh-CN" altLang="en-US" sz="3200" dirty="0">
                 <a:solidFill>
                   <a:schemeClr val="bg2">
                     <a:lumMod val="75000"/>
@@ -27126,20 +26687,7 @@
                 <a:ea typeface="微软雅黑" panose="020B0503020204020204" pitchFamily="34" charset="-122"/>
                 <a:sym typeface="微软雅黑" panose="020B0503020204020204" pitchFamily="34" charset="-122"/>
               </a:rPr>
-              <a:t>后期</a:t>
-            </a:r>
-            <a:r>
-              <a:rPr lang="zh-CN" altLang="en-US" sz="3200" dirty="0" smtClean="0">
-                <a:solidFill>
-                  <a:schemeClr val="bg2">
-                    <a:lumMod val="75000"/>
-                  </a:schemeClr>
-                </a:solidFill>
-                <a:latin typeface="微软雅黑" panose="020B0503020204020204" pitchFamily="34" charset="-122"/>
-                <a:ea typeface="微软雅黑" panose="020B0503020204020204" pitchFamily="34" charset="-122"/>
-                <a:sym typeface="微软雅黑" panose="020B0503020204020204" pitchFamily="34" charset="-122"/>
-              </a:rPr>
-              <a:t>工作安排</a:t>
+              <a:t>后期工作安排</a:t>
             </a:r>
             <a:endParaRPr lang="en-US" altLang="zh-CN" sz="3200" dirty="0">
               <a:solidFill>
@@ -28214,7 +27762,7 @@
               <a:buChar char="•"/>
             </a:pPr>
             <a:r>
-              <a:rPr lang="zh-CN" altLang="en-US" sz="3200" dirty="0" smtClean="0">
+              <a:rPr lang="zh-CN" altLang="en-US" sz="3200" dirty="0">
                 <a:solidFill>
                   <a:schemeClr val="bg2">
                     <a:lumMod val="75000"/>
@@ -28249,7 +27797,7 @@
               <a:buChar char="•"/>
             </a:pPr>
             <a:r>
-              <a:rPr lang="zh-CN" altLang="en-US" sz="3200" dirty="0" smtClean="0">
+              <a:rPr lang="zh-CN" altLang="en-US" sz="3200" dirty="0">
                 <a:solidFill>
                   <a:schemeClr val="bg2">
                     <a:lumMod val="75000"/>
@@ -28831,16 +28379,9 @@
                 <a:latin typeface="Times New Roman" pitchFamily="18" charset="0"/>
                 <a:ea typeface="宋体" pitchFamily="2" charset="-122"/>
               </a:rPr>
-              <a:t>百度</a:t>
-            </a:r>
-            <a:r>
-              <a:rPr lang="zh-CN" altLang="en-US" sz="2000" dirty="0" smtClean="0">
-                <a:latin typeface="Times New Roman" pitchFamily="18" charset="0"/>
-                <a:ea typeface="宋体" pitchFamily="2" charset="-122"/>
-              </a:rPr>
-              <a:t>百科</a:t>
-            </a:r>
-            <a:endParaRPr lang="en-US" altLang="zh-CN" sz="2000" dirty="0" smtClean="0">
+              <a:t>百度百科</a:t>
+            </a:r>
+            <a:endParaRPr lang="en-US" altLang="zh-CN" sz="2000" dirty="0">
               <a:latin typeface="Times New Roman" pitchFamily="18" charset="0"/>
               <a:ea typeface="宋体" pitchFamily="2" charset="-122"/>
             </a:endParaRPr>
@@ -28863,13 +28404,13 @@
               <a:tabLst/>
             </a:pPr>
             <a:r>
-              <a:rPr lang="zh-CN" altLang="en-US" sz="2000" dirty="0" smtClean="0">
+              <a:rPr lang="zh-CN" altLang="en-US" sz="2000" dirty="0">
                 <a:latin typeface="Times New Roman" pitchFamily="18" charset="0"/>
                 <a:ea typeface="宋体" pitchFamily="2" charset="-122"/>
               </a:rPr>
               <a:t>明星数据</a:t>
             </a:r>
-            <a:endParaRPr kumimoji="0" lang="zh-CN" altLang="en-US" sz="2000" b="0" i="0" u="none" strike="noStrike" cap="none" normalizeH="0" baseline="0" dirty="0" smtClean="0">
+            <a:endParaRPr kumimoji="0" lang="zh-CN" altLang="en-US" sz="2000" b="0" i="0" u="none" strike="noStrike" cap="none" normalizeH="0" baseline="0" dirty="0">
               <a:ln>
                 <a:noFill/>
               </a:ln>
@@ -28912,10 +28453,9 @@
           <a:p>
             <a:pPr algn="ctr"/>
             <a:r>
-              <a:rPr lang="zh-CN" altLang="en-US" dirty="0" smtClean="0"/>
+              <a:rPr lang="zh-CN" altLang="en-US" dirty="0"/>
               <a:t>抽取重要内容</a:t>
             </a:r>
-            <a:endParaRPr lang="zh-CN" altLang="en-US" dirty="0"/>
           </a:p>
         </p:txBody>
       </p:sp>
@@ -28948,10 +28488,9 @@
           <a:p>
             <a:pPr algn="ctr"/>
             <a:r>
-              <a:rPr lang="zh-CN" altLang="en-US" dirty="0" smtClean="0"/>
+              <a:rPr lang="zh-CN" altLang="en-US" dirty="0"/>
               <a:t>字符转换</a:t>
             </a:r>
-            <a:endParaRPr lang="zh-CN" altLang="en-US" dirty="0"/>
           </a:p>
         </p:txBody>
       </p:sp>
@@ -28984,10 +28523,9 @@
           <a:p>
             <a:pPr algn="ctr"/>
             <a:r>
-              <a:rPr lang="zh-CN" altLang="en-US" dirty="0" smtClean="0"/>
+              <a:rPr lang="zh-CN" altLang="en-US" dirty="0"/>
               <a:t>问题生成</a:t>
             </a:r>
-            <a:endParaRPr lang="zh-CN" altLang="en-US" dirty="0"/>
           </a:p>
         </p:txBody>
       </p:sp>
@@ -29042,7 +28580,7 @@
               <a:tabLst/>
             </a:pPr>
             <a:r>
-              <a:rPr kumimoji="0" lang="zh-CN" altLang="en-US" sz="2000" b="0" i="0" u="none" strike="noStrike" cap="none" normalizeH="0" baseline="0" dirty="0" smtClean="0">
+              <a:rPr kumimoji="0" lang="zh-CN" altLang="en-US" sz="2000" b="0" i="0" u="none" strike="noStrike" cap="none" normalizeH="0" baseline="0" dirty="0">
                 <a:ln>
                   <a:noFill/>
                 </a:ln>
@@ -29109,13 +28647,13 @@
               <a:tabLst/>
             </a:pPr>
             <a:r>
-              <a:rPr lang="zh-CN" altLang="en-US" sz="2000" dirty="0" smtClean="0">
+              <a:rPr lang="zh-CN" altLang="en-US" sz="2000" dirty="0">
                 <a:latin typeface="Times New Roman" pitchFamily="18" charset="0"/>
                 <a:ea typeface="宋体" pitchFamily="2" charset="-122"/>
               </a:rPr>
               <a:t>明星</a:t>
             </a:r>
-            <a:endParaRPr lang="en-US" altLang="zh-CN" sz="2000" dirty="0" smtClean="0">
+            <a:endParaRPr lang="en-US" altLang="zh-CN" sz="2000" dirty="0">
               <a:latin typeface="Times New Roman" pitchFamily="18" charset="0"/>
               <a:ea typeface="宋体" pitchFamily="2" charset="-122"/>
             </a:endParaRPr>
@@ -29138,7 +28676,7 @@
               <a:tabLst/>
             </a:pPr>
             <a:r>
-              <a:rPr kumimoji="0" lang="zh-CN" altLang="en-US" sz="2000" b="0" i="0" u="none" strike="noStrike" cap="none" normalizeH="0" baseline="0" dirty="0" smtClean="0">
+              <a:rPr kumimoji="0" lang="zh-CN" altLang="en-US" sz="2000" b="0" i="0" u="none" strike="noStrike" cap="none" normalizeH="0" baseline="0" dirty="0">
                 <a:ln>
                   <a:noFill/>
                 </a:ln>
@@ -29204,7 +28742,7 @@
               <a:buNone/>
               <a:tabLst/>
             </a:pPr>
-            <a:endParaRPr kumimoji="0" lang="zh-CN" altLang="en-US" sz="2000" b="0" i="0" u="none" strike="noStrike" cap="none" normalizeH="0" baseline="0" smtClean="0">
+            <a:endParaRPr kumimoji="0" lang="zh-CN" altLang="en-US" sz="2000" b="0" i="0" u="none" strike="noStrike" cap="none" normalizeH="0" baseline="0">
               <a:ln>
                 <a:noFill/>
               </a:ln>
@@ -29268,7 +28806,7 @@
               <a:buNone/>
               <a:tabLst/>
             </a:pPr>
-            <a:endParaRPr kumimoji="0" lang="zh-CN" altLang="en-US" sz="2000" b="0" i="0" u="none" strike="noStrike" cap="none" normalizeH="0" baseline="0" smtClean="0">
+            <a:endParaRPr kumimoji="0" lang="zh-CN" altLang="en-US" sz="2000" b="0" i="0" u="none" strike="noStrike" cap="none" normalizeH="0" baseline="0">
               <a:ln>
                 <a:noFill/>
               </a:ln>
@@ -29332,7 +28870,7 @@
               <a:buNone/>
               <a:tabLst/>
             </a:pPr>
-            <a:endParaRPr kumimoji="0" lang="zh-CN" altLang="en-US" sz="2000" b="0" i="0" u="none" strike="noStrike" cap="none" normalizeH="0" baseline="0" smtClean="0">
+            <a:endParaRPr kumimoji="0" lang="zh-CN" altLang="en-US" sz="2000" b="0" i="0" u="none" strike="noStrike" cap="none" normalizeH="0" baseline="0">
               <a:ln>
                 <a:noFill/>
               </a:ln>
@@ -29396,7 +28934,7 @@
               <a:buNone/>
               <a:tabLst/>
             </a:pPr>
-            <a:endParaRPr kumimoji="0" lang="zh-CN" altLang="en-US" sz="2000" b="0" i="0" u="none" strike="noStrike" cap="none" normalizeH="0" baseline="0" smtClean="0">
+            <a:endParaRPr kumimoji="0" lang="zh-CN" altLang="en-US" sz="2000" b="0" i="0" u="none" strike="noStrike" cap="none" normalizeH="0" baseline="0">
               <a:ln>
                 <a:noFill/>
               </a:ln>
@@ -29460,7 +28998,7 @@
               <a:buNone/>
               <a:tabLst/>
             </a:pPr>
-            <a:endParaRPr kumimoji="0" lang="zh-CN" altLang="en-US" sz="2000" b="0" i="0" u="none" strike="noStrike" cap="none" normalizeH="0" baseline="0" smtClean="0">
+            <a:endParaRPr kumimoji="0" lang="zh-CN" altLang="en-US" sz="2000" b="0" i="0" u="none" strike="noStrike" cap="none" normalizeH="0" baseline="0">
               <a:ln>
                 <a:noFill/>
               </a:ln>
@@ -30341,7 +29879,7 @@
               <a:buChar char="•"/>
             </a:pPr>
             <a:r>
-              <a:rPr lang="zh-CN" altLang="en-US" sz="3200" dirty="0" smtClean="0">
+              <a:rPr lang="zh-CN" altLang="en-US" sz="3200" dirty="0">
                 <a:solidFill>
                   <a:schemeClr val="bg2">
                     <a:lumMod val="75000"/>
@@ -30376,7 +29914,7 @@
               <a:buChar char="•"/>
             </a:pPr>
             <a:r>
-              <a:rPr lang="zh-CN" altLang="en-US" sz="3200" dirty="0" smtClean="0">
+              <a:rPr lang="zh-CN" altLang="en-US" sz="3200" dirty="0">
                 <a:solidFill>
                   <a:schemeClr val="bg2">
                     <a:lumMod val="75000"/>

</xml_diff>